<commit_message>
edited slide deck, edited data coding
</commit_message>
<xml_diff>
--- a/Slide Deck.pptx
+++ b/Slide Deck.pptx
@@ -7392,22 +7392,22 @@
           </a:bodyPr>
           <a:lstStyle/>
           <a:p>
-            <a:pPr marL="0" lvl="0" indent="0" algn="ctr">
+            <a:pPr marL="0" lvl="0" indent="0">
               <a:spcAft>
                 <a:spcPts val="1600"/>
               </a:spcAft>
               <a:buNone/>
             </a:pPr>
             <a:r>
-              <a:rPr lang="en-US" sz="2400" dirty="0">
+              <a:rPr lang="en-US" sz="2000" dirty="0">
                 <a:solidFill>
                   <a:schemeClr val="bg1"/>
                 </a:solidFill>
                 <a:latin typeface="Andale Mono" panose="020B0509000000000004" pitchFamily="49" charset="0"/>
               </a:rPr>
-              <a:t>Analysis of industry data reveal opportunities for success and profitability through smart investment in: </a:t>
+              <a:t>Analysis of industry data reveal opportunities for success through investment in: </a:t>
             </a:r>
-            <a:endParaRPr lang="en-US" dirty="0">
+            <a:endParaRPr lang="en-US" sz="1600" dirty="0">
               <a:solidFill>
                 <a:schemeClr val="bg1"/>
               </a:solidFill>
@@ -7431,7 +7431,7 @@
         <p:spPr>
           <a:xfrm>
             <a:off x="311699" y="3090453"/>
-            <a:ext cx="8744702" cy="2236510"/>
+            <a:ext cx="8520600" cy="2236510"/>
           </a:xfrm>
           <a:prstGeom prst="rect">
             <a:avLst/>
@@ -7439,7 +7439,7 @@
           <a:noFill/>
         </p:spPr>
         <p:txBody>
-          <a:bodyPr wrap="none" rtlCol="0">
+          <a:bodyPr wrap="square" rtlCol="0">
             <a:spAutoFit/>
           </a:bodyPr>
           <a:lstStyle/>
@@ -7461,7 +7461,7 @@
                 </a:solidFill>
                 <a:latin typeface="Andale Mono" panose="020B0509000000000004" pitchFamily="49" charset="0"/>
               </a:rPr>
-              <a:t>Popular and highly rated genres and story arcs</a:t>
+              <a:t>Popular and highly rated genres</a:t>
             </a:r>
           </a:p>
           <a:p>

</xml_diff>

<commit_message>
rough darft of slide deck, code and all visulizations
</commit_message>
<xml_diff>
--- a/Slide Deck.pptx
+++ b/Slide Deck.pptx
@@ -5,7 +5,7 @@
     <p:sldMasterId id="2147483659" r:id="rId1"/>
   </p:sldMasterIdLst>
   <p:notesMasterIdLst>
-    <p:notesMasterId r:id="rId11"/>
+    <p:notesMasterId r:id="rId16"/>
   </p:notesMasterIdLst>
   <p:sldIdLst>
     <p:sldId id="256" r:id="rId2"/>
@@ -13,24 +13,29 @@
     <p:sldId id="258" r:id="rId4"/>
     <p:sldId id="259" r:id="rId5"/>
     <p:sldId id="265" r:id="rId6"/>
-    <p:sldId id="261" r:id="rId7"/>
-    <p:sldId id="262" r:id="rId8"/>
-    <p:sldId id="263" r:id="rId9"/>
-    <p:sldId id="264" r:id="rId10"/>
+    <p:sldId id="267" r:id="rId7"/>
+    <p:sldId id="269" r:id="rId8"/>
+    <p:sldId id="270" r:id="rId9"/>
+    <p:sldId id="271" r:id="rId10"/>
+    <p:sldId id="272" r:id="rId11"/>
+    <p:sldId id="273" r:id="rId12"/>
+    <p:sldId id="274" r:id="rId13"/>
+    <p:sldId id="275" r:id="rId14"/>
+    <p:sldId id="264" r:id="rId15"/>
   </p:sldIdLst>
   <p:sldSz cx="9144000" cy="5143500" type="screen16x9"/>
   <p:notesSz cx="6858000" cy="9144000"/>
   <p:embeddedFontLst>
     <p:embeddedFont>
       <p:font typeface="Andale Mono" panose="020B0509000000000004" pitchFamily="49" charset="0"/>
-      <p:regular r:id="rId12"/>
+      <p:regular r:id="rId17"/>
     </p:embeddedFont>
     <p:embeddedFont>
       <p:font typeface="Proxima Nova" panose="02000506030000020004" pitchFamily="2" charset="0"/>
-      <p:regular r:id="rId13"/>
-      <p:bold r:id="rId14"/>
-      <p:italic r:id="rId15"/>
-      <p:boldItalic r:id="rId16"/>
+      <p:regular r:id="rId18"/>
+      <p:bold r:id="rId19"/>
+      <p:italic r:id="rId20"/>
+      <p:boldItalic r:id="rId21"/>
     </p:embeddedFont>
   </p:embeddedFontLst>
   <p:defaultTextStyle>
@@ -826,6 +831,546 @@
 </p:notes>
 </file>
 
+<file path=ppt/notesSlides/notesSlide10.xml><?xml version="1.0" encoding="utf-8"?>
+<p:notes xmlns:a="http://schemas.openxmlformats.org/drawingml/2006/main" xmlns:r="http://schemas.openxmlformats.org/officeDocument/2006/relationships" xmlns:p="http://schemas.openxmlformats.org/presentationml/2006/main" showMasterSp="0" showMasterPhAnim="0">
+  <p:cSld>
+    <p:spTree>
+      <p:nvGrpSpPr>
+        <p:cNvPr id="1" name="Shape 73"/>
+        <p:cNvGrpSpPr/>
+        <p:nvPr/>
+      </p:nvGrpSpPr>
+      <p:grpSpPr>
+        <a:xfrm>
+          <a:off x="0" y="0"/>
+          <a:ext cx="0" cy="0"/>
+          <a:chOff x="0" y="0"/>
+          <a:chExt cx="0" cy="0"/>
+        </a:xfrm>
+      </p:grpSpPr>
+      <p:sp>
+        <p:nvSpPr>
+          <p:cNvPr id="74" name="Google Shape;74;g8a55b5f358_0_56:notes"/>
+          <p:cNvSpPr>
+            <a:spLocks noGrp="1" noRot="1" noChangeAspect="1"/>
+          </p:cNvSpPr>
+          <p:nvPr>
+            <p:ph type="sldImg" idx="2"/>
+          </p:nvPr>
+        </p:nvSpPr>
+        <p:spPr>
+          <a:xfrm>
+            <a:off x="381000" y="685800"/>
+            <a:ext cx="6096000" cy="3429000"/>
+          </a:xfrm>
+          <a:custGeom>
+            <a:avLst/>
+            <a:gdLst/>
+            <a:ahLst/>
+            <a:cxnLst/>
+            <a:rect l="l" t="t" r="r" b="b"/>
+            <a:pathLst>
+              <a:path w="120000" h="120000" extrusionOk="0">
+                <a:moveTo>
+                  <a:pt x="0" y="0"/>
+                </a:moveTo>
+                <a:lnTo>
+                  <a:pt x="120000" y="0"/>
+                </a:lnTo>
+                <a:lnTo>
+                  <a:pt x="120000" y="120000"/>
+                </a:lnTo>
+                <a:lnTo>
+                  <a:pt x="0" y="120000"/>
+                </a:lnTo>
+                <a:close/>
+              </a:path>
+            </a:pathLst>
+          </a:custGeom>
+        </p:spPr>
+      </p:sp>
+      <p:sp>
+        <p:nvSpPr>
+          <p:cNvPr id="75" name="Google Shape;75;g8a55b5f358_0_56:notes"/>
+          <p:cNvSpPr txBox="1">
+            <a:spLocks noGrp="1"/>
+          </p:cNvSpPr>
+          <p:nvPr>
+            <p:ph type="body" idx="1"/>
+          </p:nvPr>
+        </p:nvSpPr>
+        <p:spPr>
+          <a:xfrm>
+            <a:off x="685800" y="4343400"/>
+            <a:ext cx="5486400" cy="4114800"/>
+          </a:xfrm>
+          <a:prstGeom prst="rect">
+            <a:avLst/>
+          </a:prstGeom>
+        </p:spPr>
+        <p:txBody>
+          <a:bodyPr spcFirstLastPara="1" wrap="square" lIns="91425" tIns="91425" rIns="91425" bIns="91425" anchor="t" anchorCtr="0">
+            <a:noAutofit/>
+          </a:bodyPr>
+          <a:lstStyle/>
+          <a:p>
+            <a:pPr marL="0" lvl="0" indent="0" algn="l" rtl="0">
+              <a:spcBef>
+                <a:spcPts val="0"/>
+              </a:spcBef>
+              <a:spcAft>
+                <a:spcPts val="0"/>
+              </a:spcAft>
+              <a:buNone/>
+            </a:pPr>
+            <a:endParaRPr dirty="0"/>
+          </a:p>
+        </p:txBody>
+      </p:sp>
+    </p:spTree>
+    <p:extLst>
+      <p:ext uri="{BB962C8B-B14F-4D97-AF65-F5344CB8AC3E}">
+        <p14:creationId xmlns:p14="http://schemas.microsoft.com/office/powerpoint/2010/main" val="1083808305"/>
+      </p:ext>
+    </p:extLst>
+  </p:cSld>
+  <p:clrMapOvr>
+    <a:masterClrMapping/>
+  </p:clrMapOvr>
+</p:notes>
+</file>
+
+<file path=ppt/notesSlides/notesSlide11.xml><?xml version="1.0" encoding="utf-8"?>
+<p:notes xmlns:a="http://schemas.openxmlformats.org/drawingml/2006/main" xmlns:r="http://schemas.openxmlformats.org/officeDocument/2006/relationships" xmlns:p="http://schemas.openxmlformats.org/presentationml/2006/main" showMasterSp="0" showMasterPhAnim="0">
+  <p:cSld>
+    <p:spTree>
+      <p:nvGrpSpPr>
+        <p:cNvPr id="1" name="Shape 73"/>
+        <p:cNvGrpSpPr/>
+        <p:nvPr/>
+      </p:nvGrpSpPr>
+      <p:grpSpPr>
+        <a:xfrm>
+          <a:off x="0" y="0"/>
+          <a:ext cx="0" cy="0"/>
+          <a:chOff x="0" y="0"/>
+          <a:chExt cx="0" cy="0"/>
+        </a:xfrm>
+      </p:grpSpPr>
+      <p:sp>
+        <p:nvSpPr>
+          <p:cNvPr id="74" name="Google Shape;74;g8a55b5f358_0_56:notes"/>
+          <p:cNvSpPr>
+            <a:spLocks noGrp="1" noRot="1" noChangeAspect="1"/>
+          </p:cNvSpPr>
+          <p:nvPr>
+            <p:ph type="sldImg" idx="2"/>
+          </p:nvPr>
+        </p:nvSpPr>
+        <p:spPr>
+          <a:xfrm>
+            <a:off x="381000" y="685800"/>
+            <a:ext cx="6096000" cy="3429000"/>
+          </a:xfrm>
+          <a:custGeom>
+            <a:avLst/>
+            <a:gdLst/>
+            <a:ahLst/>
+            <a:cxnLst/>
+            <a:rect l="l" t="t" r="r" b="b"/>
+            <a:pathLst>
+              <a:path w="120000" h="120000" extrusionOk="0">
+                <a:moveTo>
+                  <a:pt x="0" y="0"/>
+                </a:moveTo>
+                <a:lnTo>
+                  <a:pt x="120000" y="0"/>
+                </a:lnTo>
+                <a:lnTo>
+                  <a:pt x="120000" y="120000"/>
+                </a:lnTo>
+                <a:lnTo>
+                  <a:pt x="0" y="120000"/>
+                </a:lnTo>
+                <a:close/>
+              </a:path>
+            </a:pathLst>
+          </a:custGeom>
+        </p:spPr>
+      </p:sp>
+      <p:sp>
+        <p:nvSpPr>
+          <p:cNvPr id="75" name="Google Shape;75;g8a55b5f358_0_56:notes"/>
+          <p:cNvSpPr txBox="1">
+            <a:spLocks noGrp="1"/>
+          </p:cNvSpPr>
+          <p:nvPr>
+            <p:ph type="body" idx="1"/>
+          </p:nvPr>
+        </p:nvSpPr>
+        <p:spPr>
+          <a:xfrm>
+            <a:off x="685800" y="4343400"/>
+            <a:ext cx="5486400" cy="4114800"/>
+          </a:xfrm>
+          <a:prstGeom prst="rect">
+            <a:avLst/>
+          </a:prstGeom>
+        </p:spPr>
+        <p:txBody>
+          <a:bodyPr spcFirstLastPara="1" wrap="square" lIns="91425" tIns="91425" rIns="91425" bIns="91425" anchor="t" anchorCtr="0">
+            <a:noAutofit/>
+          </a:bodyPr>
+          <a:lstStyle/>
+          <a:p>
+            <a:pPr marL="0" lvl="0" indent="0" algn="l" rtl="0">
+              <a:spcBef>
+                <a:spcPts val="0"/>
+              </a:spcBef>
+              <a:spcAft>
+                <a:spcPts val="0"/>
+              </a:spcAft>
+              <a:buNone/>
+            </a:pPr>
+            <a:endParaRPr/>
+          </a:p>
+        </p:txBody>
+      </p:sp>
+    </p:spTree>
+    <p:extLst>
+      <p:ext uri="{BB962C8B-B14F-4D97-AF65-F5344CB8AC3E}">
+        <p14:creationId xmlns:p14="http://schemas.microsoft.com/office/powerpoint/2010/main" val="838342272"/>
+      </p:ext>
+    </p:extLst>
+  </p:cSld>
+  <p:clrMapOvr>
+    <a:masterClrMapping/>
+  </p:clrMapOvr>
+</p:notes>
+</file>
+
+<file path=ppt/notesSlides/notesSlide12.xml><?xml version="1.0" encoding="utf-8"?>
+<p:notes xmlns:a="http://schemas.openxmlformats.org/drawingml/2006/main" xmlns:r="http://schemas.openxmlformats.org/officeDocument/2006/relationships" xmlns:p="http://schemas.openxmlformats.org/presentationml/2006/main" showMasterSp="0" showMasterPhAnim="0">
+  <p:cSld>
+    <p:spTree>
+      <p:nvGrpSpPr>
+        <p:cNvPr id="1" name="Shape 73"/>
+        <p:cNvGrpSpPr/>
+        <p:nvPr/>
+      </p:nvGrpSpPr>
+      <p:grpSpPr>
+        <a:xfrm>
+          <a:off x="0" y="0"/>
+          <a:ext cx="0" cy="0"/>
+          <a:chOff x="0" y="0"/>
+          <a:chExt cx="0" cy="0"/>
+        </a:xfrm>
+      </p:grpSpPr>
+      <p:sp>
+        <p:nvSpPr>
+          <p:cNvPr id="74" name="Google Shape;74;g8a55b5f358_0_56:notes"/>
+          <p:cNvSpPr>
+            <a:spLocks noGrp="1" noRot="1" noChangeAspect="1"/>
+          </p:cNvSpPr>
+          <p:nvPr>
+            <p:ph type="sldImg" idx="2"/>
+          </p:nvPr>
+        </p:nvSpPr>
+        <p:spPr>
+          <a:xfrm>
+            <a:off x="381000" y="685800"/>
+            <a:ext cx="6096000" cy="3429000"/>
+          </a:xfrm>
+          <a:custGeom>
+            <a:avLst/>
+            <a:gdLst/>
+            <a:ahLst/>
+            <a:cxnLst/>
+            <a:rect l="l" t="t" r="r" b="b"/>
+            <a:pathLst>
+              <a:path w="120000" h="120000" extrusionOk="0">
+                <a:moveTo>
+                  <a:pt x="0" y="0"/>
+                </a:moveTo>
+                <a:lnTo>
+                  <a:pt x="120000" y="0"/>
+                </a:lnTo>
+                <a:lnTo>
+                  <a:pt x="120000" y="120000"/>
+                </a:lnTo>
+                <a:lnTo>
+                  <a:pt x="0" y="120000"/>
+                </a:lnTo>
+                <a:close/>
+              </a:path>
+            </a:pathLst>
+          </a:custGeom>
+        </p:spPr>
+      </p:sp>
+      <p:sp>
+        <p:nvSpPr>
+          <p:cNvPr id="75" name="Google Shape;75;g8a55b5f358_0_56:notes"/>
+          <p:cNvSpPr txBox="1">
+            <a:spLocks noGrp="1"/>
+          </p:cNvSpPr>
+          <p:nvPr>
+            <p:ph type="body" idx="1"/>
+          </p:nvPr>
+        </p:nvSpPr>
+        <p:spPr>
+          <a:xfrm>
+            <a:off x="685800" y="4343400"/>
+            <a:ext cx="5486400" cy="4114800"/>
+          </a:xfrm>
+          <a:prstGeom prst="rect">
+            <a:avLst/>
+          </a:prstGeom>
+        </p:spPr>
+        <p:txBody>
+          <a:bodyPr spcFirstLastPara="1" wrap="square" lIns="91425" tIns="91425" rIns="91425" bIns="91425" anchor="t" anchorCtr="0">
+            <a:noAutofit/>
+          </a:bodyPr>
+          <a:lstStyle/>
+          <a:p>
+            <a:pPr marL="0" lvl="0" indent="0" algn="l" rtl="0">
+              <a:spcBef>
+                <a:spcPts val="0"/>
+              </a:spcBef>
+              <a:spcAft>
+                <a:spcPts val="0"/>
+              </a:spcAft>
+              <a:buNone/>
+            </a:pPr>
+            <a:endParaRPr dirty="0"/>
+          </a:p>
+        </p:txBody>
+      </p:sp>
+    </p:spTree>
+    <p:extLst>
+      <p:ext uri="{BB962C8B-B14F-4D97-AF65-F5344CB8AC3E}">
+        <p14:creationId xmlns:p14="http://schemas.microsoft.com/office/powerpoint/2010/main" val="1356952145"/>
+      </p:ext>
+    </p:extLst>
+  </p:cSld>
+  <p:clrMapOvr>
+    <a:masterClrMapping/>
+  </p:clrMapOvr>
+</p:notes>
+</file>
+
+<file path=ppt/notesSlides/notesSlide13.xml><?xml version="1.0" encoding="utf-8"?>
+<p:notes xmlns:a="http://schemas.openxmlformats.org/drawingml/2006/main" xmlns:r="http://schemas.openxmlformats.org/officeDocument/2006/relationships" xmlns:p="http://schemas.openxmlformats.org/presentationml/2006/main" showMasterSp="0" showMasterPhAnim="0">
+  <p:cSld>
+    <p:spTree>
+      <p:nvGrpSpPr>
+        <p:cNvPr id="1" name="Shape 73"/>
+        <p:cNvGrpSpPr/>
+        <p:nvPr/>
+      </p:nvGrpSpPr>
+      <p:grpSpPr>
+        <a:xfrm>
+          <a:off x="0" y="0"/>
+          <a:ext cx="0" cy="0"/>
+          <a:chOff x="0" y="0"/>
+          <a:chExt cx="0" cy="0"/>
+        </a:xfrm>
+      </p:grpSpPr>
+      <p:sp>
+        <p:nvSpPr>
+          <p:cNvPr id="74" name="Google Shape;74;g8a55b5f358_0_56:notes"/>
+          <p:cNvSpPr>
+            <a:spLocks noGrp="1" noRot="1" noChangeAspect="1"/>
+          </p:cNvSpPr>
+          <p:nvPr>
+            <p:ph type="sldImg" idx="2"/>
+          </p:nvPr>
+        </p:nvSpPr>
+        <p:spPr>
+          <a:xfrm>
+            <a:off x="381000" y="685800"/>
+            <a:ext cx="6096000" cy="3429000"/>
+          </a:xfrm>
+          <a:custGeom>
+            <a:avLst/>
+            <a:gdLst/>
+            <a:ahLst/>
+            <a:cxnLst/>
+            <a:rect l="l" t="t" r="r" b="b"/>
+            <a:pathLst>
+              <a:path w="120000" h="120000" extrusionOk="0">
+                <a:moveTo>
+                  <a:pt x="0" y="0"/>
+                </a:moveTo>
+                <a:lnTo>
+                  <a:pt x="120000" y="0"/>
+                </a:lnTo>
+                <a:lnTo>
+                  <a:pt x="120000" y="120000"/>
+                </a:lnTo>
+                <a:lnTo>
+                  <a:pt x="0" y="120000"/>
+                </a:lnTo>
+                <a:close/>
+              </a:path>
+            </a:pathLst>
+          </a:custGeom>
+        </p:spPr>
+      </p:sp>
+      <p:sp>
+        <p:nvSpPr>
+          <p:cNvPr id="75" name="Google Shape;75;g8a55b5f358_0_56:notes"/>
+          <p:cNvSpPr txBox="1">
+            <a:spLocks noGrp="1"/>
+          </p:cNvSpPr>
+          <p:nvPr>
+            <p:ph type="body" idx="1"/>
+          </p:nvPr>
+        </p:nvSpPr>
+        <p:spPr>
+          <a:xfrm>
+            <a:off x="685800" y="4343400"/>
+            <a:ext cx="5486400" cy="4114800"/>
+          </a:xfrm>
+          <a:prstGeom prst="rect">
+            <a:avLst/>
+          </a:prstGeom>
+        </p:spPr>
+        <p:txBody>
+          <a:bodyPr spcFirstLastPara="1" wrap="square" lIns="91425" tIns="91425" rIns="91425" bIns="91425" anchor="t" anchorCtr="0">
+            <a:noAutofit/>
+          </a:bodyPr>
+          <a:lstStyle/>
+          <a:p>
+            <a:pPr marL="0" lvl="0" indent="0" algn="l" rtl="0">
+              <a:spcBef>
+                <a:spcPts val="0"/>
+              </a:spcBef>
+              <a:spcAft>
+                <a:spcPts val="0"/>
+              </a:spcAft>
+              <a:buNone/>
+            </a:pPr>
+            <a:endParaRPr/>
+          </a:p>
+        </p:txBody>
+      </p:sp>
+    </p:spTree>
+    <p:extLst>
+      <p:ext uri="{BB962C8B-B14F-4D97-AF65-F5344CB8AC3E}">
+        <p14:creationId xmlns:p14="http://schemas.microsoft.com/office/powerpoint/2010/main" val="192771910"/>
+      </p:ext>
+    </p:extLst>
+  </p:cSld>
+  <p:clrMapOvr>
+    <a:masterClrMapping/>
+  </p:clrMapOvr>
+</p:notes>
+</file>
+
+<file path=ppt/notesSlides/notesSlide14.xml><?xml version="1.0" encoding="utf-8"?>
+<p:notes xmlns:a="http://schemas.openxmlformats.org/drawingml/2006/main" xmlns:r="http://schemas.openxmlformats.org/officeDocument/2006/relationships" xmlns:p="http://schemas.openxmlformats.org/presentationml/2006/main" showMasterSp="0" showMasterPhAnim="0">
+  <p:cSld>
+    <p:spTree>
+      <p:nvGrpSpPr>
+        <p:cNvPr id="1" name="Shape 103"/>
+        <p:cNvGrpSpPr/>
+        <p:nvPr/>
+      </p:nvGrpSpPr>
+      <p:grpSpPr>
+        <a:xfrm>
+          <a:off x="0" y="0"/>
+          <a:ext cx="0" cy="0"/>
+          <a:chOff x="0" y="0"/>
+          <a:chExt cx="0" cy="0"/>
+        </a:xfrm>
+      </p:grpSpPr>
+      <p:sp>
+        <p:nvSpPr>
+          <p:cNvPr id="104" name="Google Shape;104;g8a55b5f358_0_86:notes"/>
+          <p:cNvSpPr>
+            <a:spLocks noGrp="1" noRot="1" noChangeAspect="1"/>
+          </p:cNvSpPr>
+          <p:nvPr>
+            <p:ph type="sldImg" idx="2"/>
+          </p:nvPr>
+        </p:nvSpPr>
+        <p:spPr>
+          <a:xfrm>
+            <a:off x="381000" y="685800"/>
+            <a:ext cx="6096000" cy="3429000"/>
+          </a:xfrm>
+          <a:custGeom>
+            <a:avLst/>
+            <a:gdLst/>
+            <a:ahLst/>
+            <a:cxnLst/>
+            <a:rect l="l" t="t" r="r" b="b"/>
+            <a:pathLst>
+              <a:path w="120000" h="120000" extrusionOk="0">
+                <a:moveTo>
+                  <a:pt x="0" y="0"/>
+                </a:moveTo>
+                <a:lnTo>
+                  <a:pt x="120000" y="0"/>
+                </a:lnTo>
+                <a:lnTo>
+                  <a:pt x="120000" y="120000"/>
+                </a:lnTo>
+                <a:lnTo>
+                  <a:pt x="0" y="120000"/>
+                </a:lnTo>
+                <a:close/>
+              </a:path>
+            </a:pathLst>
+          </a:custGeom>
+        </p:spPr>
+      </p:sp>
+      <p:sp>
+        <p:nvSpPr>
+          <p:cNvPr id="105" name="Google Shape;105;g8a55b5f358_0_86:notes"/>
+          <p:cNvSpPr txBox="1">
+            <a:spLocks noGrp="1"/>
+          </p:cNvSpPr>
+          <p:nvPr>
+            <p:ph type="body" idx="1"/>
+          </p:nvPr>
+        </p:nvSpPr>
+        <p:spPr>
+          <a:xfrm>
+            <a:off x="685800" y="4343400"/>
+            <a:ext cx="5486400" cy="4114800"/>
+          </a:xfrm>
+          <a:prstGeom prst="rect">
+            <a:avLst/>
+          </a:prstGeom>
+        </p:spPr>
+        <p:txBody>
+          <a:bodyPr spcFirstLastPara="1" wrap="square" lIns="91425" tIns="91425" rIns="91425" bIns="91425" anchor="t" anchorCtr="0">
+            <a:noAutofit/>
+          </a:bodyPr>
+          <a:lstStyle/>
+          <a:p>
+            <a:pPr marL="0" lvl="0" indent="0" algn="l" rtl="0">
+              <a:spcBef>
+                <a:spcPts val="0"/>
+              </a:spcBef>
+              <a:spcAft>
+                <a:spcPts val="0"/>
+              </a:spcAft>
+              <a:buNone/>
+            </a:pPr>
+            <a:endParaRPr/>
+          </a:p>
+        </p:txBody>
+      </p:sp>
+    </p:spTree>
+  </p:cSld>
+  <p:clrMapOvr>
+    <a:masterClrMapping/>
+  </p:clrMapOvr>
+</p:notes>
+</file>
+
 <file path=ppt/notesSlides/notesSlide2.xml><?xml version="1.0" encoding="utf-8"?>
 <p:notes xmlns:a="http://schemas.openxmlformats.org/drawingml/2006/main" xmlns:r="http://schemas.openxmlformats.org/officeDocument/2006/relationships" xmlns:p="http://schemas.openxmlformats.org/presentationml/2006/main" showMasterSp="0" showMasterPhAnim="0">
   <p:cSld>
@@ -1252,7 +1797,7 @@
   <p:cSld>
     <p:spTree>
       <p:nvGrpSpPr>
-        <p:cNvPr id="1" name="Shape 85"/>
+        <p:cNvPr id="1" name="Shape 73"/>
         <p:cNvGrpSpPr/>
         <p:nvPr/>
       </p:nvGrpSpPr>
@@ -1266,7 +1811,7 @@
       </p:grpSpPr>
       <p:sp>
         <p:nvSpPr>
-          <p:cNvPr id="86" name="Google Shape;86;g8a55b5f358_0_66:notes"/>
+          <p:cNvPr id="74" name="Google Shape;74;g8a55b5f358_0_56:notes"/>
           <p:cNvSpPr>
             <a:spLocks noGrp="1" noRot="1" noChangeAspect="1"/>
           </p:cNvSpPr>
@@ -1276,7 +1821,7 @@
         </p:nvSpPr>
         <p:spPr>
           <a:xfrm>
-            <a:off x="381300" y="685800"/>
+            <a:off x="381000" y="685800"/>
             <a:ext cx="6096000" cy="3429000"/>
           </a:xfrm>
           <a:custGeom>
@@ -1307,7 +1852,7 @@
       </p:sp>
       <p:sp>
         <p:nvSpPr>
-          <p:cNvPr id="87" name="Google Shape;87;g8a55b5f358_0_66:notes"/>
+          <p:cNvPr id="75" name="Google Shape;75;g8a55b5f358_0_56:notes"/>
           <p:cNvSpPr txBox="1">
             <a:spLocks noGrp="1"/>
           </p:cNvSpPr>
@@ -1344,6 +1889,11 @@
         </p:txBody>
       </p:sp>
     </p:spTree>
+    <p:extLst>
+      <p:ext uri="{BB962C8B-B14F-4D97-AF65-F5344CB8AC3E}">
+        <p14:creationId xmlns:p14="http://schemas.microsoft.com/office/powerpoint/2010/main" val="888369017"/>
+      </p:ext>
+    </p:extLst>
   </p:cSld>
   <p:clrMapOvr>
     <a:masterClrMapping/>
@@ -1356,7 +1906,7 @@
   <p:cSld>
     <p:spTree>
       <p:nvGrpSpPr>
-        <p:cNvPr id="1" name="Shape 91"/>
+        <p:cNvPr id="1" name="Shape 73"/>
         <p:cNvGrpSpPr/>
         <p:nvPr/>
       </p:nvGrpSpPr>
@@ -1370,7 +1920,7 @@
       </p:grpSpPr>
       <p:sp>
         <p:nvSpPr>
-          <p:cNvPr id="92" name="Google Shape;92;g8a55b5f358_0_71:notes"/>
+          <p:cNvPr id="74" name="Google Shape;74;g8a55b5f358_0_56:notes"/>
           <p:cNvSpPr>
             <a:spLocks noGrp="1" noRot="1" noChangeAspect="1"/>
           </p:cNvSpPr>
@@ -1380,7 +1930,7 @@
         </p:nvSpPr>
         <p:spPr>
           <a:xfrm>
-            <a:off x="381300" y="685800"/>
+            <a:off x="381000" y="685800"/>
             <a:ext cx="6096000" cy="3429000"/>
           </a:xfrm>
           <a:custGeom>
@@ -1411,7 +1961,7 @@
       </p:sp>
       <p:sp>
         <p:nvSpPr>
-          <p:cNvPr id="93" name="Google Shape;93;g8a55b5f358_0_71:notes"/>
+          <p:cNvPr id="75" name="Google Shape;75;g8a55b5f358_0_56:notes"/>
           <p:cNvSpPr txBox="1">
             <a:spLocks noGrp="1"/>
           </p:cNvSpPr>
@@ -1448,6 +1998,11 @@
         </p:txBody>
       </p:sp>
     </p:spTree>
+    <p:extLst>
+      <p:ext uri="{BB962C8B-B14F-4D97-AF65-F5344CB8AC3E}">
+        <p14:creationId xmlns:p14="http://schemas.microsoft.com/office/powerpoint/2010/main" val="2368101101"/>
+      </p:ext>
+    </p:extLst>
   </p:cSld>
   <p:clrMapOvr>
     <a:masterClrMapping/>
@@ -1460,7 +2015,7 @@
   <p:cSld>
     <p:spTree>
       <p:nvGrpSpPr>
-        <p:cNvPr id="1" name="Shape 97"/>
+        <p:cNvPr id="1" name="Shape 73"/>
         <p:cNvGrpSpPr/>
         <p:nvPr/>
       </p:nvGrpSpPr>
@@ -1474,7 +2029,7 @@
       </p:grpSpPr>
       <p:sp>
         <p:nvSpPr>
-          <p:cNvPr id="98" name="Google Shape;98;g8a55b5f358_0_81:notes"/>
+          <p:cNvPr id="74" name="Google Shape;74;g8a55b5f358_0_56:notes"/>
           <p:cNvSpPr>
             <a:spLocks noGrp="1" noRot="1" noChangeAspect="1"/>
           </p:cNvSpPr>
@@ -1484,7 +2039,7 @@
         </p:nvSpPr>
         <p:spPr>
           <a:xfrm>
-            <a:off x="381300" y="685800"/>
+            <a:off x="381000" y="685800"/>
             <a:ext cx="6096000" cy="3429000"/>
           </a:xfrm>
           <a:custGeom>
@@ -1515,7 +2070,7 @@
       </p:sp>
       <p:sp>
         <p:nvSpPr>
-          <p:cNvPr id="99" name="Google Shape;99;g8a55b5f358_0_81:notes"/>
+          <p:cNvPr id="75" name="Google Shape;75;g8a55b5f358_0_56:notes"/>
           <p:cNvSpPr txBox="1">
             <a:spLocks noGrp="1"/>
           </p:cNvSpPr>
@@ -1552,6 +2107,11 @@
         </p:txBody>
       </p:sp>
     </p:spTree>
+    <p:extLst>
+      <p:ext uri="{BB962C8B-B14F-4D97-AF65-F5344CB8AC3E}">
+        <p14:creationId xmlns:p14="http://schemas.microsoft.com/office/powerpoint/2010/main" val="1446405422"/>
+      </p:ext>
+    </p:extLst>
   </p:cSld>
   <p:clrMapOvr>
     <a:masterClrMapping/>
@@ -1564,7 +2124,7 @@
   <p:cSld>
     <p:spTree>
       <p:nvGrpSpPr>
-        <p:cNvPr id="1" name="Shape 103"/>
+        <p:cNvPr id="1" name="Shape 73"/>
         <p:cNvGrpSpPr/>
         <p:nvPr/>
       </p:nvGrpSpPr>
@@ -1578,7 +2138,7 @@
       </p:grpSpPr>
       <p:sp>
         <p:nvSpPr>
-          <p:cNvPr id="104" name="Google Shape;104;g8a55b5f358_0_86:notes"/>
+          <p:cNvPr id="74" name="Google Shape;74;g8a55b5f358_0_56:notes"/>
           <p:cNvSpPr>
             <a:spLocks noGrp="1" noRot="1" noChangeAspect="1"/>
           </p:cNvSpPr>
@@ -1588,7 +2148,7 @@
         </p:nvSpPr>
         <p:spPr>
           <a:xfrm>
-            <a:off x="381300" y="685800"/>
+            <a:off x="381000" y="685800"/>
             <a:ext cx="6096000" cy="3429000"/>
           </a:xfrm>
           <a:custGeom>
@@ -1619,7 +2179,7 @@
       </p:sp>
       <p:sp>
         <p:nvSpPr>
-          <p:cNvPr id="105" name="Google Shape;105;g8a55b5f358_0_86:notes"/>
+          <p:cNvPr id="75" name="Google Shape;75;g8a55b5f358_0_56:notes"/>
           <p:cNvSpPr txBox="1">
             <a:spLocks noGrp="1"/>
           </p:cNvSpPr>
@@ -1656,6 +2216,11 @@
         </p:txBody>
       </p:sp>
     </p:spTree>
+    <p:extLst>
+      <p:ext uri="{BB962C8B-B14F-4D97-AF65-F5344CB8AC3E}">
+        <p14:creationId xmlns:p14="http://schemas.microsoft.com/office/powerpoint/2010/main" val="4146219966"/>
+      </p:ext>
+    </p:extLst>
   </p:cSld>
   <p:clrMapOvr>
     <a:masterClrMapping/>
@@ -7273,6 +7838,1353 @@
 </p:sld>
 </file>
 
+<file path=ppt/slides/slide10.xml><?xml version="1.0" encoding="utf-8"?>
+<p:sld xmlns:a="http://schemas.openxmlformats.org/drawingml/2006/main" xmlns:r="http://schemas.openxmlformats.org/officeDocument/2006/relationships" xmlns:p="http://schemas.openxmlformats.org/presentationml/2006/main">
+  <p:cSld>
+    <p:bg>
+      <p:bgPr>
+        <a:solidFill>
+          <a:schemeClr val="tx1"/>
+        </a:solidFill>
+        <a:effectLst/>
+      </p:bgPr>
+    </p:bg>
+    <p:spTree>
+      <p:nvGrpSpPr>
+        <p:cNvPr id="1" name="Shape 76"/>
+        <p:cNvGrpSpPr/>
+        <p:nvPr/>
+      </p:nvGrpSpPr>
+      <p:grpSpPr>
+        <a:xfrm>
+          <a:off x="0" y="0"/>
+          <a:ext cx="0" cy="0"/>
+          <a:chOff x="0" y="0"/>
+          <a:chExt cx="0" cy="0"/>
+        </a:xfrm>
+      </p:grpSpPr>
+      <p:sp>
+        <p:nvSpPr>
+          <p:cNvPr id="77" name="Google Shape;77;p16"/>
+          <p:cNvSpPr txBox="1">
+            <a:spLocks noGrp="1"/>
+          </p:cNvSpPr>
+          <p:nvPr>
+            <p:ph type="title"/>
+          </p:nvPr>
+        </p:nvSpPr>
+        <p:spPr>
+          <a:xfrm>
+            <a:off x="0" y="0"/>
+            <a:ext cx="8721768" cy="572700"/>
+          </a:xfrm>
+          <a:prstGeom prst="rect">
+            <a:avLst/>
+          </a:prstGeom>
+        </p:spPr>
+        <p:txBody>
+          <a:bodyPr spcFirstLastPara="1" wrap="square" lIns="91425" tIns="91425" rIns="91425" bIns="91425" anchor="t" anchorCtr="0">
+            <a:noAutofit/>
+            <a:scene3d>
+              <a:camera prst="obliqueTopLeft">
+                <a:rot lat="0" lon="0" rev="0"/>
+              </a:camera>
+              <a:lightRig rig="threePt" dir="t"/>
+            </a:scene3d>
+          </a:bodyPr>
+          <a:lstStyle/>
+          <a:p>
+            <a:pPr marL="0" lvl="0" indent="0" algn="l" rtl="0">
+              <a:spcBef>
+                <a:spcPts val="0"/>
+              </a:spcBef>
+              <a:spcAft>
+                <a:spcPts val="0"/>
+              </a:spcAft>
+              <a:buNone/>
+            </a:pPr>
+            <a:r>
+              <a:rPr lang="en" dirty="0">
+                <a:solidFill>
+                  <a:schemeClr val="bg1"/>
+                </a:solidFill>
+                <a:effectLst>
+                  <a:glow rad="139700">
+                    <a:schemeClr val="tx2">
+                      <a:alpha val="40000"/>
+                    </a:schemeClr>
+                  </a:glow>
+                </a:effectLst>
+                <a:latin typeface="Andale Mono" panose="020B0509000000000004" pitchFamily="49" charset="0"/>
+              </a:rPr>
+              <a:t>Results</a:t>
+            </a:r>
+            <a:endParaRPr dirty="0">
+              <a:solidFill>
+                <a:schemeClr val="bg1"/>
+              </a:solidFill>
+              <a:effectLst>
+                <a:glow rad="139700">
+                  <a:schemeClr val="tx2">
+                    <a:alpha val="40000"/>
+                  </a:schemeClr>
+                </a:glow>
+              </a:effectLst>
+              <a:latin typeface="Andale Mono" panose="020B0509000000000004" pitchFamily="49" charset="0"/>
+            </a:endParaRPr>
+          </a:p>
+        </p:txBody>
+      </p:sp>
+      <p:cxnSp>
+        <p:nvCxnSpPr>
+          <p:cNvPr id="5" name="Straight Connector 4">
+            <a:extLst>
+              <a:ext uri="{FF2B5EF4-FFF2-40B4-BE49-F238E27FC236}">
+                <a16:creationId xmlns:a16="http://schemas.microsoft.com/office/drawing/2014/main" id="{B9467874-3FEB-364F-AD86-5258FC6FB8CA}"/>
+              </a:ext>
+            </a:extLst>
+          </p:cNvPr>
+          <p:cNvCxnSpPr>
+            <a:cxnSpLocks/>
+          </p:cNvCxnSpPr>
+          <p:nvPr/>
+        </p:nvCxnSpPr>
+        <p:spPr>
+          <a:xfrm>
+            <a:off x="6439" y="546573"/>
+            <a:ext cx="9144000" cy="26127"/>
+          </a:xfrm>
+          <a:prstGeom prst="line">
+            <a:avLst/>
+          </a:prstGeom>
+          <a:ln>
+            <a:solidFill>
+              <a:schemeClr val="bg1"/>
+            </a:solidFill>
+          </a:ln>
+        </p:spPr>
+        <p:style>
+          <a:lnRef idx="1">
+            <a:schemeClr val="accent1"/>
+          </a:lnRef>
+          <a:fillRef idx="0">
+            <a:schemeClr val="accent1"/>
+          </a:fillRef>
+          <a:effectRef idx="0">
+            <a:schemeClr val="accent1"/>
+          </a:effectRef>
+          <a:fontRef idx="minor">
+            <a:schemeClr val="tx1"/>
+          </a:fontRef>
+        </p:style>
+      </p:cxnSp>
+      <p:sp>
+        <p:nvSpPr>
+          <p:cNvPr id="3" name="Text Placeholder 2">
+            <a:extLst>
+              <a:ext uri="{FF2B5EF4-FFF2-40B4-BE49-F238E27FC236}">
+                <a16:creationId xmlns:a16="http://schemas.microsoft.com/office/drawing/2014/main" id="{450BC6C9-55BD-964D-978D-8144B7C339EA}"/>
+              </a:ext>
+            </a:extLst>
+          </p:cNvPr>
+          <p:cNvSpPr>
+            <a:spLocks noGrp="1"/>
+          </p:cNvSpPr>
+          <p:nvPr>
+            <p:ph type="body" idx="1"/>
+          </p:nvPr>
+        </p:nvSpPr>
+        <p:spPr>
+          <a:xfrm>
+            <a:off x="0" y="572700"/>
+            <a:ext cx="9144000" cy="1024276"/>
+          </a:xfrm>
+        </p:spPr>
+        <p:txBody>
+          <a:bodyPr anchor="ctr"/>
+          <a:lstStyle/>
+          <a:p>
+            <a:pPr marL="114300" indent="0">
+              <a:buClr>
+                <a:schemeClr val="bg1"/>
+              </a:buClr>
+              <a:buNone/>
+            </a:pPr>
+            <a:r>
+              <a:rPr lang="en-US" sz="1100" dirty="0">
+                <a:solidFill>
+                  <a:schemeClr val="bg1"/>
+                </a:solidFill>
+                <a:latin typeface="Andale Mono" panose="020B0509000000000004" pitchFamily="49" charset="0"/>
+              </a:rPr>
+              <a:t>Comparing popularity scores to both box office gross and budget, and looking at the regression line, we see a slight positive correlation between popularity and higher budgets, and obviously domestic gross (which itself is a measure of popularity).</a:t>
+            </a:r>
+          </a:p>
+          <a:p>
+            <a:pPr marL="114300" indent="0">
+              <a:buClr>
+                <a:schemeClr val="bg1"/>
+              </a:buClr>
+              <a:buNone/>
+            </a:pPr>
+            <a:endParaRPr lang="en-US" sz="1100" dirty="0">
+              <a:solidFill>
+                <a:schemeClr val="bg1"/>
+              </a:solidFill>
+              <a:latin typeface="Andale Mono" panose="020B0509000000000004" pitchFamily="49" charset="0"/>
+            </a:endParaRPr>
+          </a:p>
+          <a:p>
+            <a:pPr>
+              <a:lnSpc>
+                <a:spcPct val="64000"/>
+              </a:lnSpc>
+              <a:buClr>
+                <a:schemeClr val="bg1"/>
+              </a:buClr>
+              <a:buFont typeface="System Font Regular"/>
+              <a:buChar char="⦿"/>
+            </a:pPr>
+            <a:r>
+              <a:rPr lang="en-US" sz="1100" dirty="0">
+                <a:solidFill>
+                  <a:schemeClr val="bg1"/>
+                </a:solidFill>
+                <a:latin typeface="Andale Mono" panose="020B0509000000000004" pitchFamily="49" charset="0"/>
+              </a:rPr>
+              <a:t>Higher budget movies are potentially more popular and bring in more gross revenue</a:t>
+            </a:r>
+          </a:p>
+          <a:p>
+            <a:pPr marL="114300" indent="0">
+              <a:lnSpc>
+                <a:spcPct val="64000"/>
+              </a:lnSpc>
+              <a:buClr>
+                <a:schemeClr val="bg1"/>
+              </a:buClr>
+              <a:buNone/>
+            </a:pPr>
+            <a:endParaRPr lang="en-US" sz="1200" dirty="0">
+              <a:solidFill>
+                <a:schemeClr val="bg1"/>
+              </a:solidFill>
+              <a:latin typeface="Andale Mono" panose="020B0509000000000004" pitchFamily="49" charset="0"/>
+            </a:endParaRPr>
+          </a:p>
+        </p:txBody>
+      </p:sp>
+      <p:pic>
+        <p:nvPicPr>
+          <p:cNvPr id="12" name="Picture 11" descr="A picture containing chart&#10;&#10;Description automatically generated">
+            <a:extLst>
+              <a:ext uri="{FF2B5EF4-FFF2-40B4-BE49-F238E27FC236}">
+                <a16:creationId xmlns:a16="http://schemas.microsoft.com/office/drawing/2014/main" id="{F1385726-CB77-8B40-AC72-471233367367}"/>
+              </a:ext>
+            </a:extLst>
+          </p:cNvPr>
+          <p:cNvPicPr>
+            <a:picLocks noChangeAspect="1"/>
+          </p:cNvPicPr>
+          <p:nvPr/>
+        </p:nvPicPr>
+        <p:blipFill rotWithShape="1">
+          <a:blip r:embed="rId3"/>
+          <a:srcRect l="6056" t="7017" r="7558" b="6361"/>
+          <a:stretch/>
+        </p:blipFill>
+        <p:spPr>
+          <a:xfrm>
+            <a:off x="4572000" y="1596976"/>
+            <a:ext cx="4571998" cy="3546523"/>
+          </a:xfrm>
+          <a:prstGeom prst="rect">
+            <a:avLst/>
+          </a:prstGeom>
+        </p:spPr>
+      </p:pic>
+      <p:pic>
+        <p:nvPicPr>
+          <p:cNvPr id="14" name="Picture 13" descr="Graphical user interface&#10;&#10;Description automatically generated with medium confidence">
+            <a:extLst>
+              <a:ext uri="{FF2B5EF4-FFF2-40B4-BE49-F238E27FC236}">
+                <a16:creationId xmlns:a16="http://schemas.microsoft.com/office/drawing/2014/main" id="{20A19206-6A04-AC4D-9ADE-31C173A3430C}"/>
+              </a:ext>
+            </a:extLst>
+          </p:cNvPr>
+          <p:cNvPicPr>
+            <a:picLocks noChangeAspect="1"/>
+          </p:cNvPicPr>
+          <p:nvPr/>
+        </p:nvPicPr>
+        <p:blipFill rotWithShape="1">
+          <a:blip r:embed="rId4"/>
+          <a:srcRect l="4924" t="7440" r="8691" b="5938"/>
+          <a:stretch/>
+        </p:blipFill>
+        <p:spPr>
+          <a:xfrm>
+            <a:off x="0" y="1596977"/>
+            <a:ext cx="4572002" cy="3546523"/>
+          </a:xfrm>
+          <a:prstGeom prst="rect">
+            <a:avLst/>
+          </a:prstGeom>
+        </p:spPr>
+      </p:pic>
+    </p:spTree>
+    <p:extLst>
+      <p:ext uri="{BB962C8B-B14F-4D97-AF65-F5344CB8AC3E}">
+        <p14:creationId xmlns:p14="http://schemas.microsoft.com/office/powerpoint/2010/main" val="3290605698"/>
+      </p:ext>
+    </p:extLst>
+  </p:cSld>
+  <p:clrMapOvr>
+    <a:masterClrMapping/>
+  </p:clrMapOvr>
+</p:sld>
+</file>
+
+<file path=ppt/slides/slide11.xml><?xml version="1.0" encoding="utf-8"?>
+<p:sld xmlns:a="http://schemas.openxmlformats.org/drawingml/2006/main" xmlns:r="http://schemas.openxmlformats.org/officeDocument/2006/relationships" xmlns:p="http://schemas.openxmlformats.org/presentationml/2006/main">
+  <p:cSld>
+    <p:bg>
+      <p:bgPr>
+        <a:solidFill>
+          <a:schemeClr val="tx1"/>
+        </a:solidFill>
+        <a:effectLst/>
+      </p:bgPr>
+    </p:bg>
+    <p:spTree>
+      <p:nvGrpSpPr>
+        <p:cNvPr id="1" name="Shape 76"/>
+        <p:cNvGrpSpPr/>
+        <p:nvPr/>
+      </p:nvGrpSpPr>
+      <p:grpSpPr>
+        <a:xfrm>
+          <a:off x="0" y="0"/>
+          <a:ext cx="0" cy="0"/>
+          <a:chOff x="0" y="0"/>
+          <a:chExt cx="0" cy="0"/>
+        </a:xfrm>
+      </p:grpSpPr>
+      <p:sp>
+        <p:nvSpPr>
+          <p:cNvPr id="77" name="Google Shape;77;p16"/>
+          <p:cNvSpPr txBox="1">
+            <a:spLocks noGrp="1"/>
+          </p:cNvSpPr>
+          <p:nvPr>
+            <p:ph type="title"/>
+          </p:nvPr>
+        </p:nvSpPr>
+        <p:spPr>
+          <a:xfrm>
+            <a:off x="311700" y="76088"/>
+            <a:ext cx="8721768" cy="572700"/>
+          </a:xfrm>
+          <a:prstGeom prst="rect">
+            <a:avLst/>
+          </a:prstGeom>
+        </p:spPr>
+        <p:txBody>
+          <a:bodyPr spcFirstLastPara="1" wrap="square" lIns="91425" tIns="91425" rIns="91425" bIns="91425" anchor="t" anchorCtr="0">
+            <a:noAutofit/>
+            <a:scene3d>
+              <a:camera prst="obliqueTopLeft">
+                <a:rot lat="0" lon="0" rev="0"/>
+              </a:camera>
+              <a:lightRig rig="threePt" dir="t"/>
+            </a:scene3d>
+          </a:bodyPr>
+          <a:lstStyle/>
+          <a:p>
+            <a:pPr marL="0" lvl="0" indent="0" algn="l" rtl="0">
+              <a:spcBef>
+                <a:spcPts val="0"/>
+              </a:spcBef>
+              <a:spcAft>
+                <a:spcPts val="0"/>
+              </a:spcAft>
+              <a:buNone/>
+            </a:pPr>
+            <a:r>
+              <a:rPr lang="en" dirty="0">
+                <a:solidFill>
+                  <a:schemeClr val="bg1"/>
+                </a:solidFill>
+                <a:effectLst>
+                  <a:glow rad="139700">
+                    <a:schemeClr val="tx2">
+                      <a:alpha val="40000"/>
+                    </a:schemeClr>
+                  </a:glow>
+                </a:effectLst>
+                <a:latin typeface="Andale Mono" panose="020B0509000000000004" pitchFamily="49" charset="0"/>
+              </a:rPr>
+              <a:t>Results</a:t>
+            </a:r>
+            <a:endParaRPr dirty="0">
+              <a:solidFill>
+                <a:schemeClr val="bg1"/>
+              </a:solidFill>
+              <a:effectLst>
+                <a:glow rad="139700">
+                  <a:schemeClr val="tx2">
+                    <a:alpha val="40000"/>
+                  </a:schemeClr>
+                </a:glow>
+              </a:effectLst>
+              <a:latin typeface="Andale Mono" panose="020B0509000000000004" pitchFamily="49" charset="0"/>
+            </a:endParaRPr>
+          </a:p>
+        </p:txBody>
+      </p:sp>
+      <p:cxnSp>
+        <p:nvCxnSpPr>
+          <p:cNvPr id="5" name="Straight Connector 4">
+            <a:extLst>
+              <a:ext uri="{FF2B5EF4-FFF2-40B4-BE49-F238E27FC236}">
+                <a16:creationId xmlns:a16="http://schemas.microsoft.com/office/drawing/2014/main" id="{B9467874-3FEB-364F-AD86-5258FC6FB8CA}"/>
+              </a:ext>
+            </a:extLst>
+          </p:cNvPr>
+          <p:cNvCxnSpPr>
+            <a:cxnSpLocks/>
+          </p:cNvCxnSpPr>
+          <p:nvPr/>
+        </p:nvCxnSpPr>
+        <p:spPr>
+          <a:xfrm>
+            <a:off x="0" y="648788"/>
+            <a:ext cx="9144000" cy="26127"/>
+          </a:xfrm>
+          <a:prstGeom prst="line">
+            <a:avLst/>
+          </a:prstGeom>
+          <a:ln>
+            <a:solidFill>
+              <a:schemeClr val="bg1"/>
+            </a:solidFill>
+          </a:ln>
+        </p:spPr>
+        <p:style>
+          <a:lnRef idx="1">
+            <a:schemeClr val="accent1"/>
+          </a:lnRef>
+          <a:fillRef idx="0">
+            <a:schemeClr val="accent1"/>
+          </a:fillRef>
+          <a:effectRef idx="0">
+            <a:schemeClr val="accent1"/>
+          </a:effectRef>
+          <a:fontRef idx="minor">
+            <a:schemeClr val="tx1"/>
+          </a:fontRef>
+        </p:style>
+      </p:cxnSp>
+      <p:sp>
+        <p:nvSpPr>
+          <p:cNvPr id="3" name="Text Placeholder 2">
+            <a:extLst>
+              <a:ext uri="{FF2B5EF4-FFF2-40B4-BE49-F238E27FC236}">
+                <a16:creationId xmlns:a16="http://schemas.microsoft.com/office/drawing/2014/main" id="{450BC6C9-55BD-964D-978D-8144B7C339EA}"/>
+              </a:ext>
+            </a:extLst>
+          </p:cNvPr>
+          <p:cNvSpPr>
+            <a:spLocks noGrp="1"/>
+          </p:cNvSpPr>
+          <p:nvPr>
+            <p:ph type="body" idx="1"/>
+          </p:nvPr>
+        </p:nvSpPr>
+        <p:spPr>
+          <a:xfrm>
+            <a:off x="1" y="674915"/>
+            <a:ext cx="3773509" cy="4323804"/>
+          </a:xfrm>
+        </p:spPr>
+        <p:txBody>
+          <a:bodyPr anchor="ctr"/>
+          <a:lstStyle/>
+          <a:p>
+            <a:pPr marL="114300" indent="0">
+              <a:buClr>
+                <a:schemeClr val="bg1"/>
+              </a:buClr>
+              <a:buNone/>
+            </a:pPr>
+            <a:r>
+              <a:rPr lang="en-US" u="sng" dirty="0">
+                <a:solidFill>
+                  <a:schemeClr val="bg1"/>
+                </a:solidFill>
+                <a:latin typeface="Andale Mono" panose="020B0509000000000004" pitchFamily="49" charset="0"/>
+              </a:rPr>
+              <a:t>Top Grossing Directors</a:t>
+            </a:r>
+          </a:p>
+          <a:p>
+            <a:pPr marL="114300" indent="0">
+              <a:buClr>
+                <a:schemeClr val="bg1"/>
+              </a:buClr>
+              <a:buNone/>
+            </a:pPr>
+            <a:endParaRPr lang="en-US" sz="1200" dirty="0">
+              <a:solidFill>
+                <a:schemeClr val="bg1"/>
+              </a:solidFill>
+              <a:latin typeface="Andale Mono" panose="020B0509000000000004" pitchFamily="49" charset="0"/>
+            </a:endParaRPr>
+          </a:p>
+          <a:p>
+            <a:pPr marL="114300" indent="0">
+              <a:buClr>
+                <a:schemeClr val="bg1"/>
+              </a:buClr>
+              <a:buNone/>
+            </a:pPr>
+            <a:r>
+              <a:rPr lang="en-US" dirty="0">
+                <a:solidFill>
+                  <a:schemeClr val="bg1"/>
+                </a:solidFill>
+                <a:latin typeface="Andale Mono" panose="020B0509000000000004" pitchFamily="49" charset="0"/>
+              </a:rPr>
+              <a:t>Of the top 30 grossing movies from the last decade, these 20 directors were at the helm of at least one of those.</a:t>
+            </a:r>
+          </a:p>
+        </p:txBody>
+      </p:sp>
+      <p:pic>
+        <p:nvPicPr>
+          <p:cNvPr id="7" name="Picture 6" descr="Chart&#10;&#10;Description automatically generated">
+            <a:extLst>
+              <a:ext uri="{FF2B5EF4-FFF2-40B4-BE49-F238E27FC236}">
+                <a16:creationId xmlns:a16="http://schemas.microsoft.com/office/drawing/2014/main" id="{A1D1A4FE-B0CE-BA40-8988-81F0C0438AC3}"/>
+              </a:ext>
+            </a:extLst>
+          </p:cNvPr>
+          <p:cNvPicPr>
+            <a:picLocks noChangeAspect="1"/>
+          </p:cNvPicPr>
+          <p:nvPr/>
+        </p:nvPicPr>
+        <p:blipFill>
+          <a:blip r:embed="rId3"/>
+          <a:stretch>
+            <a:fillRect/>
+          </a:stretch>
+        </p:blipFill>
+        <p:spPr>
+          <a:xfrm>
+            <a:off x="3850782" y="662626"/>
+            <a:ext cx="5293217" cy="4480873"/>
+          </a:xfrm>
+          <a:prstGeom prst="rect">
+            <a:avLst/>
+          </a:prstGeom>
+        </p:spPr>
+      </p:pic>
+    </p:spTree>
+    <p:extLst>
+      <p:ext uri="{BB962C8B-B14F-4D97-AF65-F5344CB8AC3E}">
+        <p14:creationId xmlns:p14="http://schemas.microsoft.com/office/powerpoint/2010/main" val="1575688910"/>
+      </p:ext>
+    </p:extLst>
+  </p:cSld>
+  <p:clrMapOvr>
+    <a:masterClrMapping/>
+  </p:clrMapOvr>
+</p:sld>
+</file>
+
+<file path=ppt/slides/slide12.xml><?xml version="1.0" encoding="utf-8"?>
+<p:sld xmlns:a="http://schemas.openxmlformats.org/drawingml/2006/main" xmlns:r="http://schemas.openxmlformats.org/officeDocument/2006/relationships" xmlns:p="http://schemas.openxmlformats.org/presentationml/2006/main">
+  <p:cSld>
+    <p:bg>
+      <p:bgPr>
+        <a:solidFill>
+          <a:schemeClr val="tx1"/>
+        </a:solidFill>
+        <a:effectLst/>
+      </p:bgPr>
+    </p:bg>
+    <p:spTree>
+      <p:nvGrpSpPr>
+        <p:cNvPr id="1" name="Shape 76"/>
+        <p:cNvGrpSpPr/>
+        <p:nvPr/>
+      </p:nvGrpSpPr>
+      <p:grpSpPr>
+        <a:xfrm>
+          <a:off x="0" y="0"/>
+          <a:ext cx="0" cy="0"/>
+          <a:chOff x="0" y="0"/>
+          <a:chExt cx="0" cy="0"/>
+        </a:xfrm>
+      </p:grpSpPr>
+      <p:sp>
+        <p:nvSpPr>
+          <p:cNvPr id="77" name="Google Shape;77;p16"/>
+          <p:cNvSpPr txBox="1">
+            <a:spLocks noGrp="1"/>
+          </p:cNvSpPr>
+          <p:nvPr>
+            <p:ph type="title"/>
+          </p:nvPr>
+        </p:nvSpPr>
+        <p:spPr>
+          <a:xfrm>
+            <a:off x="311700" y="433140"/>
+            <a:ext cx="8721768" cy="572700"/>
+          </a:xfrm>
+          <a:prstGeom prst="rect">
+            <a:avLst/>
+          </a:prstGeom>
+        </p:spPr>
+        <p:txBody>
+          <a:bodyPr spcFirstLastPara="1" wrap="square" lIns="91425" tIns="91425" rIns="91425" bIns="91425" anchor="t" anchorCtr="0">
+            <a:noAutofit/>
+            <a:scene3d>
+              <a:camera prst="obliqueTopLeft">
+                <a:rot lat="0" lon="0" rev="0"/>
+              </a:camera>
+              <a:lightRig rig="threePt" dir="t"/>
+            </a:scene3d>
+          </a:bodyPr>
+          <a:lstStyle/>
+          <a:p>
+            <a:pPr marL="0" lvl="0" indent="0" algn="l" rtl="0">
+              <a:spcBef>
+                <a:spcPts val="0"/>
+              </a:spcBef>
+              <a:spcAft>
+                <a:spcPts val="0"/>
+              </a:spcAft>
+              <a:buNone/>
+            </a:pPr>
+            <a:r>
+              <a:rPr lang="en" dirty="0">
+                <a:solidFill>
+                  <a:schemeClr val="bg1"/>
+                </a:solidFill>
+                <a:effectLst>
+                  <a:glow rad="139700">
+                    <a:schemeClr val="tx2">
+                      <a:alpha val="40000"/>
+                    </a:schemeClr>
+                  </a:glow>
+                </a:effectLst>
+                <a:latin typeface="Andale Mono" panose="020B0509000000000004" pitchFamily="49" charset="0"/>
+              </a:rPr>
+              <a:t>Conclusions</a:t>
+            </a:r>
+            <a:endParaRPr dirty="0">
+              <a:solidFill>
+                <a:schemeClr val="bg1"/>
+              </a:solidFill>
+              <a:effectLst>
+                <a:glow rad="139700">
+                  <a:schemeClr val="tx2">
+                    <a:alpha val="40000"/>
+                  </a:schemeClr>
+                </a:glow>
+              </a:effectLst>
+              <a:latin typeface="Andale Mono" panose="020B0509000000000004" pitchFamily="49" charset="0"/>
+            </a:endParaRPr>
+          </a:p>
+        </p:txBody>
+      </p:sp>
+      <p:cxnSp>
+        <p:nvCxnSpPr>
+          <p:cNvPr id="5" name="Straight Connector 4">
+            <a:extLst>
+              <a:ext uri="{FF2B5EF4-FFF2-40B4-BE49-F238E27FC236}">
+                <a16:creationId xmlns:a16="http://schemas.microsoft.com/office/drawing/2014/main" id="{B9467874-3FEB-364F-AD86-5258FC6FB8CA}"/>
+              </a:ext>
+            </a:extLst>
+          </p:cNvPr>
+          <p:cNvCxnSpPr/>
+          <p:nvPr/>
+        </p:nvCxnSpPr>
+        <p:spPr>
+          <a:xfrm>
+            <a:off x="311700" y="1005840"/>
+            <a:ext cx="8520600" cy="0"/>
+          </a:xfrm>
+          <a:prstGeom prst="line">
+            <a:avLst/>
+          </a:prstGeom>
+          <a:ln>
+            <a:solidFill>
+              <a:schemeClr val="bg1"/>
+            </a:solidFill>
+          </a:ln>
+        </p:spPr>
+        <p:style>
+          <a:lnRef idx="1">
+            <a:schemeClr val="accent1"/>
+          </a:lnRef>
+          <a:fillRef idx="0">
+            <a:schemeClr val="accent1"/>
+          </a:fillRef>
+          <a:effectRef idx="0">
+            <a:schemeClr val="accent1"/>
+          </a:effectRef>
+          <a:fontRef idx="minor">
+            <a:schemeClr val="tx1"/>
+          </a:fontRef>
+        </p:style>
+      </p:cxnSp>
+      <p:sp>
+        <p:nvSpPr>
+          <p:cNvPr id="3" name="Text Placeholder 2">
+            <a:extLst>
+              <a:ext uri="{FF2B5EF4-FFF2-40B4-BE49-F238E27FC236}">
+                <a16:creationId xmlns:a16="http://schemas.microsoft.com/office/drawing/2014/main" id="{450BC6C9-55BD-964D-978D-8144B7C339EA}"/>
+              </a:ext>
+            </a:extLst>
+          </p:cNvPr>
+          <p:cNvSpPr>
+            <a:spLocks noGrp="1"/>
+          </p:cNvSpPr>
+          <p:nvPr>
+            <p:ph type="body" idx="1"/>
+          </p:nvPr>
+        </p:nvSpPr>
+        <p:spPr>
+          <a:xfrm>
+            <a:off x="311700" y="1152474"/>
+            <a:ext cx="8520600" cy="3896041"/>
+          </a:xfrm>
+        </p:spPr>
+        <p:txBody>
+          <a:bodyPr/>
+          <a:lstStyle/>
+          <a:p>
+            <a:pPr>
+              <a:buClr>
+                <a:schemeClr val="bg1"/>
+              </a:buClr>
+            </a:pPr>
+            <a:r>
+              <a:rPr lang="en-US" sz="2000" dirty="0">
+                <a:solidFill>
+                  <a:schemeClr val="bg1"/>
+                </a:solidFill>
+                <a:latin typeface="Andale Mono" panose="020B0509000000000004" pitchFamily="49" charset="0"/>
+              </a:rPr>
+              <a:t>Microsoft should look to acquire the rights to a super-hero / comic book franchise, or possibly another type of action franchise (e.g., Hunger Games)</a:t>
+            </a:r>
+          </a:p>
+          <a:p>
+            <a:pPr marL="114300" indent="0">
+              <a:buClr>
+                <a:schemeClr val="bg1"/>
+              </a:buClr>
+              <a:buNone/>
+            </a:pPr>
+            <a:r>
+              <a:rPr lang="en-US" sz="2000" dirty="0">
+                <a:solidFill>
+                  <a:schemeClr val="bg1"/>
+                </a:solidFill>
+                <a:latin typeface="Andale Mono" panose="020B0509000000000004" pitchFamily="49" charset="0"/>
+              </a:rPr>
+              <a:t>______</a:t>
+            </a:r>
+          </a:p>
+          <a:p>
+            <a:pPr marL="114300" indent="0">
+              <a:buClr>
+                <a:schemeClr val="bg1"/>
+              </a:buClr>
+              <a:buNone/>
+            </a:pPr>
+            <a:endParaRPr lang="en-US" sz="2000" dirty="0">
+              <a:solidFill>
+                <a:schemeClr val="bg1"/>
+              </a:solidFill>
+              <a:latin typeface="Andale Mono" panose="020B0509000000000004" pitchFamily="49" charset="0"/>
+            </a:endParaRPr>
+          </a:p>
+          <a:p>
+            <a:pPr>
+              <a:buClr>
+                <a:schemeClr val="bg1"/>
+              </a:buClr>
+              <a:buFont typeface="Wingdings" pitchFamily="2" charset="2"/>
+              <a:buChar char="Ø"/>
+            </a:pPr>
+            <a:r>
+              <a:rPr lang="en-US" sz="2000" dirty="0">
+                <a:solidFill>
+                  <a:schemeClr val="bg1"/>
+                </a:solidFill>
+                <a:latin typeface="Andale Mono" panose="020B0509000000000004" pitchFamily="49" charset="0"/>
+              </a:rPr>
+              <a:t>The most popular genre, by far, is the action genre</a:t>
+            </a:r>
+          </a:p>
+          <a:p>
+            <a:pPr lvl="1">
+              <a:buClr>
+                <a:schemeClr val="bg1"/>
+              </a:buClr>
+              <a:buFont typeface="Wingdings" pitchFamily="2" charset="2"/>
+              <a:buChar char="Ø"/>
+            </a:pPr>
+            <a:r>
+              <a:rPr lang="en-US" sz="1200" dirty="0">
+                <a:solidFill>
+                  <a:schemeClr val="bg1"/>
+                </a:solidFill>
+                <a:latin typeface="Andale Mono" panose="020B0509000000000004" pitchFamily="49" charset="0"/>
+              </a:rPr>
+              <a:t>Within this genre, the most successful movies by both profitability and popularity were in the superhero / comic book sub-genre</a:t>
+            </a:r>
+          </a:p>
+          <a:p>
+            <a:pPr lvl="1">
+              <a:buClr>
+                <a:schemeClr val="bg1"/>
+              </a:buClr>
+              <a:buFont typeface="Wingdings" pitchFamily="2" charset="2"/>
+              <a:buChar char="Ø"/>
+            </a:pPr>
+            <a:r>
+              <a:rPr lang="en-US" sz="1200" dirty="0">
+                <a:solidFill>
+                  <a:schemeClr val="bg1"/>
+                </a:solidFill>
+                <a:latin typeface="Andale Mono" panose="020B0509000000000004" pitchFamily="49" charset="0"/>
+              </a:rPr>
+              <a:t>Most were part of a franchise of films</a:t>
+            </a:r>
+          </a:p>
+          <a:p>
+            <a:pPr>
+              <a:buClr>
+                <a:schemeClr val="bg1"/>
+              </a:buClr>
+            </a:pPr>
+            <a:endParaRPr lang="en-US" sz="1600" dirty="0">
+              <a:solidFill>
+                <a:schemeClr val="bg1"/>
+              </a:solidFill>
+              <a:latin typeface="Andale Mono" panose="020B0509000000000004" pitchFamily="49" charset="0"/>
+            </a:endParaRPr>
+          </a:p>
+          <a:p>
+            <a:pPr marL="114300" indent="0">
+              <a:buClr>
+                <a:schemeClr val="bg1"/>
+              </a:buClr>
+              <a:buNone/>
+            </a:pPr>
+            <a:endParaRPr lang="en-US" sz="1600" dirty="0">
+              <a:solidFill>
+                <a:schemeClr val="bg1"/>
+              </a:solidFill>
+              <a:latin typeface="Andale Mono" panose="020B0509000000000004" pitchFamily="49" charset="0"/>
+            </a:endParaRPr>
+          </a:p>
+        </p:txBody>
+      </p:sp>
+    </p:spTree>
+    <p:extLst>
+      <p:ext uri="{BB962C8B-B14F-4D97-AF65-F5344CB8AC3E}">
+        <p14:creationId xmlns:p14="http://schemas.microsoft.com/office/powerpoint/2010/main" val="1543540814"/>
+      </p:ext>
+    </p:extLst>
+  </p:cSld>
+  <p:clrMapOvr>
+    <a:masterClrMapping/>
+  </p:clrMapOvr>
+</p:sld>
+</file>
+
+<file path=ppt/slides/slide13.xml><?xml version="1.0" encoding="utf-8"?>
+<p:sld xmlns:a="http://schemas.openxmlformats.org/drawingml/2006/main" xmlns:r="http://schemas.openxmlformats.org/officeDocument/2006/relationships" xmlns:p="http://schemas.openxmlformats.org/presentationml/2006/main">
+  <p:cSld>
+    <p:bg>
+      <p:bgPr>
+        <a:solidFill>
+          <a:schemeClr val="tx1"/>
+        </a:solidFill>
+        <a:effectLst/>
+      </p:bgPr>
+    </p:bg>
+    <p:spTree>
+      <p:nvGrpSpPr>
+        <p:cNvPr id="1" name="Shape 76"/>
+        <p:cNvGrpSpPr/>
+        <p:nvPr/>
+      </p:nvGrpSpPr>
+      <p:grpSpPr>
+        <a:xfrm>
+          <a:off x="0" y="0"/>
+          <a:ext cx="0" cy="0"/>
+          <a:chOff x="0" y="0"/>
+          <a:chExt cx="0" cy="0"/>
+        </a:xfrm>
+      </p:grpSpPr>
+      <p:sp>
+        <p:nvSpPr>
+          <p:cNvPr id="77" name="Google Shape;77;p16"/>
+          <p:cNvSpPr txBox="1">
+            <a:spLocks noGrp="1"/>
+          </p:cNvSpPr>
+          <p:nvPr>
+            <p:ph type="title"/>
+          </p:nvPr>
+        </p:nvSpPr>
+        <p:spPr>
+          <a:xfrm>
+            <a:off x="311700" y="241619"/>
+            <a:ext cx="8721768" cy="572700"/>
+          </a:xfrm>
+          <a:prstGeom prst="rect">
+            <a:avLst/>
+          </a:prstGeom>
+        </p:spPr>
+        <p:txBody>
+          <a:bodyPr spcFirstLastPara="1" wrap="square" lIns="91425" tIns="91425" rIns="91425" bIns="91425" anchor="t" anchorCtr="0">
+            <a:noAutofit/>
+            <a:scene3d>
+              <a:camera prst="obliqueTopLeft">
+                <a:rot lat="0" lon="0" rev="0"/>
+              </a:camera>
+              <a:lightRig rig="threePt" dir="t"/>
+            </a:scene3d>
+          </a:bodyPr>
+          <a:lstStyle/>
+          <a:p>
+            <a:pPr marL="0" lvl="0" indent="0" algn="l" rtl="0">
+              <a:spcBef>
+                <a:spcPts val="0"/>
+              </a:spcBef>
+              <a:spcAft>
+                <a:spcPts val="0"/>
+              </a:spcAft>
+              <a:buNone/>
+            </a:pPr>
+            <a:r>
+              <a:rPr lang="en" dirty="0">
+                <a:solidFill>
+                  <a:schemeClr val="bg1"/>
+                </a:solidFill>
+                <a:effectLst>
+                  <a:glow rad="139700">
+                    <a:schemeClr val="tx2">
+                      <a:alpha val="40000"/>
+                    </a:schemeClr>
+                  </a:glow>
+                </a:effectLst>
+                <a:latin typeface="Andale Mono" panose="020B0509000000000004" pitchFamily="49" charset="0"/>
+              </a:rPr>
+              <a:t>Conclusions</a:t>
+            </a:r>
+            <a:endParaRPr dirty="0">
+              <a:solidFill>
+                <a:schemeClr val="bg1"/>
+              </a:solidFill>
+              <a:effectLst>
+                <a:glow rad="139700">
+                  <a:schemeClr val="tx2">
+                    <a:alpha val="40000"/>
+                  </a:schemeClr>
+                </a:glow>
+              </a:effectLst>
+              <a:latin typeface="Andale Mono" panose="020B0509000000000004" pitchFamily="49" charset="0"/>
+            </a:endParaRPr>
+          </a:p>
+        </p:txBody>
+      </p:sp>
+      <p:cxnSp>
+        <p:nvCxnSpPr>
+          <p:cNvPr id="5" name="Straight Connector 4">
+            <a:extLst>
+              <a:ext uri="{FF2B5EF4-FFF2-40B4-BE49-F238E27FC236}">
+                <a16:creationId xmlns:a16="http://schemas.microsoft.com/office/drawing/2014/main" id="{B9467874-3FEB-364F-AD86-5258FC6FB8CA}"/>
+              </a:ext>
+            </a:extLst>
+          </p:cNvPr>
+          <p:cNvCxnSpPr/>
+          <p:nvPr/>
+        </p:nvCxnSpPr>
+        <p:spPr>
+          <a:xfrm>
+            <a:off x="311700" y="834925"/>
+            <a:ext cx="8520600" cy="0"/>
+          </a:xfrm>
+          <a:prstGeom prst="line">
+            <a:avLst/>
+          </a:prstGeom>
+          <a:ln>
+            <a:solidFill>
+              <a:schemeClr val="bg1"/>
+            </a:solidFill>
+          </a:ln>
+        </p:spPr>
+        <p:style>
+          <a:lnRef idx="1">
+            <a:schemeClr val="accent1"/>
+          </a:lnRef>
+          <a:fillRef idx="0">
+            <a:schemeClr val="accent1"/>
+          </a:fillRef>
+          <a:effectRef idx="0">
+            <a:schemeClr val="accent1"/>
+          </a:effectRef>
+          <a:fontRef idx="minor">
+            <a:schemeClr val="tx1"/>
+          </a:fontRef>
+        </p:style>
+      </p:cxnSp>
+      <p:sp>
+        <p:nvSpPr>
+          <p:cNvPr id="3" name="Text Placeholder 2">
+            <a:extLst>
+              <a:ext uri="{FF2B5EF4-FFF2-40B4-BE49-F238E27FC236}">
+                <a16:creationId xmlns:a16="http://schemas.microsoft.com/office/drawing/2014/main" id="{450BC6C9-55BD-964D-978D-8144B7C339EA}"/>
+              </a:ext>
+            </a:extLst>
+          </p:cNvPr>
+          <p:cNvSpPr>
+            <a:spLocks noGrp="1"/>
+          </p:cNvSpPr>
+          <p:nvPr>
+            <p:ph type="body" idx="1"/>
+          </p:nvPr>
+        </p:nvSpPr>
+        <p:spPr>
+          <a:xfrm>
+            <a:off x="311700" y="855532"/>
+            <a:ext cx="8520600" cy="3896041"/>
+          </a:xfrm>
+        </p:spPr>
+        <p:txBody>
+          <a:bodyPr/>
+          <a:lstStyle/>
+          <a:p>
+            <a:pPr>
+              <a:buClr>
+                <a:schemeClr val="bg1"/>
+              </a:buClr>
+            </a:pPr>
+            <a:r>
+              <a:rPr lang="en-US" sz="2400" dirty="0">
+                <a:solidFill>
+                  <a:schemeClr val="bg1"/>
+                </a:solidFill>
+                <a:latin typeface="Andale Mono" panose="020B0509000000000004" pitchFamily="49" charset="0"/>
+              </a:rPr>
+              <a:t>Microsoft should look to produce animated movies as well</a:t>
+            </a:r>
+          </a:p>
+          <a:p>
+            <a:pPr lvl="1">
+              <a:buClr>
+                <a:schemeClr val="bg1"/>
+              </a:buClr>
+            </a:pPr>
+            <a:r>
+              <a:rPr lang="en-US" sz="1800" dirty="0">
+                <a:solidFill>
+                  <a:schemeClr val="bg1"/>
+                </a:solidFill>
+                <a:latin typeface="Andale Mono" panose="020B0509000000000004" pitchFamily="49" charset="0"/>
+              </a:rPr>
+              <a:t>12 of the top 30 most profitable movies were animated</a:t>
+            </a:r>
+          </a:p>
+          <a:p>
+            <a:pPr lvl="1">
+              <a:buClr>
+                <a:schemeClr val="bg1"/>
+              </a:buClr>
+            </a:pPr>
+            <a:r>
+              <a:rPr lang="en-US" sz="1800" dirty="0">
+                <a:solidFill>
+                  <a:schemeClr val="bg1"/>
+                </a:solidFill>
+                <a:latin typeface="Andale Mono" panose="020B0509000000000004" pitchFamily="49" charset="0"/>
+              </a:rPr>
+              <a:t>Animation was also one of the most popular genres</a:t>
+            </a:r>
+            <a:endParaRPr lang="en-US" sz="2000" dirty="0">
+              <a:solidFill>
+                <a:schemeClr val="bg1"/>
+              </a:solidFill>
+              <a:latin typeface="Andale Mono" panose="020B0509000000000004" pitchFamily="49" charset="0"/>
+            </a:endParaRPr>
+          </a:p>
+          <a:p>
+            <a:pPr marL="114300" indent="0">
+              <a:buClr>
+                <a:schemeClr val="bg1"/>
+              </a:buClr>
+              <a:buNone/>
+            </a:pPr>
+            <a:r>
+              <a:rPr lang="en-US" sz="2000" dirty="0">
+                <a:solidFill>
+                  <a:schemeClr val="bg1"/>
+                </a:solidFill>
+                <a:latin typeface="Andale Mono" panose="020B0509000000000004" pitchFamily="49" charset="0"/>
+              </a:rPr>
+              <a:t>______</a:t>
+            </a:r>
+          </a:p>
+          <a:p>
+            <a:pPr>
+              <a:buClr>
+                <a:schemeClr val="bg1"/>
+              </a:buClr>
+            </a:pPr>
+            <a:r>
+              <a:rPr lang="en-US" sz="2400" dirty="0">
+                <a:solidFill>
+                  <a:schemeClr val="bg1"/>
+                </a:solidFill>
+                <a:latin typeface="Andale Mono" panose="020B0509000000000004" pitchFamily="49" charset="0"/>
+              </a:rPr>
+              <a:t>Microsoft should attach top grossing directors and talent to their projects. </a:t>
+            </a:r>
+          </a:p>
+          <a:p>
+            <a:pPr lvl="1">
+              <a:buClr>
+                <a:schemeClr val="bg1"/>
+              </a:buClr>
+            </a:pPr>
+            <a:r>
+              <a:rPr lang="en-US" sz="2000" dirty="0">
+                <a:solidFill>
+                  <a:schemeClr val="bg1"/>
+                </a:solidFill>
+                <a:latin typeface="Andale Mono" panose="020B0509000000000004" pitchFamily="49" charset="0"/>
+              </a:rPr>
+              <a:t>Top talent will bring buzz and notoriety, which will bring audiences and profits</a:t>
+            </a:r>
+          </a:p>
+          <a:p>
+            <a:pPr>
+              <a:buClr>
+                <a:schemeClr val="bg1"/>
+              </a:buClr>
+            </a:pPr>
+            <a:endParaRPr lang="en-US" sz="1600" dirty="0">
+              <a:solidFill>
+                <a:schemeClr val="bg1"/>
+              </a:solidFill>
+              <a:latin typeface="Andale Mono" panose="020B0509000000000004" pitchFamily="49" charset="0"/>
+            </a:endParaRPr>
+          </a:p>
+          <a:p>
+            <a:pPr marL="114300" indent="0">
+              <a:buClr>
+                <a:schemeClr val="bg1"/>
+              </a:buClr>
+              <a:buNone/>
+            </a:pPr>
+            <a:endParaRPr lang="en-US" sz="1600" dirty="0">
+              <a:solidFill>
+                <a:schemeClr val="bg1"/>
+              </a:solidFill>
+              <a:latin typeface="Andale Mono" panose="020B0509000000000004" pitchFamily="49" charset="0"/>
+            </a:endParaRPr>
+          </a:p>
+        </p:txBody>
+      </p:sp>
+    </p:spTree>
+    <p:extLst>
+      <p:ext uri="{BB962C8B-B14F-4D97-AF65-F5344CB8AC3E}">
+        <p14:creationId xmlns:p14="http://schemas.microsoft.com/office/powerpoint/2010/main" val="1513662984"/>
+      </p:ext>
+    </p:extLst>
+  </p:cSld>
+  <p:clrMapOvr>
+    <a:masterClrMapping/>
+  </p:clrMapOvr>
+</p:sld>
+</file>
+
+<file path=ppt/slides/slide14.xml><?xml version="1.0" encoding="utf-8"?>
+<p:sld xmlns:a="http://schemas.openxmlformats.org/drawingml/2006/main" xmlns:r="http://schemas.openxmlformats.org/officeDocument/2006/relationships" xmlns:p="http://schemas.openxmlformats.org/presentationml/2006/main">
+  <p:cSld>
+    <p:spTree>
+      <p:nvGrpSpPr>
+        <p:cNvPr id="1" name="Shape 106"/>
+        <p:cNvGrpSpPr/>
+        <p:nvPr/>
+      </p:nvGrpSpPr>
+      <p:grpSpPr>
+        <a:xfrm>
+          <a:off x="0" y="0"/>
+          <a:ext cx="0" cy="0"/>
+          <a:chOff x="0" y="0"/>
+          <a:chExt cx="0" cy="0"/>
+        </a:xfrm>
+      </p:grpSpPr>
+      <p:sp>
+        <p:nvSpPr>
+          <p:cNvPr id="107" name="Google Shape;107;p21"/>
+          <p:cNvSpPr txBox="1">
+            <a:spLocks noGrp="1"/>
+          </p:cNvSpPr>
+          <p:nvPr>
+            <p:ph type="title"/>
+          </p:nvPr>
+        </p:nvSpPr>
+        <p:spPr>
+          <a:xfrm>
+            <a:off x="490250" y="526350"/>
+            <a:ext cx="7715400" cy="4090800"/>
+          </a:xfrm>
+          <a:prstGeom prst="rect">
+            <a:avLst/>
+          </a:prstGeom>
+        </p:spPr>
+        <p:txBody>
+          <a:bodyPr spcFirstLastPara="1" wrap="square" lIns="91425" tIns="91425" rIns="91425" bIns="91425" anchor="ctr" anchorCtr="0">
+            <a:noAutofit/>
+          </a:bodyPr>
+          <a:lstStyle/>
+          <a:p>
+            <a:pPr marL="0" lvl="0" indent="0" algn="l" rtl="0">
+              <a:spcBef>
+                <a:spcPts val="0"/>
+              </a:spcBef>
+              <a:spcAft>
+                <a:spcPts val="0"/>
+              </a:spcAft>
+              <a:buNone/>
+            </a:pPr>
+            <a:r>
+              <a:rPr lang="en" dirty="0"/>
+              <a:t>Thank You!</a:t>
+            </a:r>
+            <a:endParaRPr dirty="0"/>
+          </a:p>
+          <a:p>
+            <a:pPr marL="0" lvl="0" indent="0" algn="l" rtl="0">
+              <a:spcBef>
+                <a:spcPts val="0"/>
+              </a:spcBef>
+              <a:spcAft>
+                <a:spcPts val="0"/>
+              </a:spcAft>
+              <a:buNone/>
+            </a:pPr>
+            <a:endParaRPr sz="2000" b="1" dirty="0"/>
+          </a:p>
+          <a:p>
+            <a:pPr marL="0" lvl="0" indent="0" algn="l" rtl="0">
+              <a:spcBef>
+                <a:spcPts val="0"/>
+              </a:spcBef>
+              <a:spcAft>
+                <a:spcPts val="0"/>
+              </a:spcAft>
+              <a:buNone/>
+            </a:pPr>
+            <a:r>
+              <a:rPr lang="en" sz="2000" b="1" dirty="0"/>
+              <a:t>Email:</a:t>
+            </a:r>
+            <a:r>
+              <a:rPr lang="en" sz="2000" dirty="0"/>
+              <a:t> </a:t>
+            </a:r>
+            <a:r>
+              <a:rPr lang="en-US" sz="2000" u="sng" dirty="0">
+                <a:solidFill>
+                  <a:schemeClr val="hlink"/>
+                </a:solidFill>
+              </a:rPr>
+              <a:t>sudomakecoffee1@gmail.com</a:t>
+            </a:r>
+            <a:endParaRPr sz="2000" dirty="0"/>
+          </a:p>
+          <a:p>
+            <a:pPr marL="0" lvl="0" indent="0" algn="l" rtl="0">
+              <a:spcBef>
+                <a:spcPts val="0"/>
+              </a:spcBef>
+              <a:spcAft>
+                <a:spcPts val="0"/>
+              </a:spcAft>
+              <a:buNone/>
+            </a:pPr>
+            <a:r>
+              <a:rPr lang="en" sz="2000" b="1" dirty="0"/>
+              <a:t>GitHub:</a:t>
+            </a:r>
+            <a:r>
+              <a:rPr lang="en" sz="2000" dirty="0"/>
+              <a:t> </a:t>
+            </a:r>
+            <a:r>
+              <a:rPr lang="en" sz="2000" dirty="0">
+                <a:hlinkClick r:id="rId3"/>
+              </a:rPr>
+              <a:t>@</a:t>
+            </a:r>
+            <a:r>
+              <a:rPr lang="en-US" sz="2000" dirty="0" err="1">
+                <a:hlinkClick r:id="rId3"/>
+              </a:rPr>
+              <a:t>patrick-anastasio</a:t>
+            </a:r>
+            <a:endParaRPr sz="2000" dirty="0"/>
+          </a:p>
+          <a:p>
+            <a:pPr marL="0" lvl="0" indent="0" algn="l" rtl="0">
+              <a:spcBef>
+                <a:spcPts val="0"/>
+              </a:spcBef>
+              <a:spcAft>
+                <a:spcPts val="0"/>
+              </a:spcAft>
+              <a:buNone/>
+            </a:pPr>
+            <a:r>
+              <a:rPr lang="en" sz="2000" b="1" dirty="0"/>
+              <a:t>LinkedIn:</a:t>
+            </a:r>
+            <a:r>
+              <a:rPr lang="en" sz="2000" dirty="0"/>
+              <a:t> </a:t>
+            </a:r>
+            <a:r>
+              <a:rPr lang="en" sz="2000" u="sng" dirty="0">
+                <a:solidFill>
+                  <a:schemeClr val="hlink"/>
+                </a:solidFill>
+                <a:hlinkClick r:id="rId4"/>
+              </a:rPr>
+              <a:t>linkedin.com/in/patrickanastasio/</a:t>
+            </a:r>
+            <a:endParaRPr sz="2000" dirty="0"/>
+          </a:p>
+        </p:txBody>
+      </p:sp>
+    </p:spTree>
+  </p:cSld>
+  <p:clrMapOvr>
+    <a:masterClrMapping/>
+  </p:clrMapOvr>
+</p:sld>
+</file>
+
 <file path=ppt/slides/slide2.xml><?xml version="1.0" encoding="utf-8"?>
 <p:sld xmlns:a="http://schemas.openxmlformats.org/drawingml/2006/main" xmlns:r="http://schemas.openxmlformats.org/officeDocument/2006/relationships" xmlns:p="http://schemas.openxmlformats.org/presentationml/2006/main">
   <p:cSld>
@@ -7430,8 +9342,8 @@
         </p:nvSpPr>
         <p:spPr>
           <a:xfrm>
-            <a:off x="311699" y="3090453"/>
-            <a:ext cx="8744702" cy="2236510"/>
+            <a:off x="957868" y="3238499"/>
+            <a:ext cx="7228261" cy="1333698"/>
           </a:xfrm>
           <a:prstGeom prst="rect">
             <a:avLst/>
@@ -7461,7 +9373,28 @@
                 </a:solidFill>
                 <a:latin typeface="Andale Mono" panose="020B0509000000000004" pitchFamily="49" charset="0"/>
               </a:rPr>
-              <a:t>Popular and highly rated genres and story arcs</a:t>
+              <a:t>Popular and highly rated genres</a:t>
+            </a:r>
+          </a:p>
+          <a:p>
+            <a:pPr marL="285750" lvl="0" indent="-285750">
+              <a:spcAft>
+                <a:spcPts val="1600"/>
+              </a:spcAft>
+              <a:buClr>
+                <a:schemeClr val="bg1"/>
+              </a:buClr>
+              <a:buFont typeface="Wingdings" pitchFamily="2" charset="2"/>
+              <a:buChar char="ü"/>
+            </a:pPr>
+            <a:r>
+              <a:rPr lang="en-US" sz="1800" dirty="0">
+                <a:solidFill>
+                  <a:schemeClr val="bg1"/>
+                </a:solidFill>
+                <a:latin typeface="Andale Mono" panose="020B0509000000000004" pitchFamily="49" charset="0"/>
+              </a:rPr>
+              <a:t>A proven net profit in the domestic market</a:t>
             </a:r>
           </a:p>
           <a:p>
@@ -7484,51 +9417,6 @@
               </a:rPr>
               <a:t>Attached names of buzzworthy directors and talent</a:t>
             </a:r>
-          </a:p>
-          <a:p>
-            <a:pPr marL="285750" lvl="0" indent="-285750">
-              <a:spcAft>
-                <a:spcPts val="1600"/>
-              </a:spcAft>
-              <a:buClr>
-                <a:schemeClr val="bg1"/>
-              </a:buClr>
-              <a:buFont typeface="Wingdings" pitchFamily="2" charset="2"/>
-              <a:buChar char="ü"/>
-            </a:pPr>
-            <a:r>
-              <a:rPr lang="en-US" sz="1800" dirty="0">
-                <a:solidFill>
-                  <a:schemeClr val="bg1"/>
-                </a:solidFill>
-                <a:latin typeface="Andale Mono" panose="020B0509000000000004" pitchFamily="49" charset="0"/>
-              </a:rPr>
-              <a:t>A proven net profit in both domestic and worldwide markets</a:t>
-            </a:r>
-          </a:p>
-          <a:p>
-            <a:pPr marL="285750" lvl="0" indent="-285750">
-              <a:spcAft>
-                <a:spcPts val="1600"/>
-              </a:spcAft>
-              <a:buClr>
-                <a:schemeClr val="bg1"/>
-              </a:buClr>
-              <a:buFont typeface="Wingdings" pitchFamily="2" charset="2"/>
-              <a:buChar char="ü"/>
-            </a:pPr>
-            <a:r>
-              <a:rPr lang="en-US" sz="1800" dirty="0">
-                <a:solidFill>
-                  <a:schemeClr val="bg1"/>
-                </a:solidFill>
-                <a:latin typeface="Andale Mono" panose="020B0509000000000004" pitchFamily="49" charset="0"/>
-              </a:rPr>
-              <a:t>Reducing budgets to maximize net profits</a:t>
-            </a:r>
-          </a:p>
-          <a:p>
-            <a:endParaRPr lang="en-US" dirty="0"/>
           </a:p>
         </p:txBody>
       </p:sp>
@@ -7933,8 +9821,8 @@
         </p:nvSpPr>
         <p:spPr>
           <a:xfrm>
-            <a:off x="311700" y="1005840"/>
-            <a:ext cx="8520600" cy="3867911"/>
+            <a:off x="311700" y="1262135"/>
+            <a:ext cx="8520600" cy="3611616"/>
           </a:xfrm>
           <a:prstGeom prst="rect">
             <a:avLst/>
@@ -7949,20 +9837,6 @@
           </a:bodyPr>
           <a:lstStyle/>
           <a:p>
-            <a:pPr marL="0" lvl="0" indent="0" algn="ctr" rtl="0">
-              <a:spcBef>
-                <a:spcPts val="0"/>
-              </a:spcBef>
-              <a:buNone/>
-            </a:pPr>
-            <a:endParaRPr lang="en" sz="2400" dirty="0">
-              <a:solidFill>
-                <a:schemeClr val="bg1"/>
-              </a:solidFill>
-              <a:latin typeface="Andale Mono" panose="020B0509000000000004" pitchFamily="49" charset="0"/>
-            </a:endParaRPr>
-          </a:p>
-          <a:p>
             <a:pPr marL="0" lvl="0" indent="0" rtl="0" hangingPunct="0">
               <a:spcBef>
                 <a:spcPts val="0"/>
@@ -8011,13 +9885,13 @@
             </a:r>
           </a:p>
           <a:p>
-            <a:pPr marL="0" lvl="0" indent="0" algn="ctr" rtl="0">
-              <a:spcBef>
-                <a:spcPts val="0"/>
-              </a:spcBef>
-              <a:buNone/>
-            </a:pPr>
-            <a:endParaRPr lang="en" sz="2000" dirty="0">
+            <a:pPr marL="0" lvl="0" indent="0" rtl="0">
+              <a:spcBef>
+                <a:spcPts val="0"/>
+              </a:spcBef>
+              <a:buNone/>
+            </a:pPr>
+            <a:endParaRPr lang="en" sz="1100" dirty="0">
               <a:solidFill>
                 <a:schemeClr val="bg1"/>
               </a:solidFill>
@@ -8025,83 +9899,21 @@
             </a:endParaRPr>
           </a:p>
           <a:p>
-            <a:pPr indent="-457200">
-              <a:lnSpc>
-                <a:spcPct val="100000"/>
-              </a:lnSpc>
-              <a:buClr>
-                <a:schemeClr val="tx2"/>
-              </a:buClr>
-              <a:buSzPct val="100000"/>
-              <a:buFont typeface="Arial" panose="020B0604020202020204" pitchFamily="34" charset="0"/>
-              <a:buChar char="•"/>
+            <a:pPr marL="0" lvl="0" indent="0" rtl="0">
+              <a:spcBef>
+                <a:spcPts val="0"/>
+              </a:spcBef>
+              <a:buNone/>
             </a:pPr>
             <a:r>
-              <a:rPr lang="en" sz="2800" dirty="0">
+              <a:rPr lang="en" sz="2400" dirty="0">
                 <a:solidFill>
                   <a:schemeClr val="bg1"/>
                 </a:solidFill>
                 <a:latin typeface="Andale Mono" panose="020B0509000000000004" pitchFamily="49" charset="0"/>
               </a:rPr>
-              <a:t>Great stories in popular genres</a:t>
+              <a:t>As a fledgling production company, Microsoft is unsure what projects will ensure success. Specifically, what kind of projects will be profitable, popular, and bring notoriety to the company.</a:t>
             </a:r>
-          </a:p>
-          <a:p>
-            <a:pPr indent="-457200">
-              <a:lnSpc>
-                <a:spcPct val="100000"/>
-              </a:lnSpc>
-              <a:buClr>
-                <a:schemeClr val="tx2"/>
-              </a:buClr>
-              <a:buSzPct val="100000"/>
-              <a:buFont typeface="Arial" panose="020B0604020202020204" pitchFamily="34" charset="0"/>
-              <a:buChar char="•"/>
-            </a:pPr>
-            <a:r>
-              <a:rPr lang="en" sz="2800" dirty="0">
-                <a:solidFill>
-                  <a:schemeClr val="bg1"/>
-                </a:solidFill>
-                <a:latin typeface="Andale Mono" panose="020B0509000000000004" pitchFamily="49" charset="0"/>
-              </a:rPr>
-              <a:t>Attract top talent and direction</a:t>
-            </a:r>
-          </a:p>
-          <a:p>
-            <a:pPr indent="-457200">
-              <a:lnSpc>
-                <a:spcPct val="100000"/>
-              </a:lnSpc>
-              <a:buClr>
-                <a:schemeClr val="tx2"/>
-              </a:buClr>
-              <a:buSzPct val="100000"/>
-              <a:buFont typeface="Arial" panose="020B0604020202020204" pitchFamily="34" charset="0"/>
-              <a:buChar char="•"/>
-            </a:pPr>
-            <a:r>
-              <a:rPr lang="en" sz="2800" dirty="0">
-                <a:solidFill>
-                  <a:schemeClr val="bg1"/>
-                </a:solidFill>
-                <a:latin typeface="Andale Mono" panose="020B0509000000000004" pitchFamily="49" charset="0"/>
-              </a:rPr>
-              <a:t>Reduce cost and maximize profit</a:t>
-            </a:r>
-          </a:p>
-          <a:p>
-            <a:pPr marL="0" indent="0" algn="ctr">
-              <a:lnSpc>
-                <a:spcPct val="100000"/>
-              </a:lnSpc>
-              <a:buNone/>
-            </a:pPr>
-            <a:endParaRPr lang="en" dirty="0">
-              <a:solidFill>
-                <a:schemeClr val="bg1"/>
-              </a:solidFill>
-            </a:endParaRPr>
           </a:p>
         </p:txBody>
       </p:sp>
@@ -8411,21 +10223,8 @@
                 </a:solidFill>
                 <a:latin typeface="Andale Mono" panose="020B0509000000000004" pitchFamily="49" charset="0"/>
               </a:rPr>
-              <a:t>Movies by title, rating, audience votes, genres and synopsis key words, names of directors/writers/actors, and box office net profits from domestic and worldwide markets</a:t>
+              <a:t>Movies by title, rating, audience votes, genres, names of directors/writers/actors, budgets and domestic box office numbers.</a:t>
             </a:r>
-          </a:p>
-          <a:p>
-            <a:pPr>
-              <a:buClr>
-                <a:schemeClr val="bg1"/>
-              </a:buClr>
-            </a:pPr>
-            <a:endParaRPr lang="en-US" sz="2000" dirty="0">
-              <a:solidFill>
-                <a:schemeClr val="bg1"/>
-              </a:solidFill>
-              <a:latin typeface="Andale Mono" panose="020B0509000000000004" pitchFamily="49" charset="0"/>
-            </a:endParaRPr>
           </a:p>
         </p:txBody>
       </p:sp>
@@ -8618,9 +10417,17 @@
 <file path=ppt/slides/slide6.xml><?xml version="1.0" encoding="utf-8"?>
 <p:sld xmlns:a="http://schemas.openxmlformats.org/drawingml/2006/main" xmlns:r="http://schemas.openxmlformats.org/officeDocument/2006/relationships" xmlns:p="http://schemas.openxmlformats.org/presentationml/2006/main">
   <p:cSld>
+    <p:bg>
+      <p:bgPr>
+        <a:solidFill>
+          <a:schemeClr val="tx1"/>
+        </a:solidFill>
+        <a:effectLst/>
+      </p:bgPr>
+    </p:bg>
     <p:spTree>
       <p:nvGrpSpPr>
-        <p:cNvPr id="1" name="Shape 88"/>
+        <p:cNvPr id="1" name="Shape 76"/>
         <p:cNvGrpSpPr/>
         <p:nvPr/>
       </p:nvGrpSpPr>
@@ -8634,7 +10441,7 @@
       </p:grpSpPr>
       <p:sp>
         <p:nvSpPr>
-          <p:cNvPr id="89" name="Google Shape;89;p18"/>
+          <p:cNvPr id="77" name="Google Shape;77;p16"/>
           <p:cNvSpPr txBox="1">
             <a:spLocks noGrp="1"/>
           </p:cNvSpPr>
@@ -8644,8 +10451,8 @@
         </p:nvSpPr>
         <p:spPr>
           <a:xfrm>
-            <a:off x="311700" y="445025"/>
-            <a:ext cx="8520600" cy="572700"/>
+            <a:off x="311700" y="433140"/>
+            <a:ext cx="8721768" cy="572700"/>
           </a:xfrm>
           <a:prstGeom prst="rect">
             <a:avLst/>
@@ -8654,6 +10461,12 @@
         <p:txBody>
           <a:bodyPr spcFirstLastPara="1" wrap="square" lIns="91425" tIns="91425" rIns="91425" bIns="91425" anchor="t" anchorCtr="0">
             <a:noAutofit/>
+            <a:scene3d>
+              <a:camera prst="obliqueTopLeft">
+                <a:rot lat="0" lon="0" rev="0"/>
+              </a:camera>
+              <a:lightRig rig="threePt" dir="t"/>
+            </a:scene3d>
           </a:bodyPr>
           <a:lstStyle/>
           <a:p>
@@ -8667,17 +10480,88 @@
               <a:buNone/>
             </a:pPr>
             <a:r>
-              <a:rPr lang="en"/>
+              <a:rPr lang="en" dirty="0">
+                <a:solidFill>
+                  <a:schemeClr val="bg1"/>
+                </a:solidFill>
+                <a:effectLst>
+                  <a:glow rad="139700">
+                    <a:schemeClr val="tx2">
+                      <a:alpha val="40000"/>
+                    </a:schemeClr>
+                  </a:glow>
+                </a:effectLst>
+                <a:latin typeface="Andale Mono" panose="020B0509000000000004" pitchFamily="49" charset="0"/>
+              </a:rPr>
               <a:t>Methods</a:t>
             </a:r>
-            <a:endParaRPr/>
+            <a:endParaRPr dirty="0">
+              <a:solidFill>
+                <a:schemeClr val="bg1"/>
+              </a:solidFill>
+              <a:effectLst>
+                <a:glow rad="139700">
+                  <a:schemeClr val="tx2">
+                    <a:alpha val="40000"/>
+                  </a:schemeClr>
+                </a:glow>
+              </a:effectLst>
+              <a:latin typeface="Andale Mono" panose="020B0509000000000004" pitchFamily="49" charset="0"/>
+            </a:endParaRPr>
           </a:p>
         </p:txBody>
       </p:sp>
+      <p:cxnSp>
+        <p:nvCxnSpPr>
+          <p:cNvPr id="5" name="Straight Connector 4">
+            <a:extLst>
+              <a:ext uri="{FF2B5EF4-FFF2-40B4-BE49-F238E27FC236}">
+                <a16:creationId xmlns:a16="http://schemas.microsoft.com/office/drawing/2014/main" id="{B9467874-3FEB-364F-AD86-5258FC6FB8CA}"/>
+              </a:ext>
+            </a:extLst>
+          </p:cNvPr>
+          <p:cNvCxnSpPr/>
+          <p:nvPr/>
+        </p:nvCxnSpPr>
+        <p:spPr>
+          <a:xfrm>
+            <a:off x="311700" y="1005840"/>
+            <a:ext cx="8520600" cy="0"/>
+          </a:xfrm>
+          <a:prstGeom prst="line">
+            <a:avLst/>
+          </a:prstGeom>
+          <a:ln>
+            <a:solidFill>
+              <a:schemeClr val="bg1"/>
+            </a:solidFill>
+          </a:ln>
+        </p:spPr>
+        <p:style>
+          <a:lnRef idx="1">
+            <a:schemeClr val="accent1"/>
+          </a:lnRef>
+          <a:fillRef idx="0">
+            <a:schemeClr val="accent1"/>
+          </a:fillRef>
+          <a:effectRef idx="0">
+            <a:schemeClr val="accent1"/>
+          </a:effectRef>
+          <a:fontRef idx="minor">
+            <a:schemeClr val="tx1"/>
+          </a:fontRef>
+        </p:style>
+      </p:cxnSp>
       <p:sp>
         <p:nvSpPr>
-          <p:cNvPr id="90" name="Google Shape;90;p18"/>
-          <p:cNvSpPr txBox="1">
+          <p:cNvPr id="3" name="Text Placeholder 2">
+            <a:extLst>
+              <a:ext uri="{FF2B5EF4-FFF2-40B4-BE49-F238E27FC236}">
+                <a16:creationId xmlns:a16="http://schemas.microsoft.com/office/drawing/2014/main" id="{450BC6C9-55BD-964D-978D-8144B7C339EA}"/>
+              </a:ext>
+            </a:extLst>
+          </p:cNvPr>
+          <p:cNvSpPr>
             <a:spLocks noGrp="1"/>
           </p:cNvSpPr>
           <p:nvPr>
@@ -8686,37 +10570,136 @@
         </p:nvSpPr>
         <p:spPr>
           <a:xfrm>
-            <a:off x="311700" y="1152475"/>
-            <a:ext cx="8520600" cy="3416400"/>
+            <a:off x="311700" y="1005839"/>
+            <a:ext cx="8520600" cy="3897077"/>
           </a:xfrm>
-          <a:prstGeom prst="rect">
-            <a:avLst/>
-          </a:prstGeom>
         </p:spPr>
         <p:txBody>
-          <a:bodyPr spcFirstLastPara="1" wrap="square" lIns="91425" tIns="91425" rIns="91425" bIns="91425" anchor="t" anchorCtr="0">
-            <a:noAutofit/>
-          </a:bodyPr>
+          <a:bodyPr/>
           <a:lstStyle/>
           <a:p>
-            <a:pPr marL="0" lvl="0" indent="0" algn="l" rtl="0">
-              <a:spcBef>
-                <a:spcPts val="0"/>
-              </a:spcBef>
-              <a:spcAft>
-                <a:spcPts val="1600"/>
-              </a:spcAft>
+            <a:pPr marL="114300" indent="0">
+              <a:buClr>
+                <a:schemeClr val="bg1"/>
+              </a:buClr>
               <a:buNone/>
             </a:pPr>
             <a:r>
-              <a:rPr lang="en"/>
-              <a:t>Describe the methods you used here. Can include data preparation, analysis, and/or modeling</a:t>
+              <a:rPr lang="en-US" sz="2000" dirty="0">
+                <a:solidFill>
+                  <a:schemeClr val="bg1"/>
+                </a:solidFill>
+                <a:latin typeface="Andale Mono" panose="020B0509000000000004" pitchFamily="49" charset="0"/>
+              </a:rPr>
+              <a:t>I have used data aggregation methods, statistics, and visualizations to isolate trends and to show what and who has been successful in the industry.</a:t>
             </a:r>
-            <a:endParaRPr/>
+          </a:p>
+          <a:p>
+            <a:pPr marL="114300" indent="0">
+              <a:buClr>
+                <a:schemeClr val="bg1"/>
+              </a:buClr>
+              <a:buNone/>
+            </a:pPr>
+            <a:endParaRPr lang="en-US" sz="2000" dirty="0">
+              <a:solidFill>
+                <a:schemeClr val="bg1"/>
+              </a:solidFill>
+              <a:latin typeface="Andale Mono" panose="020B0509000000000004" pitchFamily="49" charset="0"/>
+            </a:endParaRPr>
+          </a:p>
+          <a:p>
+            <a:pPr>
+              <a:buClr>
+                <a:schemeClr val="bg1"/>
+              </a:buClr>
+              <a:buFont typeface="+mj-lt"/>
+              <a:buAutoNum type="arabicPeriod"/>
+            </a:pPr>
+            <a:r>
+              <a:rPr lang="en-US" sz="1600" dirty="0">
+                <a:solidFill>
+                  <a:schemeClr val="bg1"/>
+                </a:solidFill>
+                <a:latin typeface="Andale Mono" panose="020B0509000000000004" pitchFamily="49" charset="0"/>
+              </a:rPr>
+              <a:t>I merged several datasets from different sources and extracted the relevant information.</a:t>
+            </a:r>
+          </a:p>
+          <a:p>
+            <a:pPr>
+              <a:buClr>
+                <a:schemeClr val="bg1"/>
+              </a:buClr>
+              <a:buFont typeface="+mj-lt"/>
+              <a:buAutoNum type="arabicPeriod"/>
+            </a:pPr>
+            <a:endParaRPr lang="en-US" sz="1600" dirty="0">
+              <a:solidFill>
+                <a:schemeClr val="bg1"/>
+              </a:solidFill>
+              <a:latin typeface="Andale Mono" panose="020B0509000000000004" pitchFamily="49" charset="0"/>
+            </a:endParaRPr>
+          </a:p>
+          <a:p>
+            <a:pPr>
+              <a:buClr>
+                <a:schemeClr val="bg1"/>
+              </a:buClr>
+              <a:buFont typeface="+mj-lt"/>
+              <a:buAutoNum type="arabicPeriod"/>
+            </a:pPr>
+            <a:r>
+              <a:rPr lang="en-US" sz="1600" dirty="0">
+                <a:solidFill>
+                  <a:schemeClr val="bg1"/>
+                </a:solidFill>
+                <a:latin typeface="Andale Mono" panose="020B0509000000000004" pitchFamily="49" charset="0"/>
+              </a:rPr>
+              <a:t>I then used comparative statistics, regression and correlation to analyze and model the data</a:t>
+            </a:r>
+          </a:p>
+          <a:p>
+            <a:pPr>
+              <a:buClr>
+                <a:schemeClr val="bg1"/>
+              </a:buClr>
+              <a:buFont typeface="+mj-lt"/>
+              <a:buAutoNum type="arabicPeriod"/>
+            </a:pPr>
+            <a:endParaRPr lang="en-US" sz="1600" dirty="0">
+              <a:solidFill>
+                <a:schemeClr val="bg1"/>
+              </a:solidFill>
+              <a:latin typeface="Andale Mono" panose="020B0509000000000004" pitchFamily="49" charset="0"/>
+            </a:endParaRPr>
+          </a:p>
+          <a:p>
+            <a:pPr>
+              <a:buClr>
+                <a:schemeClr val="bg1"/>
+              </a:buClr>
+              <a:buFont typeface="+mj-lt"/>
+              <a:buAutoNum type="arabicPeriod"/>
+            </a:pPr>
+            <a:r>
+              <a:rPr lang="en-US" sz="1600" dirty="0">
+                <a:solidFill>
+                  <a:schemeClr val="bg1"/>
+                </a:solidFill>
+                <a:latin typeface="Andale Mono" panose="020B0509000000000004" pitchFamily="49" charset="0"/>
+              </a:rPr>
+              <a:t>Finally, I used visualization methods to show the relevant information and the results of the analysis</a:t>
+            </a:r>
           </a:p>
         </p:txBody>
       </p:sp>
     </p:spTree>
+    <p:extLst>
+      <p:ext uri="{BB962C8B-B14F-4D97-AF65-F5344CB8AC3E}">
+        <p14:creationId xmlns:p14="http://schemas.microsoft.com/office/powerpoint/2010/main" val="2953210217"/>
+      </p:ext>
+    </p:extLst>
   </p:cSld>
   <p:clrMapOvr>
     <a:masterClrMapping/>
@@ -8727,9 +10710,17 @@
 <file path=ppt/slides/slide7.xml><?xml version="1.0" encoding="utf-8"?>
 <p:sld xmlns:a="http://schemas.openxmlformats.org/drawingml/2006/main" xmlns:r="http://schemas.openxmlformats.org/officeDocument/2006/relationships" xmlns:p="http://schemas.openxmlformats.org/presentationml/2006/main">
   <p:cSld>
+    <p:bg>
+      <p:bgPr>
+        <a:solidFill>
+          <a:schemeClr val="tx1"/>
+        </a:solidFill>
+        <a:effectLst/>
+      </p:bgPr>
+    </p:bg>
     <p:spTree>
       <p:nvGrpSpPr>
-        <p:cNvPr id="1" name="Shape 94"/>
+        <p:cNvPr id="1" name="Shape 76"/>
         <p:cNvGrpSpPr/>
         <p:nvPr/>
       </p:nvGrpSpPr>
@@ -8743,7 +10734,7 @@
       </p:grpSpPr>
       <p:sp>
         <p:nvSpPr>
-          <p:cNvPr id="95" name="Google Shape;95;p19"/>
+          <p:cNvPr id="77" name="Google Shape;77;p16"/>
           <p:cNvSpPr txBox="1">
             <a:spLocks noGrp="1"/>
           </p:cNvSpPr>
@@ -8753,8 +10744,8 @@
         </p:nvSpPr>
         <p:spPr>
           <a:xfrm>
-            <a:off x="311700" y="445025"/>
-            <a:ext cx="8520600" cy="572700"/>
+            <a:off x="311700" y="76088"/>
+            <a:ext cx="8721768" cy="572700"/>
           </a:xfrm>
           <a:prstGeom prst="rect">
             <a:avLst/>
@@ -8763,6 +10754,12 @@
         <p:txBody>
           <a:bodyPr spcFirstLastPara="1" wrap="square" lIns="91425" tIns="91425" rIns="91425" bIns="91425" anchor="t" anchorCtr="0">
             <a:noAutofit/>
+            <a:scene3d>
+              <a:camera prst="obliqueTopLeft">
+                <a:rot lat="0" lon="0" rev="0"/>
+              </a:camera>
+              <a:lightRig rig="threePt" dir="t"/>
+            </a:scene3d>
           </a:bodyPr>
           <a:lstStyle/>
           <a:p>
@@ -8776,17 +10773,90 @@
               <a:buNone/>
             </a:pPr>
             <a:r>
-              <a:rPr lang="en"/>
+              <a:rPr lang="en" dirty="0">
+                <a:solidFill>
+                  <a:schemeClr val="bg1"/>
+                </a:solidFill>
+                <a:effectLst>
+                  <a:glow rad="139700">
+                    <a:schemeClr val="tx2">
+                      <a:alpha val="40000"/>
+                    </a:schemeClr>
+                  </a:glow>
+                </a:effectLst>
+                <a:latin typeface="Andale Mono" panose="020B0509000000000004" pitchFamily="49" charset="0"/>
+              </a:rPr>
               <a:t>Results</a:t>
             </a:r>
-            <a:endParaRPr/>
+            <a:endParaRPr dirty="0">
+              <a:solidFill>
+                <a:schemeClr val="bg1"/>
+              </a:solidFill>
+              <a:effectLst>
+                <a:glow rad="139700">
+                  <a:schemeClr val="tx2">
+                    <a:alpha val="40000"/>
+                  </a:schemeClr>
+                </a:glow>
+              </a:effectLst>
+              <a:latin typeface="Andale Mono" panose="020B0509000000000004" pitchFamily="49" charset="0"/>
+            </a:endParaRPr>
           </a:p>
         </p:txBody>
       </p:sp>
+      <p:cxnSp>
+        <p:nvCxnSpPr>
+          <p:cNvPr id="5" name="Straight Connector 4">
+            <a:extLst>
+              <a:ext uri="{FF2B5EF4-FFF2-40B4-BE49-F238E27FC236}">
+                <a16:creationId xmlns:a16="http://schemas.microsoft.com/office/drawing/2014/main" id="{B9467874-3FEB-364F-AD86-5258FC6FB8CA}"/>
+              </a:ext>
+            </a:extLst>
+          </p:cNvPr>
+          <p:cNvCxnSpPr>
+            <a:cxnSpLocks/>
+          </p:cNvCxnSpPr>
+          <p:nvPr/>
+        </p:nvCxnSpPr>
+        <p:spPr>
+          <a:xfrm>
+            <a:off x="0" y="648788"/>
+            <a:ext cx="9144000" cy="26127"/>
+          </a:xfrm>
+          <a:prstGeom prst="line">
+            <a:avLst/>
+          </a:prstGeom>
+          <a:ln>
+            <a:solidFill>
+              <a:schemeClr val="bg1"/>
+            </a:solidFill>
+          </a:ln>
+        </p:spPr>
+        <p:style>
+          <a:lnRef idx="1">
+            <a:schemeClr val="accent1"/>
+          </a:lnRef>
+          <a:fillRef idx="0">
+            <a:schemeClr val="accent1"/>
+          </a:fillRef>
+          <a:effectRef idx="0">
+            <a:schemeClr val="accent1"/>
+          </a:effectRef>
+          <a:fontRef idx="minor">
+            <a:schemeClr val="tx1"/>
+          </a:fontRef>
+        </p:style>
+      </p:cxnSp>
       <p:sp>
         <p:nvSpPr>
-          <p:cNvPr id="96" name="Google Shape;96;p19"/>
-          <p:cNvSpPr txBox="1">
+          <p:cNvPr id="3" name="Text Placeholder 2">
+            <a:extLst>
+              <a:ext uri="{FF2B5EF4-FFF2-40B4-BE49-F238E27FC236}">
+                <a16:creationId xmlns:a16="http://schemas.microsoft.com/office/drawing/2014/main" id="{450BC6C9-55BD-964D-978D-8144B7C339EA}"/>
+              </a:ext>
+            </a:extLst>
+          </p:cNvPr>
+          <p:cNvSpPr>
             <a:spLocks noGrp="1"/>
           </p:cNvSpPr>
           <p:nvPr>
@@ -8795,37 +10865,156 @@
         </p:nvSpPr>
         <p:spPr>
           <a:xfrm>
-            <a:off x="311700" y="1152475"/>
-            <a:ext cx="8520600" cy="3416400"/>
+            <a:off x="0" y="674915"/>
+            <a:ext cx="3405051" cy="4323804"/>
+          </a:xfrm>
+        </p:spPr>
+        <p:txBody>
+          <a:bodyPr anchor="ctr"/>
+          <a:lstStyle/>
+          <a:p>
+            <a:pPr marL="114300" indent="0">
+              <a:buClr>
+                <a:schemeClr val="bg1"/>
+              </a:buClr>
+              <a:buNone/>
+            </a:pPr>
+            <a:r>
+              <a:rPr lang="en-US" sz="2400" u="sng" dirty="0">
+                <a:solidFill>
+                  <a:schemeClr val="bg1"/>
+                </a:solidFill>
+                <a:latin typeface="Andale Mono" panose="020B0509000000000004" pitchFamily="49" charset="0"/>
+              </a:rPr>
+              <a:t>POPULAR GENRES</a:t>
+            </a:r>
+          </a:p>
+          <a:p>
+            <a:pPr marL="114300" indent="0">
+              <a:buClr>
+                <a:schemeClr val="bg1"/>
+              </a:buClr>
+              <a:buNone/>
+            </a:pPr>
+            <a:endParaRPr lang="en-US" sz="1600" dirty="0">
+              <a:solidFill>
+                <a:schemeClr val="bg1"/>
+              </a:solidFill>
+              <a:latin typeface="Andale Mono" panose="020B0509000000000004" pitchFamily="49" charset="0"/>
+            </a:endParaRPr>
+          </a:p>
+          <a:p>
+            <a:pPr marL="114300" indent="0">
+              <a:buClr>
+                <a:schemeClr val="bg1"/>
+              </a:buClr>
+              <a:buNone/>
+            </a:pPr>
+            <a:r>
+              <a:rPr lang="en-US" sz="1600" dirty="0">
+                <a:solidFill>
+                  <a:schemeClr val="bg1"/>
+                </a:solidFill>
+                <a:latin typeface="Andale Mono" panose="020B0509000000000004" pitchFamily="49" charset="0"/>
+              </a:rPr>
+              <a:t>After comparing the average rating of movies and looking at the genres of these movies, we can see the highest rated and most popular genre is </a:t>
+            </a:r>
+            <a:r>
+              <a:rPr lang="en-US" sz="1600" b="1" u="sng" dirty="0">
+                <a:solidFill>
+                  <a:schemeClr val="bg1"/>
+                </a:solidFill>
+                <a:latin typeface="Andale Mono" panose="020B0509000000000004" pitchFamily="49" charset="0"/>
+              </a:rPr>
+              <a:t>Action</a:t>
+            </a:r>
+            <a:r>
+              <a:rPr lang="en-US" sz="1600" dirty="0">
+                <a:solidFill>
+                  <a:schemeClr val="bg1"/>
+                </a:solidFill>
+                <a:latin typeface="Andale Mono" panose="020B0509000000000004" pitchFamily="49" charset="0"/>
+              </a:rPr>
+              <a:t> by a wide margin.</a:t>
+            </a:r>
+          </a:p>
+          <a:p>
+            <a:pPr marL="114300" indent="0">
+              <a:buClr>
+                <a:schemeClr val="bg1"/>
+              </a:buClr>
+              <a:buNone/>
+            </a:pPr>
+            <a:endParaRPr lang="en-US" sz="1600" dirty="0">
+              <a:solidFill>
+                <a:schemeClr val="bg1"/>
+              </a:solidFill>
+              <a:latin typeface="Andale Mono" panose="020B0509000000000004" pitchFamily="49" charset="0"/>
+            </a:endParaRPr>
+          </a:p>
+          <a:p>
+            <a:pPr marL="114300" indent="0">
+              <a:buClr>
+                <a:schemeClr val="bg1"/>
+              </a:buClr>
+              <a:buNone/>
+            </a:pPr>
+            <a:r>
+              <a:rPr lang="en-US" sz="1600" dirty="0">
+                <a:solidFill>
+                  <a:schemeClr val="bg1"/>
+                </a:solidFill>
+                <a:latin typeface="Andale Mono" panose="020B0509000000000004" pitchFamily="49" charset="0"/>
+              </a:rPr>
+              <a:t>Other popular genres are </a:t>
+            </a:r>
+            <a:r>
+              <a:rPr lang="en-US" sz="1600" b="1" dirty="0">
+                <a:solidFill>
+                  <a:schemeClr val="bg1"/>
+                </a:solidFill>
+                <a:latin typeface="Andale Mono" panose="020B0509000000000004" pitchFamily="49" charset="0"/>
+              </a:rPr>
+              <a:t>Thriller, Documentary, Comedy, Drama, and Animation.</a:t>
+            </a:r>
+          </a:p>
+        </p:txBody>
+      </p:sp>
+      <p:pic>
+        <p:nvPicPr>
+          <p:cNvPr id="8" name="Picture 7" descr="Chart&#10;&#10;Description automatically generated with low confidence">
+            <a:extLst>
+              <a:ext uri="{FF2B5EF4-FFF2-40B4-BE49-F238E27FC236}">
+                <a16:creationId xmlns:a16="http://schemas.microsoft.com/office/drawing/2014/main" id="{B53915A4-9D2F-3E4B-988B-B07471F77C8E}"/>
+              </a:ext>
+            </a:extLst>
+          </p:cNvPr>
+          <p:cNvPicPr>
+            <a:picLocks noChangeAspect="1"/>
+          </p:cNvPicPr>
+          <p:nvPr/>
+        </p:nvPicPr>
+        <p:blipFill rotWithShape="1">
+          <a:blip r:embed="rId3"/>
+          <a:srcRect l="3496" t="4402" r="8800"/>
+          <a:stretch/>
+        </p:blipFill>
+        <p:spPr>
+          <a:xfrm>
+            <a:off x="3405051" y="701042"/>
+            <a:ext cx="5717179" cy="4300071"/>
           </a:xfrm>
           <a:prstGeom prst="rect">
             <a:avLst/>
           </a:prstGeom>
         </p:spPr>
-        <p:txBody>
-          <a:bodyPr spcFirstLastPara="1" wrap="square" lIns="91425" tIns="91425" rIns="91425" bIns="91425" anchor="t" anchorCtr="0">
-            <a:noAutofit/>
-          </a:bodyPr>
-          <a:lstStyle/>
-          <a:p>
-            <a:pPr marL="0" lvl="0" indent="0" algn="l" rtl="0">
-              <a:spcBef>
-                <a:spcPts val="0"/>
-              </a:spcBef>
-              <a:spcAft>
-                <a:spcPts val="1600"/>
-              </a:spcAft>
-              <a:buNone/>
-            </a:pPr>
-            <a:r>
-              <a:rPr lang="en"/>
-              <a:t>Present the results of your analysis or modeling here. Should include evaluation of how well your results solve the business problem.</a:t>
-            </a:r>
-            <a:endParaRPr/>
-          </a:p>
-        </p:txBody>
-      </p:sp>
+      </p:pic>
     </p:spTree>
+    <p:extLst>
+      <p:ext uri="{BB962C8B-B14F-4D97-AF65-F5344CB8AC3E}">
+        <p14:creationId xmlns:p14="http://schemas.microsoft.com/office/powerpoint/2010/main" val="2677708296"/>
+      </p:ext>
+    </p:extLst>
   </p:cSld>
   <p:clrMapOvr>
     <a:masterClrMapping/>
@@ -8836,9 +11025,17 @@
 <file path=ppt/slides/slide8.xml><?xml version="1.0" encoding="utf-8"?>
 <p:sld xmlns:a="http://schemas.openxmlformats.org/drawingml/2006/main" xmlns:r="http://schemas.openxmlformats.org/officeDocument/2006/relationships" xmlns:p="http://schemas.openxmlformats.org/presentationml/2006/main">
   <p:cSld>
+    <p:bg>
+      <p:bgPr>
+        <a:solidFill>
+          <a:schemeClr val="tx1"/>
+        </a:solidFill>
+        <a:effectLst/>
+      </p:bgPr>
+    </p:bg>
     <p:spTree>
       <p:nvGrpSpPr>
-        <p:cNvPr id="1" name="Shape 100"/>
+        <p:cNvPr id="1" name="Shape 76"/>
         <p:cNvGrpSpPr/>
         <p:nvPr/>
       </p:nvGrpSpPr>
@@ -8852,7 +11049,7 @@
       </p:grpSpPr>
       <p:sp>
         <p:nvSpPr>
-          <p:cNvPr id="101" name="Google Shape;101;p20"/>
+          <p:cNvPr id="77" name="Google Shape;77;p16"/>
           <p:cNvSpPr txBox="1">
             <a:spLocks noGrp="1"/>
           </p:cNvSpPr>
@@ -8862,8 +11059,8 @@
         </p:nvSpPr>
         <p:spPr>
           <a:xfrm>
-            <a:off x="311700" y="445025"/>
-            <a:ext cx="8520600" cy="572700"/>
+            <a:off x="311700" y="76088"/>
+            <a:ext cx="8721768" cy="572700"/>
           </a:xfrm>
           <a:prstGeom prst="rect">
             <a:avLst/>
@@ -8872,6 +11069,12 @@
         <p:txBody>
           <a:bodyPr spcFirstLastPara="1" wrap="square" lIns="91425" tIns="91425" rIns="91425" bIns="91425" anchor="t" anchorCtr="0">
             <a:noAutofit/>
+            <a:scene3d>
+              <a:camera prst="obliqueTopLeft">
+                <a:rot lat="0" lon="0" rev="0"/>
+              </a:camera>
+              <a:lightRig rig="threePt" dir="t"/>
+            </a:scene3d>
           </a:bodyPr>
           <a:lstStyle/>
           <a:p>
@@ -8885,17 +11088,90 @@
               <a:buNone/>
             </a:pPr>
             <a:r>
-              <a:rPr lang="en"/>
-              <a:t>Conclusions</a:t>
+              <a:rPr lang="en" dirty="0">
+                <a:solidFill>
+                  <a:schemeClr val="bg1"/>
+                </a:solidFill>
+                <a:effectLst>
+                  <a:glow rad="139700">
+                    <a:schemeClr val="tx2">
+                      <a:alpha val="40000"/>
+                    </a:schemeClr>
+                  </a:glow>
+                </a:effectLst>
+                <a:latin typeface="Andale Mono" panose="020B0509000000000004" pitchFamily="49" charset="0"/>
+              </a:rPr>
+              <a:t>Results</a:t>
             </a:r>
-            <a:endParaRPr/>
+            <a:endParaRPr dirty="0">
+              <a:solidFill>
+                <a:schemeClr val="bg1"/>
+              </a:solidFill>
+              <a:effectLst>
+                <a:glow rad="139700">
+                  <a:schemeClr val="tx2">
+                    <a:alpha val="40000"/>
+                  </a:schemeClr>
+                </a:glow>
+              </a:effectLst>
+              <a:latin typeface="Andale Mono" panose="020B0509000000000004" pitchFamily="49" charset="0"/>
+            </a:endParaRPr>
           </a:p>
         </p:txBody>
       </p:sp>
+      <p:cxnSp>
+        <p:nvCxnSpPr>
+          <p:cNvPr id="5" name="Straight Connector 4">
+            <a:extLst>
+              <a:ext uri="{FF2B5EF4-FFF2-40B4-BE49-F238E27FC236}">
+                <a16:creationId xmlns:a16="http://schemas.microsoft.com/office/drawing/2014/main" id="{B9467874-3FEB-364F-AD86-5258FC6FB8CA}"/>
+              </a:ext>
+            </a:extLst>
+          </p:cNvPr>
+          <p:cNvCxnSpPr>
+            <a:cxnSpLocks/>
+          </p:cNvCxnSpPr>
+          <p:nvPr/>
+        </p:nvCxnSpPr>
+        <p:spPr>
+          <a:xfrm>
+            <a:off x="0" y="648788"/>
+            <a:ext cx="9144000" cy="26127"/>
+          </a:xfrm>
+          <a:prstGeom prst="line">
+            <a:avLst/>
+          </a:prstGeom>
+          <a:ln>
+            <a:solidFill>
+              <a:schemeClr val="bg1"/>
+            </a:solidFill>
+          </a:ln>
+        </p:spPr>
+        <p:style>
+          <a:lnRef idx="1">
+            <a:schemeClr val="accent1"/>
+          </a:lnRef>
+          <a:fillRef idx="0">
+            <a:schemeClr val="accent1"/>
+          </a:fillRef>
+          <a:effectRef idx="0">
+            <a:schemeClr val="accent1"/>
+          </a:effectRef>
+          <a:fontRef idx="minor">
+            <a:schemeClr val="tx1"/>
+          </a:fontRef>
+        </p:style>
+      </p:cxnSp>
       <p:sp>
         <p:nvSpPr>
-          <p:cNvPr id="102" name="Google Shape;102;p20"/>
-          <p:cNvSpPr txBox="1">
+          <p:cNvPr id="3" name="Text Placeholder 2">
+            <a:extLst>
+              <a:ext uri="{FF2B5EF4-FFF2-40B4-BE49-F238E27FC236}">
+                <a16:creationId xmlns:a16="http://schemas.microsoft.com/office/drawing/2014/main" id="{450BC6C9-55BD-964D-978D-8144B7C339EA}"/>
+              </a:ext>
+            </a:extLst>
+          </p:cNvPr>
+          <p:cNvSpPr>
             <a:spLocks noGrp="1"/>
           </p:cNvSpPr>
           <p:nvPr>
@@ -8904,37 +11180,196 @@
         </p:nvSpPr>
         <p:spPr>
           <a:xfrm>
-            <a:off x="311700" y="1152475"/>
-            <a:ext cx="8520600" cy="3416400"/>
+            <a:off x="0" y="674915"/>
+            <a:ext cx="3358913" cy="4323804"/>
+          </a:xfrm>
+        </p:spPr>
+        <p:txBody>
+          <a:bodyPr anchor="ctr"/>
+          <a:lstStyle/>
+          <a:p>
+            <a:pPr marL="114300" indent="0">
+              <a:buClr>
+                <a:schemeClr val="bg1"/>
+              </a:buClr>
+              <a:buNone/>
+            </a:pPr>
+            <a:r>
+              <a:rPr lang="en-US" sz="2000" u="sng" dirty="0">
+                <a:solidFill>
+                  <a:schemeClr val="bg1"/>
+                </a:solidFill>
+                <a:latin typeface="Andale Mono" panose="020B0509000000000004" pitchFamily="49" charset="0"/>
+              </a:rPr>
+              <a:t>Profitable Movies</a:t>
+            </a:r>
+          </a:p>
+          <a:p>
+            <a:pPr marL="114300" indent="0">
+              <a:buClr>
+                <a:schemeClr val="bg1"/>
+              </a:buClr>
+              <a:buNone/>
+            </a:pPr>
+            <a:endParaRPr lang="en-US" sz="1200" dirty="0">
+              <a:solidFill>
+                <a:schemeClr val="bg1"/>
+              </a:solidFill>
+              <a:latin typeface="Andale Mono" panose="020B0509000000000004" pitchFamily="49" charset="0"/>
+            </a:endParaRPr>
+          </a:p>
+          <a:p>
+            <a:pPr marL="114300" indent="0">
+              <a:buClr>
+                <a:schemeClr val="bg1"/>
+              </a:buClr>
+              <a:buNone/>
+            </a:pPr>
+            <a:r>
+              <a:rPr lang="en-US" sz="1200" dirty="0">
+                <a:solidFill>
+                  <a:schemeClr val="bg1"/>
+                </a:solidFill>
+                <a:latin typeface="Andale Mono" panose="020B0509000000000004" pitchFamily="49" charset="0"/>
+              </a:rPr>
+              <a:t>Taking the domestic box office gross of the top 30 movies from the last decade, and comparing this to their budget, we can see the most profitable movies</a:t>
+            </a:r>
+          </a:p>
+          <a:p>
+            <a:pPr marL="114300" indent="0">
+              <a:buClr>
+                <a:schemeClr val="bg1"/>
+              </a:buClr>
+              <a:buNone/>
+            </a:pPr>
+            <a:endParaRPr lang="en-US" sz="1200" dirty="0">
+              <a:solidFill>
+                <a:schemeClr val="bg1"/>
+              </a:solidFill>
+              <a:latin typeface="Andale Mono" panose="020B0509000000000004" pitchFamily="49" charset="0"/>
+            </a:endParaRPr>
+          </a:p>
+          <a:p>
+            <a:pPr>
+              <a:lnSpc>
+                <a:spcPct val="100000"/>
+              </a:lnSpc>
+              <a:buClr>
+                <a:schemeClr val="bg1"/>
+              </a:buClr>
+              <a:buSzPct val="75000"/>
+            </a:pPr>
+            <a:r>
+              <a:rPr lang="en-US" sz="1200" dirty="0">
+                <a:solidFill>
+                  <a:schemeClr val="bg1"/>
+                </a:solidFill>
+                <a:latin typeface="Andale Mono" panose="020B0509000000000004" pitchFamily="49" charset="0"/>
+              </a:rPr>
+              <a:t>18 were in the action genre, all but </a:t>
+            </a:r>
+          </a:p>
+          <a:p>
+            <a:pPr lvl="1">
+              <a:lnSpc>
+                <a:spcPct val="100000"/>
+              </a:lnSpc>
+              <a:buClr>
+                <a:schemeClr val="bg1"/>
+              </a:buClr>
+              <a:buSzPct val="75000"/>
+            </a:pPr>
+            <a:r>
+              <a:rPr lang="en-US" sz="1200" dirty="0">
+                <a:solidFill>
+                  <a:schemeClr val="bg1"/>
+                </a:solidFill>
+                <a:latin typeface="Andale Mono" panose="020B0509000000000004" pitchFamily="49" charset="0"/>
+              </a:rPr>
+              <a:t>All but 1 were part of a franchise</a:t>
+            </a:r>
+          </a:p>
+          <a:p>
+            <a:pPr lvl="1">
+              <a:lnSpc>
+                <a:spcPct val="100000"/>
+              </a:lnSpc>
+              <a:buClr>
+                <a:schemeClr val="bg1"/>
+              </a:buClr>
+              <a:buSzPct val="75000"/>
+            </a:pPr>
+            <a:r>
+              <a:rPr lang="en-US" sz="1200" dirty="0">
+                <a:solidFill>
+                  <a:schemeClr val="bg1"/>
+                </a:solidFill>
+                <a:latin typeface="Andale Mono" panose="020B0509000000000004" pitchFamily="49" charset="0"/>
+              </a:rPr>
+              <a:t>10 of these were super-hero / comic book movies</a:t>
+            </a:r>
+          </a:p>
+          <a:p>
+            <a:pPr>
+              <a:lnSpc>
+                <a:spcPct val="100000"/>
+              </a:lnSpc>
+              <a:spcBef>
+                <a:spcPts val="1200"/>
+              </a:spcBef>
+              <a:buClr>
+                <a:schemeClr val="bg1"/>
+              </a:buClr>
+              <a:buSzPct val="75000"/>
+            </a:pPr>
+            <a:r>
+              <a:rPr lang="en-US" sz="1200" dirty="0">
+                <a:solidFill>
+                  <a:schemeClr val="bg1"/>
+                </a:solidFill>
+                <a:latin typeface="Andale Mono" panose="020B0509000000000004" pitchFamily="49" charset="0"/>
+              </a:rPr>
+              <a:t>12 were in the animation genre</a:t>
+            </a:r>
+          </a:p>
+        </p:txBody>
+      </p:sp>
+      <p:pic>
+        <p:nvPicPr>
+          <p:cNvPr id="11" name="Picture 10" descr="Chart&#10;&#10;Description automatically generated">
+            <a:extLst>
+              <a:ext uri="{FF2B5EF4-FFF2-40B4-BE49-F238E27FC236}">
+                <a16:creationId xmlns:a16="http://schemas.microsoft.com/office/drawing/2014/main" id="{B01C34E2-A8CB-974E-9529-B3A95EBDCB29}"/>
+              </a:ext>
+            </a:extLst>
+          </p:cNvPr>
+          <p:cNvPicPr>
+            <a:picLocks noChangeAspect="1"/>
+          </p:cNvPicPr>
+          <p:nvPr/>
+        </p:nvPicPr>
+        <p:blipFill>
+          <a:blip r:embed="rId3"/>
+          <a:stretch>
+            <a:fillRect/>
+          </a:stretch>
+        </p:blipFill>
+        <p:spPr>
+          <a:xfrm>
+            <a:off x="3405051" y="722880"/>
+            <a:ext cx="5674555" cy="4275835"/>
           </a:xfrm>
           <a:prstGeom prst="rect">
             <a:avLst/>
           </a:prstGeom>
         </p:spPr>
-        <p:txBody>
-          <a:bodyPr spcFirstLastPara="1" wrap="square" lIns="91425" tIns="91425" rIns="91425" bIns="91425" anchor="t" anchorCtr="0">
-            <a:noAutofit/>
-          </a:bodyPr>
-          <a:lstStyle/>
-          <a:p>
-            <a:pPr marL="0" lvl="0" indent="0" algn="l" rtl="0">
-              <a:spcBef>
-                <a:spcPts val="0"/>
-              </a:spcBef>
-              <a:spcAft>
-                <a:spcPts val="1600"/>
-              </a:spcAft>
-              <a:buNone/>
-            </a:pPr>
-            <a:r>
-              <a:rPr lang="en"/>
-              <a:t>Present your conclusions about the project here. Can include business recommendations, project limitations, and/or future improvement ideas</a:t>
-            </a:r>
-            <a:endParaRPr/>
-          </a:p>
-        </p:txBody>
-      </p:sp>
+      </p:pic>
     </p:spTree>
+    <p:extLst>
+      <p:ext uri="{BB962C8B-B14F-4D97-AF65-F5344CB8AC3E}">
+        <p14:creationId xmlns:p14="http://schemas.microsoft.com/office/powerpoint/2010/main" val="2420822166"/>
+      </p:ext>
+    </p:extLst>
   </p:cSld>
   <p:clrMapOvr>
     <a:masterClrMapping/>
@@ -8945,9 +11380,17 @@
 <file path=ppt/slides/slide9.xml><?xml version="1.0" encoding="utf-8"?>
 <p:sld xmlns:a="http://schemas.openxmlformats.org/drawingml/2006/main" xmlns:r="http://schemas.openxmlformats.org/officeDocument/2006/relationships" xmlns:p="http://schemas.openxmlformats.org/presentationml/2006/main">
   <p:cSld>
+    <p:bg>
+      <p:bgPr>
+        <a:solidFill>
+          <a:schemeClr val="tx1"/>
+        </a:solidFill>
+        <a:effectLst/>
+      </p:bgPr>
+    </p:bg>
     <p:spTree>
       <p:nvGrpSpPr>
-        <p:cNvPr id="1" name="Shape 106"/>
+        <p:cNvPr id="1" name="Shape 76"/>
         <p:cNvGrpSpPr/>
         <p:nvPr/>
       </p:nvGrpSpPr>
@@ -8961,7 +11404,7 @@
       </p:grpSpPr>
       <p:sp>
         <p:nvSpPr>
-          <p:cNvPr id="107" name="Google Shape;107;p21"/>
+          <p:cNvPr id="77" name="Google Shape;77;p16"/>
           <p:cNvSpPr txBox="1">
             <a:spLocks noGrp="1"/>
           </p:cNvSpPr>
@@ -8971,16 +11414,22 @@
         </p:nvSpPr>
         <p:spPr>
           <a:xfrm>
-            <a:off x="490250" y="526350"/>
-            <a:ext cx="7715400" cy="4090800"/>
+            <a:off x="311700" y="76088"/>
+            <a:ext cx="8721768" cy="572700"/>
           </a:xfrm>
           <a:prstGeom prst="rect">
             <a:avLst/>
           </a:prstGeom>
         </p:spPr>
         <p:txBody>
-          <a:bodyPr spcFirstLastPara="1" wrap="square" lIns="91425" tIns="91425" rIns="91425" bIns="91425" anchor="ctr" anchorCtr="0">
+          <a:bodyPr spcFirstLastPara="1" wrap="square" lIns="91425" tIns="91425" rIns="91425" bIns="91425" anchor="t" anchorCtr="0">
             <a:noAutofit/>
+            <a:scene3d>
+              <a:camera prst="obliqueTopLeft">
+                <a:rot lat="0" lon="0" rev="0"/>
+              </a:camera>
+              <a:lightRig rig="threePt" dir="t"/>
+            </a:scene3d>
           </a:bodyPr>
           <a:lstStyle/>
           <a:p>
@@ -8994,104 +11443,361 @@
               <a:buNone/>
             </a:pPr>
             <a:r>
-              <a:rPr lang="en"/>
-              <a:t>Thank You!</a:t>
+              <a:rPr lang="en" dirty="0">
+                <a:solidFill>
+                  <a:schemeClr val="bg1"/>
+                </a:solidFill>
+                <a:effectLst>
+                  <a:glow rad="139700">
+                    <a:schemeClr val="tx2">
+                      <a:alpha val="40000"/>
+                    </a:schemeClr>
+                  </a:glow>
+                </a:effectLst>
+                <a:latin typeface="Andale Mono" panose="020B0509000000000004" pitchFamily="49" charset="0"/>
+              </a:rPr>
+              <a:t>Results</a:t>
             </a:r>
-            <a:endParaRPr/>
-          </a:p>
-          <a:p>
-            <a:pPr marL="0" lvl="0" indent="0" algn="l" rtl="0">
-              <a:spcBef>
-                <a:spcPts val="0"/>
-              </a:spcBef>
-              <a:spcAft>
-                <a:spcPts val="0"/>
-              </a:spcAft>
-              <a:buNone/>
-            </a:pPr>
-            <a:endParaRPr sz="2000" b="1"/>
-          </a:p>
-          <a:p>
-            <a:pPr marL="0" lvl="0" indent="0" algn="l" rtl="0">
-              <a:spcBef>
-                <a:spcPts val="0"/>
-              </a:spcBef>
-              <a:spcAft>
-                <a:spcPts val="0"/>
-              </a:spcAft>
-              <a:buNone/>
-            </a:pPr>
-            <a:r>
-              <a:rPr lang="en" sz="2000" b="1"/>
-              <a:t>Email:</a:t>
-            </a:r>
-            <a:r>
-              <a:rPr lang="en" sz="2000"/>
-              <a:t> </a:t>
-            </a:r>
-            <a:r>
-              <a:rPr lang="en" sz="2000" u="sng">
-                <a:solidFill>
-                  <a:schemeClr val="hlink"/>
-                </a:solidFill>
-                <a:hlinkClick r:id="rId3"/>
-              </a:rPr>
-              <a:t>youremail@email.com</a:t>
-            </a:r>
-            <a:endParaRPr sz="2000"/>
-          </a:p>
-          <a:p>
-            <a:pPr marL="0" lvl="0" indent="0" algn="l" rtl="0">
-              <a:spcBef>
-                <a:spcPts val="0"/>
-              </a:spcBef>
-              <a:spcAft>
-                <a:spcPts val="0"/>
-              </a:spcAft>
-              <a:buNone/>
-            </a:pPr>
-            <a:r>
-              <a:rPr lang="en" sz="2000" b="1"/>
-              <a:t>GitHub:</a:t>
-            </a:r>
-            <a:r>
-              <a:rPr lang="en" sz="2000"/>
-              <a:t> @username</a:t>
-            </a:r>
-            <a:endParaRPr sz="2000"/>
-          </a:p>
-          <a:p>
-            <a:pPr marL="0" lvl="0" indent="0" algn="l" rtl="0">
-              <a:spcBef>
-                <a:spcPts val="0"/>
-              </a:spcBef>
-              <a:spcAft>
-                <a:spcPts val="0"/>
-              </a:spcAft>
-              <a:buNone/>
-            </a:pPr>
-            <a:r>
-              <a:rPr lang="en" sz="2000" b="1"/>
-              <a:t>LinkedIn:</a:t>
-            </a:r>
-            <a:r>
-              <a:rPr lang="en" sz="2000"/>
-              <a:t> </a:t>
-            </a:r>
-            <a:r>
-              <a:rPr lang="en" sz="2000" u="sng">
-                <a:solidFill>
-                  <a:schemeClr val="hlink"/>
-                </a:solidFill>
-                <a:hlinkClick r:id="rId4"/>
-              </a:rPr>
-              <a:t>linkedin.com/in/username/</a:t>
-            </a:r>
-            <a:endParaRPr sz="2000"/>
+            <a:endParaRPr dirty="0">
+              <a:solidFill>
+                <a:schemeClr val="bg1"/>
+              </a:solidFill>
+              <a:effectLst>
+                <a:glow rad="139700">
+                  <a:schemeClr val="tx2">
+                    <a:alpha val="40000"/>
+                  </a:schemeClr>
+                </a:glow>
+              </a:effectLst>
+              <a:latin typeface="Andale Mono" panose="020B0509000000000004" pitchFamily="49" charset="0"/>
+            </a:endParaRPr>
           </a:p>
         </p:txBody>
       </p:sp>
+      <p:cxnSp>
+        <p:nvCxnSpPr>
+          <p:cNvPr id="5" name="Straight Connector 4">
+            <a:extLst>
+              <a:ext uri="{FF2B5EF4-FFF2-40B4-BE49-F238E27FC236}">
+                <a16:creationId xmlns:a16="http://schemas.microsoft.com/office/drawing/2014/main" id="{B9467874-3FEB-364F-AD86-5258FC6FB8CA}"/>
+              </a:ext>
+            </a:extLst>
+          </p:cNvPr>
+          <p:cNvCxnSpPr>
+            <a:cxnSpLocks/>
+          </p:cNvCxnSpPr>
+          <p:nvPr/>
+        </p:nvCxnSpPr>
+        <p:spPr>
+          <a:xfrm>
+            <a:off x="0" y="648788"/>
+            <a:ext cx="9144000" cy="26127"/>
+          </a:xfrm>
+          <a:prstGeom prst="line">
+            <a:avLst/>
+          </a:prstGeom>
+          <a:ln>
+            <a:solidFill>
+              <a:schemeClr val="bg1"/>
+            </a:solidFill>
+          </a:ln>
+        </p:spPr>
+        <p:style>
+          <a:lnRef idx="1">
+            <a:schemeClr val="accent1"/>
+          </a:lnRef>
+          <a:fillRef idx="0">
+            <a:schemeClr val="accent1"/>
+          </a:fillRef>
+          <a:effectRef idx="0">
+            <a:schemeClr val="accent1"/>
+          </a:effectRef>
+          <a:fontRef idx="minor">
+            <a:schemeClr val="tx1"/>
+          </a:fontRef>
+        </p:style>
+      </p:cxnSp>
+      <p:sp>
+        <p:nvSpPr>
+          <p:cNvPr id="3" name="Text Placeholder 2">
+            <a:extLst>
+              <a:ext uri="{FF2B5EF4-FFF2-40B4-BE49-F238E27FC236}">
+                <a16:creationId xmlns:a16="http://schemas.microsoft.com/office/drawing/2014/main" id="{450BC6C9-55BD-964D-978D-8144B7C339EA}"/>
+              </a:ext>
+            </a:extLst>
+          </p:cNvPr>
+          <p:cNvSpPr>
+            <a:spLocks noGrp="1"/>
+          </p:cNvSpPr>
+          <p:nvPr>
+            <p:ph type="body" idx="1"/>
+          </p:nvPr>
+        </p:nvSpPr>
+        <p:spPr>
+          <a:xfrm>
+            <a:off x="0" y="674915"/>
+            <a:ext cx="3358913" cy="4323804"/>
+          </a:xfrm>
+        </p:spPr>
+        <p:txBody>
+          <a:bodyPr anchor="ctr"/>
+          <a:lstStyle/>
+          <a:p>
+            <a:pPr marL="114300" indent="0">
+              <a:buClr>
+                <a:schemeClr val="bg1"/>
+              </a:buClr>
+              <a:buNone/>
+            </a:pPr>
+            <a:r>
+              <a:rPr lang="en-US" sz="2000" u="sng" dirty="0" err="1">
+                <a:solidFill>
+                  <a:schemeClr val="bg1"/>
+                </a:solidFill>
+                <a:latin typeface="Andale Mono" panose="020B0509000000000004" pitchFamily="49" charset="0"/>
+              </a:rPr>
+              <a:t>Pupularity</a:t>
+            </a:r>
+            <a:endParaRPr lang="en-US" sz="2000" u="sng" dirty="0">
+              <a:solidFill>
+                <a:schemeClr val="bg1"/>
+              </a:solidFill>
+              <a:latin typeface="Andale Mono" panose="020B0509000000000004" pitchFamily="49" charset="0"/>
+            </a:endParaRPr>
+          </a:p>
+          <a:p>
+            <a:pPr marL="114300" indent="0">
+              <a:buClr>
+                <a:schemeClr val="bg1"/>
+              </a:buClr>
+              <a:buNone/>
+            </a:pPr>
+            <a:endParaRPr lang="en-US" sz="1200" dirty="0">
+              <a:solidFill>
+                <a:schemeClr val="bg1"/>
+              </a:solidFill>
+              <a:latin typeface="Andale Mono" panose="020B0509000000000004" pitchFamily="49" charset="0"/>
+            </a:endParaRPr>
+          </a:p>
+          <a:p>
+            <a:pPr marL="114300" indent="0">
+              <a:buClr>
+                <a:schemeClr val="bg1"/>
+              </a:buClr>
+              <a:buNone/>
+            </a:pPr>
+            <a:r>
+              <a:rPr lang="en-US" sz="1200" dirty="0">
+                <a:solidFill>
+                  <a:schemeClr val="bg1"/>
+                </a:solidFill>
+                <a:latin typeface="Andale Mono" panose="020B0509000000000004" pitchFamily="49" charset="0"/>
+              </a:rPr>
+              <a:t>Looking at the popularity scores of the top 30 movies from the last decade</a:t>
+            </a:r>
+          </a:p>
+          <a:p>
+            <a:pPr marL="114300" indent="0">
+              <a:buClr>
+                <a:schemeClr val="bg1"/>
+              </a:buClr>
+              <a:buNone/>
+            </a:pPr>
+            <a:endParaRPr lang="en-US" sz="1200" dirty="0">
+              <a:solidFill>
+                <a:schemeClr val="bg1"/>
+              </a:solidFill>
+              <a:latin typeface="Andale Mono" panose="020B0509000000000004" pitchFamily="49" charset="0"/>
+            </a:endParaRPr>
+          </a:p>
+          <a:p>
+            <a:pPr>
+              <a:lnSpc>
+                <a:spcPct val="100000"/>
+              </a:lnSpc>
+              <a:buClr>
+                <a:schemeClr val="bg1"/>
+              </a:buClr>
+              <a:buSzPct val="75000"/>
+            </a:pPr>
+            <a:r>
+              <a:rPr lang="en-US" sz="1200" dirty="0">
+                <a:solidFill>
+                  <a:schemeClr val="bg1"/>
+                </a:solidFill>
+                <a:latin typeface="Andale Mono" panose="020B0509000000000004" pitchFamily="49" charset="0"/>
+              </a:rPr>
+              <a:t>22 were in the action genre, All but 1 were part of a franchise</a:t>
+            </a:r>
+          </a:p>
+          <a:p>
+            <a:pPr marL="114300" indent="0">
+              <a:lnSpc>
+                <a:spcPct val="100000"/>
+              </a:lnSpc>
+              <a:buClr>
+                <a:schemeClr val="bg1"/>
+              </a:buClr>
+              <a:buSzPct val="75000"/>
+              <a:buNone/>
+            </a:pPr>
+            <a:endParaRPr lang="en-US" sz="1200" dirty="0">
+              <a:solidFill>
+                <a:schemeClr val="bg1"/>
+              </a:solidFill>
+              <a:latin typeface="Andale Mono" panose="020B0509000000000004" pitchFamily="49" charset="0"/>
+            </a:endParaRPr>
+          </a:p>
+          <a:p>
+            <a:pPr>
+              <a:lnSpc>
+                <a:spcPct val="100000"/>
+              </a:lnSpc>
+              <a:buClr>
+                <a:schemeClr val="bg1"/>
+              </a:buClr>
+              <a:buSzPct val="75000"/>
+            </a:pPr>
+            <a:r>
+              <a:rPr lang="en-US" sz="1200" dirty="0">
+                <a:solidFill>
+                  <a:schemeClr val="bg1"/>
+                </a:solidFill>
+                <a:latin typeface="Andale Mono" panose="020B0509000000000004" pitchFamily="49" charset="0"/>
+              </a:rPr>
+              <a:t>16 were super-hero / comic book movies</a:t>
+            </a:r>
+          </a:p>
+          <a:p>
+            <a:pPr lvl="1">
+              <a:lnSpc>
+                <a:spcPct val="100000"/>
+              </a:lnSpc>
+              <a:spcBef>
+                <a:spcPts val="400"/>
+              </a:spcBef>
+              <a:buClr>
+                <a:schemeClr val="bg1"/>
+              </a:buClr>
+              <a:buSzPct val="75000"/>
+            </a:pPr>
+            <a:r>
+              <a:rPr lang="en-US" sz="1200" dirty="0">
+                <a:solidFill>
+                  <a:schemeClr val="bg1"/>
+                </a:solidFill>
+                <a:latin typeface="Andale Mono" panose="020B0509000000000004" pitchFamily="49" charset="0"/>
+              </a:rPr>
+              <a:t>All part of franchises</a:t>
+            </a:r>
+          </a:p>
+          <a:p>
+            <a:pPr>
+              <a:lnSpc>
+                <a:spcPct val="100000"/>
+              </a:lnSpc>
+              <a:spcBef>
+                <a:spcPts val="1200"/>
+              </a:spcBef>
+              <a:buClr>
+                <a:schemeClr val="bg1"/>
+              </a:buClr>
+              <a:buSzPct val="75000"/>
+            </a:pPr>
+            <a:r>
+              <a:rPr lang="en-US" sz="1200" dirty="0">
+                <a:solidFill>
+                  <a:schemeClr val="bg1"/>
+                </a:solidFill>
+                <a:latin typeface="Andale Mono" panose="020B0509000000000004" pitchFamily="49" charset="0"/>
+              </a:rPr>
+              <a:t>3 were animation</a:t>
+            </a:r>
+          </a:p>
+          <a:p>
+            <a:pPr>
+              <a:lnSpc>
+                <a:spcPct val="100000"/>
+              </a:lnSpc>
+              <a:spcBef>
+                <a:spcPts val="1200"/>
+              </a:spcBef>
+              <a:buClr>
+                <a:schemeClr val="bg1"/>
+              </a:buClr>
+              <a:buSzPct val="75000"/>
+            </a:pPr>
+            <a:r>
+              <a:rPr lang="en-US" sz="1200" dirty="0">
+                <a:solidFill>
+                  <a:schemeClr val="bg1"/>
+                </a:solidFill>
+                <a:latin typeface="Andale Mono" panose="020B0509000000000004" pitchFamily="49" charset="0"/>
+              </a:rPr>
+              <a:t>3 were drama</a:t>
+            </a:r>
+          </a:p>
+          <a:p>
+            <a:pPr>
+              <a:lnSpc>
+                <a:spcPct val="100000"/>
+              </a:lnSpc>
+              <a:spcBef>
+                <a:spcPts val="1200"/>
+              </a:spcBef>
+              <a:buClr>
+                <a:schemeClr val="bg1"/>
+              </a:buClr>
+              <a:buSzPct val="75000"/>
+            </a:pPr>
+            <a:r>
+              <a:rPr lang="en-US" sz="1200" dirty="0">
+                <a:solidFill>
+                  <a:schemeClr val="bg1"/>
+                </a:solidFill>
+                <a:latin typeface="Andale Mono" panose="020B0509000000000004" pitchFamily="49" charset="0"/>
+              </a:rPr>
+              <a:t>2 were fantasy franchises</a:t>
+            </a:r>
+          </a:p>
+        </p:txBody>
+      </p:sp>
+      <p:pic>
+        <p:nvPicPr>
+          <p:cNvPr id="11" name="Picture 10" descr="A picture containing chart&#10;&#10;Description automatically generated">
+            <a:extLst>
+              <a:ext uri="{FF2B5EF4-FFF2-40B4-BE49-F238E27FC236}">
+                <a16:creationId xmlns:a16="http://schemas.microsoft.com/office/drawing/2014/main" id="{9067F133-AE5A-3E40-AE74-15CEECE168D7}"/>
+              </a:ext>
+            </a:extLst>
+          </p:cNvPr>
+          <p:cNvPicPr>
+            <a:picLocks noChangeAspect="1"/>
+          </p:cNvPicPr>
+          <p:nvPr/>
+        </p:nvPicPr>
+        <p:blipFill>
+          <a:blip r:embed="rId3"/>
+          <a:stretch>
+            <a:fillRect/>
+          </a:stretch>
+        </p:blipFill>
+        <p:spPr>
+          <a:xfrm>
+            <a:off x="3405051" y="722880"/>
+            <a:ext cx="5674555" cy="4275835"/>
+          </a:xfrm>
+          <a:prstGeom prst="rect">
+            <a:avLst/>
+          </a:prstGeom>
+        </p:spPr>
+      </p:pic>
     </p:spTree>
+    <p:extLst>
+      <p:ext uri="{BB962C8B-B14F-4D97-AF65-F5344CB8AC3E}">
+        <p14:creationId xmlns:p14="http://schemas.microsoft.com/office/powerpoint/2010/main" val="53036772"/>
+      </p:ext>
+    </p:extLst>
   </p:cSld>
   <p:clrMapOvr>
     <a:masterClrMapping/>

</xml_diff>

<commit_message>
finalized slides, cleaned up the final notebook, and finalized visualizations
</commit_message>
<xml_diff>
--- a/Slide Deck.pptx
+++ b/Slide Deck.pptx
@@ -5,7 +5,7 @@
     <p:sldMasterId id="2147483659" r:id="rId1"/>
   </p:sldMasterIdLst>
   <p:notesMasterIdLst>
-    <p:notesMasterId r:id="rId16"/>
+    <p:notesMasterId r:id="rId18"/>
   </p:notesMasterIdLst>
   <p:sldIdLst>
     <p:sldId id="256" r:id="rId2"/>
@@ -19,23 +19,25 @@
     <p:sldId id="271" r:id="rId10"/>
     <p:sldId id="272" r:id="rId11"/>
     <p:sldId id="273" r:id="rId12"/>
-    <p:sldId id="274" r:id="rId13"/>
-    <p:sldId id="275" r:id="rId14"/>
-    <p:sldId id="264" r:id="rId15"/>
+    <p:sldId id="276" r:id="rId13"/>
+    <p:sldId id="274" r:id="rId14"/>
+    <p:sldId id="275" r:id="rId15"/>
+    <p:sldId id="278" r:id="rId16"/>
+    <p:sldId id="277" r:id="rId17"/>
   </p:sldIdLst>
   <p:sldSz cx="9144000" cy="5143500" type="screen16x9"/>
   <p:notesSz cx="6858000" cy="9144000"/>
   <p:embeddedFontLst>
     <p:embeddedFont>
       <p:font typeface="Andale Mono" panose="020B0509000000000004" pitchFamily="49" charset="0"/>
-      <p:regular r:id="rId17"/>
+      <p:regular r:id="rId19"/>
     </p:embeddedFont>
     <p:embeddedFont>
       <p:font typeface="Proxima Nova" panose="02000506030000020004" pitchFamily="2" charset="0"/>
-      <p:regular r:id="rId18"/>
-      <p:bold r:id="rId19"/>
-      <p:italic r:id="rId20"/>
-      <p:boldItalic r:id="rId21"/>
+      <p:regular r:id="rId20"/>
+      <p:bold r:id="rId21"/>
+      <p:italic r:id="rId22"/>
+      <p:boldItalic r:id="rId23"/>
     </p:embeddedFont>
   </p:embeddedFontLst>
   <p:defaultTextStyle>
@@ -1032,7 +1034,7 @@
               </a:spcAft>
               <a:buNone/>
             </a:pPr>
-            <a:endParaRPr/>
+            <a:endParaRPr dirty="0"/>
           </a:p>
         </p:txBody>
       </p:sp>
@@ -1148,7 +1150,7 @@
     </p:spTree>
     <p:extLst>
       <p:ext uri="{BB962C8B-B14F-4D97-AF65-F5344CB8AC3E}">
-        <p14:creationId xmlns:p14="http://schemas.microsoft.com/office/powerpoint/2010/main" val="1356952145"/>
+        <p14:creationId xmlns:p14="http://schemas.microsoft.com/office/powerpoint/2010/main" val="308588241"/>
       </p:ext>
     </p:extLst>
   </p:cSld>
@@ -1250,14 +1252,14 @@
               </a:spcAft>
               <a:buNone/>
             </a:pPr>
-            <a:endParaRPr/>
+            <a:endParaRPr dirty="0"/>
           </a:p>
         </p:txBody>
       </p:sp>
     </p:spTree>
     <p:extLst>
       <p:ext uri="{BB962C8B-B14F-4D97-AF65-F5344CB8AC3E}">
-        <p14:creationId xmlns:p14="http://schemas.microsoft.com/office/powerpoint/2010/main" val="192771910"/>
+        <p14:creationId xmlns:p14="http://schemas.microsoft.com/office/powerpoint/2010/main" val="1356952145"/>
       </p:ext>
     </p:extLst>
   </p:cSld>
@@ -1272,7 +1274,7 @@
   <p:cSld>
     <p:spTree>
       <p:nvGrpSpPr>
-        <p:cNvPr id="1" name="Shape 103"/>
+        <p:cNvPr id="1" name="Shape 73"/>
         <p:cNvGrpSpPr/>
         <p:nvPr/>
       </p:nvGrpSpPr>
@@ -1286,7 +1288,7 @@
       </p:grpSpPr>
       <p:sp>
         <p:nvSpPr>
-          <p:cNvPr id="104" name="Google Shape;104;g8a55b5f358_0_86:notes"/>
+          <p:cNvPr id="74" name="Google Shape;74;g8a55b5f358_0_56:notes"/>
           <p:cNvSpPr>
             <a:spLocks noGrp="1" noRot="1" noChangeAspect="1"/>
           </p:cNvSpPr>
@@ -1327,7 +1329,7 @@
       </p:sp>
       <p:sp>
         <p:nvSpPr>
-          <p:cNvPr id="105" name="Google Shape;105;g8a55b5f358_0_86:notes"/>
+          <p:cNvPr id="75" name="Google Shape;75;g8a55b5f358_0_56:notes"/>
           <p:cNvSpPr txBox="1">
             <a:spLocks noGrp="1"/>
           </p:cNvSpPr>
@@ -1364,6 +1366,229 @@
         </p:txBody>
       </p:sp>
     </p:spTree>
+    <p:extLst>
+      <p:ext uri="{BB962C8B-B14F-4D97-AF65-F5344CB8AC3E}">
+        <p14:creationId xmlns:p14="http://schemas.microsoft.com/office/powerpoint/2010/main" val="192771910"/>
+      </p:ext>
+    </p:extLst>
+  </p:cSld>
+  <p:clrMapOvr>
+    <a:masterClrMapping/>
+  </p:clrMapOvr>
+</p:notes>
+</file>
+
+<file path=ppt/notesSlides/notesSlide15.xml><?xml version="1.0" encoding="utf-8"?>
+<p:notes xmlns:a="http://schemas.openxmlformats.org/drawingml/2006/main" xmlns:r="http://schemas.openxmlformats.org/officeDocument/2006/relationships" xmlns:p="http://schemas.openxmlformats.org/presentationml/2006/main" showMasterSp="0" showMasterPhAnim="0">
+  <p:cSld>
+    <p:spTree>
+      <p:nvGrpSpPr>
+        <p:cNvPr id="1" name="Shape 73"/>
+        <p:cNvGrpSpPr/>
+        <p:nvPr/>
+      </p:nvGrpSpPr>
+      <p:grpSpPr>
+        <a:xfrm>
+          <a:off x="0" y="0"/>
+          <a:ext cx="0" cy="0"/>
+          <a:chOff x="0" y="0"/>
+          <a:chExt cx="0" cy="0"/>
+        </a:xfrm>
+      </p:grpSpPr>
+      <p:sp>
+        <p:nvSpPr>
+          <p:cNvPr id="74" name="Google Shape;74;g8a55b5f358_0_56:notes"/>
+          <p:cNvSpPr>
+            <a:spLocks noGrp="1" noRot="1" noChangeAspect="1"/>
+          </p:cNvSpPr>
+          <p:nvPr>
+            <p:ph type="sldImg" idx="2"/>
+          </p:nvPr>
+        </p:nvSpPr>
+        <p:spPr>
+          <a:xfrm>
+            <a:off x="381000" y="685800"/>
+            <a:ext cx="6096000" cy="3429000"/>
+          </a:xfrm>
+          <a:custGeom>
+            <a:avLst/>
+            <a:gdLst/>
+            <a:ahLst/>
+            <a:cxnLst/>
+            <a:rect l="l" t="t" r="r" b="b"/>
+            <a:pathLst>
+              <a:path w="120000" h="120000" extrusionOk="0">
+                <a:moveTo>
+                  <a:pt x="0" y="0"/>
+                </a:moveTo>
+                <a:lnTo>
+                  <a:pt x="120000" y="0"/>
+                </a:lnTo>
+                <a:lnTo>
+                  <a:pt x="120000" y="120000"/>
+                </a:lnTo>
+                <a:lnTo>
+                  <a:pt x="0" y="120000"/>
+                </a:lnTo>
+                <a:close/>
+              </a:path>
+            </a:pathLst>
+          </a:custGeom>
+        </p:spPr>
+      </p:sp>
+      <p:sp>
+        <p:nvSpPr>
+          <p:cNvPr id="75" name="Google Shape;75;g8a55b5f358_0_56:notes"/>
+          <p:cNvSpPr txBox="1">
+            <a:spLocks noGrp="1"/>
+          </p:cNvSpPr>
+          <p:nvPr>
+            <p:ph type="body" idx="1"/>
+          </p:nvPr>
+        </p:nvSpPr>
+        <p:spPr>
+          <a:xfrm>
+            <a:off x="685800" y="4343400"/>
+            <a:ext cx="5486400" cy="4114800"/>
+          </a:xfrm>
+          <a:prstGeom prst="rect">
+            <a:avLst/>
+          </a:prstGeom>
+        </p:spPr>
+        <p:txBody>
+          <a:bodyPr spcFirstLastPara="1" wrap="square" lIns="91425" tIns="91425" rIns="91425" bIns="91425" anchor="t" anchorCtr="0">
+            <a:noAutofit/>
+          </a:bodyPr>
+          <a:lstStyle/>
+          <a:p>
+            <a:pPr marL="0" lvl="0" indent="0" algn="l" rtl="0">
+              <a:spcBef>
+                <a:spcPts val="0"/>
+              </a:spcBef>
+              <a:spcAft>
+                <a:spcPts val="0"/>
+              </a:spcAft>
+              <a:buNone/>
+            </a:pPr>
+            <a:endParaRPr/>
+          </a:p>
+        </p:txBody>
+      </p:sp>
+    </p:spTree>
+    <p:extLst>
+      <p:ext uri="{BB962C8B-B14F-4D97-AF65-F5344CB8AC3E}">
+        <p14:creationId xmlns:p14="http://schemas.microsoft.com/office/powerpoint/2010/main" val="316588686"/>
+      </p:ext>
+    </p:extLst>
+  </p:cSld>
+  <p:clrMapOvr>
+    <a:masterClrMapping/>
+  </p:clrMapOvr>
+</p:notes>
+</file>
+
+<file path=ppt/notesSlides/notesSlide16.xml><?xml version="1.0" encoding="utf-8"?>
+<p:notes xmlns:a="http://schemas.openxmlformats.org/drawingml/2006/main" xmlns:r="http://schemas.openxmlformats.org/officeDocument/2006/relationships" xmlns:p="http://schemas.openxmlformats.org/presentationml/2006/main" showMasterSp="0" showMasterPhAnim="0">
+  <p:cSld>
+    <p:spTree>
+      <p:nvGrpSpPr>
+        <p:cNvPr id="1" name="Shape 67"/>
+        <p:cNvGrpSpPr/>
+        <p:nvPr/>
+      </p:nvGrpSpPr>
+      <p:grpSpPr>
+        <a:xfrm>
+          <a:off x="0" y="0"/>
+          <a:ext cx="0" cy="0"/>
+          <a:chOff x="0" y="0"/>
+          <a:chExt cx="0" cy="0"/>
+        </a:xfrm>
+      </p:grpSpPr>
+      <p:sp>
+        <p:nvSpPr>
+          <p:cNvPr id="68" name="Google Shape;68;g8a55b5f358_0_50:notes"/>
+          <p:cNvSpPr>
+            <a:spLocks noGrp="1" noRot="1" noChangeAspect="1"/>
+          </p:cNvSpPr>
+          <p:nvPr>
+            <p:ph type="sldImg" idx="2"/>
+          </p:nvPr>
+        </p:nvSpPr>
+        <p:spPr>
+          <a:xfrm>
+            <a:off x="381000" y="685800"/>
+            <a:ext cx="6096000" cy="3429000"/>
+          </a:xfrm>
+          <a:custGeom>
+            <a:avLst/>
+            <a:gdLst/>
+            <a:ahLst/>
+            <a:cxnLst/>
+            <a:rect l="l" t="t" r="r" b="b"/>
+            <a:pathLst>
+              <a:path w="120000" h="120000" extrusionOk="0">
+                <a:moveTo>
+                  <a:pt x="0" y="0"/>
+                </a:moveTo>
+                <a:lnTo>
+                  <a:pt x="120000" y="0"/>
+                </a:lnTo>
+                <a:lnTo>
+                  <a:pt x="120000" y="120000"/>
+                </a:lnTo>
+                <a:lnTo>
+                  <a:pt x="0" y="120000"/>
+                </a:lnTo>
+                <a:close/>
+              </a:path>
+            </a:pathLst>
+          </a:custGeom>
+        </p:spPr>
+      </p:sp>
+      <p:sp>
+        <p:nvSpPr>
+          <p:cNvPr id="69" name="Google Shape;69;g8a55b5f358_0_50:notes"/>
+          <p:cNvSpPr txBox="1">
+            <a:spLocks noGrp="1"/>
+          </p:cNvSpPr>
+          <p:nvPr>
+            <p:ph type="body" idx="1"/>
+          </p:nvPr>
+        </p:nvSpPr>
+        <p:spPr>
+          <a:xfrm>
+            <a:off x="685800" y="4343400"/>
+            <a:ext cx="5486400" cy="4114800"/>
+          </a:xfrm>
+          <a:prstGeom prst="rect">
+            <a:avLst/>
+          </a:prstGeom>
+        </p:spPr>
+        <p:txBody>
+          <a:bodyPr spcFirstLastPara="1" wrap="square" lIns="91425" tIns="91425" rIns="91425" bIns="91425" anchor="t" anchorCtr="0">
+            <a:noAutofit/>
+          </a:bodyPr>
+          <a:lstStyle/>
+          <a:p>
+            <a:pPr marL="0" lvl="0" indent="0" algn="l" rtl="0">
+              <a:spcBef>
+                <a:spcPts val="0"/>
+              </a:spcBef>
+              <a:spcAft>
+                <a:spcPts val="0"/>
+              </a:spcAft>
+              <a:buNone/>
+            </a:pPr>
+            <a:endParaRPr/>
+          </a:p>
+        </p:txBody>
+      </p:sp>
+    </p:spTree>
+    <p:extLst>
+      <p:ext uri="{BB962C8B-B14F-4D97-AF65-F5344CB8AC3E}">
+        <p14:creationId xmlns:p14="http://schemas.microsoft.com/office/powerpoint/2010/main" val="181406967"/>
+      </p:ext>
+    </p:extLst>
   </p:cSld>
   <p:clrMapOvr>
     <a:masterClrMapping/>
@@ -1993,7 +2218,7 @@
               </a:spcAft>
               <a:buNone/>
             </a:pPr>
-            <a:endParaRPr/>
+            <a:endParaRPr dirty="0"/>
           </a:p>
         </p:txBody>
       </p:sp>
@@ -2814,410 +3039,6 @@
 </file>
 
 <file path=ppt/slideLayouts/slideLayout10.xml><?xml version="1.0" encoding="utf-8"?>
-<p:sldLayout xmlns:a="http://schemas.openxmlformats.org/drawingml/2006/main" xmlns:r="http://schemas.openxmlformats.org/officeDocument/2006/relationships" xmlns:p="http://schemas.openxmlformats.org/presentationml/2006/main" matchingName="Big number">
-  <p:cSld name="BIG_NUMBER">
-    <p:spTree>
-      <p:nvGrpSpPr>
-        <p:cNvPr id="1" name="Shape 48"/>
-        <p:cNvGrpSpPr/>
-        <p:nvPr/>
-      </p:nvGrpSpPr>
-      <p:grpSpPr>
-        <a:xfrm>
-          <a:off x="0" y="0"/>
-          <a:ext cx="0" cy="0"/>
-          <a:chOff x="0" y="0"/>
-          <a:chExt cx="0" cy="0"/>
-        </a:xfrm>
-      </p:grpSpPr>
-      <p:sp>
-        <p:nvSpPr>
-          <p:cNvPr id="49" name="Google Shape;49;p11"/>
-          <p:cNvSpPr/>
-          <p:nvPr/>
-        </p:nvSpPr>
-        <p:spPr>
-          <a:xfrm>
-            <a:off x="0" y="5045700"/>
-            <a:ext cx="9144000" cy="97800"/>
-          </a:xfrm>
-          <a:prstGeom prst="rect">
-            <a:avLst/>
-          </a:prstGeom>
-          <a:solidFill>
-            <a:schemeClr val="lt2"/>
-          </a:solidFill>
-          <a:ln>
-            <a:noFill/>
-          </a:ln>
-        </p:spPr>
-        <p:txBody>
-          <a:bodyPr spcFirstLastPara="1" wrap="square" lIns="91425" tIns="91425" rIns="91425" bIns="91425" anchor="ctr" anchorCtr="0">
-            <a:noAutofit/>
-          </a:bodyPr>
-          <a:lstStyle/>
-          <a:p>
-            <a:pPr marL="0" lvl="0" indent="0" algn="l" rtl="0">
-              <a:spcBef>
-                <a:spcPts val="0"/>
-              </a:spcBef>
-              <a:spcAft>
-                <a:spcPts val="0"/>
-              </a:spcAft>
-              <a:buNone/>
-            </a:pPr>
-            <a:endParaRPr/>
-          </a:p>
-        </p:txBody>
-      </p:sp>
-      <p:sp>
-        <p:nvSpPr>
-          <p:cNvPr id="50" name="Google Shape;50;p11"/>
-          <p:cNvSpPr txBox="1">
-            <a:spLocks noGrp="1"/>
-          </p:cNvSpPr>
-          <p:nvPr>
-            <p:ph type="title" hasCustomPrompt="1"/>
-          </p:nvPr>
-        </p:nvSpPr>
-        <p:spPr>
-          <a:xfrm>
-            <a:off x="311700" y="991475"/>
-            <a:ext cx="8520600" cy="1917900"/>
-          </a:xfrm>
-          <a:prstGeom prst="rect">
-            <a:avLst/>
-          </a:prstGeom>
-        </p:spPr>
-        <p:txBody>
-          <a:bodyPr spcFirstLastPara="1" wrap="square" lIns="91425" tIns="91425" rIns="91425" bIns="91425" anchor="ctr" anchorCtr="0">
-            <a:noAutofit/>
-          </a:bodyPr>
-          <a:lstStyle>
-            <a:lvl1pPr lvl="0" algn="ctr">
-              <a:spcBef>
-                <a:spcPts val="0"/>
-              </a:spcBef>
-              <a:spcAft>
-                <a:spcPts val="0"/>
-              </a:spcAft>
-              <a:buSzPts val="14000"/>
-              <a:buNone/>
-              <a:defRPr sz="14000" b="1"/>
-            </a:lvl1pPr>
-            <a:lvl2pPr lvl="1" algn="ctr">
-              <a:spcBef>
-                <a:spcPts val="0"/>
-              </a:spcBef>
-              <a:spcAft>
-                <a:spcPts val="0"/>
-              </a:spcAft>
-              <a:buSzPts val="14000"/>
-              <a:buNone/>
-              <a:defRPr sz="14000" b="1"/>
-            </a:lvl2pPr>
-            <a:lvl3pPr lvl="2" algn="ctr">
-              <a:spcBef>
-                <a:spcPts val="0"/>
-              </a:spcBef>
-              <a:spcAft>
-                <a:spcPts val="0"/>
-              </a:spcAft>
-              <a:buSzPts val="14000"/>
-              <a:buNone/>
-              <a:defRPr sz="14000" b="1"/>
-            </a:lvl3pPr>
-            <a:lvl4pPr lvl="3" algn="ctr">
-              <a:spcBef>
-                <a:spcPts val="0"/>
-              </a:spcBef>
-              <a:spcAft>
-                <a:spcPts val="0"/>
-              </a:spcAft>
-              <a:buSzPts val="14000"/>
-              <a:buNone/>
-              <a:defRPr sz="14000" b="1"/>
-            </a:lvl4pPr>
-            <a:lvl5pPr lvl="4" algn="ctr">
-              <a:spcBef>
-                <a:spcPts val="0"/>
-              </a:spcBef>
-              <a:spcAft>
-                <a:spcPts val="0"/>
-              </a:spcAft>
-              <a:buSzPts val="14000"/>
-              <a:buNone/>
-              <a:defRPr sz="14000" b="1"/>
-            </a:lvl5pPr>
-            <a:lvl6pPr lvl="5" algn="ctr">
-              <a:spcBef>
-                <a:spcPts val="0"/>
-              </a:spcBef>
-              <a:spcAft>
-                <a:spcPts val="0"/>
-              </a:spcAft>
-              <a:buSzPts val="14000"/>
-              <a:buNone/>
-              <a:defRPr sz="14000" b="1"/>
-            </a:lvl6pPr>
-            <a:lvl7pPr lvl="6" algn="ctr">
-              <a:spcBef>
-                <a:spcPts val="0"/>
-              </a:spcBef>
-              <a:spcAft>
-                <a:spcPts val="0"/>
-              </a:spcAft>
-              <a:buSzPts val="14000"/>
-              <a:buNone/>
-              <a:defRPr sz="14000" b="1"/>
-            </a:lvl7pPr>
-            <a:lvl8pPr lvl="7" algn="ctr">
-              <a:spcBef>
-                <a:spcPts val="0"/>
-              </a:spcBef>
-              <a:spcAft>
-                <a:spcPts val="0"/>
-              </a:spcAft>
-              <a:buSzPts val="14000"/>
-              <a:buNone/>
-              <a:defRPr sz="14000" b="1"/>
-            </a:lvl8pPr>
-            <a:lvl9pPr lvl="8" algn="ctr">
-              <a:spcBef>
-                <a:spcPts val="0"/>
-              </a:spcBef>
-              <a:spcAft>
-                <a:spcPts val="0"/>
-              </a:spcAft>
-              <a:buSzPts val="14000"/>
-              <a:buNone/>
-              <a:defRPr sz="14000" b="1"/>
-            </a:lvl9pPr>
-          </a:lstStyle>
-          <a:p>
-            <a:r>
-              <a:t>xx%</a:t>
-            </a:r>
-          </a:p>
-        </p:txBody>
-      </p:sp>
-      <p:sp>
-        <p:nvSpPr>
-          <p:cNvPr id="51" name="Google Shape;51;p11"/>
-          <p:cNvSpPr txBox="1">
-            <a:spLocks noGrp="1"/>
-          </p:cNvSpPr>
-          <p:nvPr>
-            <p:ph type="body" idx="1"/>
-          </p:nvPr>
-        </p:nvSpPr>
-        <p:spPr>
-          <a:xfrm>
-            <a:off x="311700" y="3071300"/>
-            <a:ext cx="8520600" cy="901800"/>
-          </a:xfrm>
-          <a:prstGeom prst="rect">
-            <a:avLst/>
-          </a:prstGeom>
-        </p:spPr>
-        <p:txBody>
-          <a:bodyPr spcFirstLastPara="1" wrap="square" lIns="91425" tIns="91425" rIns="91425" bIns="91425" anchor="t" anchorCtr="0">
-            <a:noAutofit/>
-          </a:bodyPr>
-          <a:lstStyle>
-            <a:lvl1pPr marL="457200" lvl="0" indent="-342900" algn="ctr">
-              <a:spcBef>
-                <a:spcPts val="0"/>
-              </a:spcBef>
-              <a:spcAft>
-                <a:spcPts val="0"/>
-              </a:spcAft>
-              <a:buSzPts val="1800"/>
-              <a:buChar char="●"/>
-              <a:defRPr/>
-            </a:lvl1pPr>
-            <a:lvl2pPr marL="914400" lvl="1" indent="-317500" algn="ctr">
-              <a:spcBef>
-                <a:spcPts val="1600"/>
-              </a:spcBef>
-              <a:spcAft>
-                <a:spcPts val="0"/>
-              </a:spcAft>
-              <a:buSzPts val="1400"/>
-              <a:buChar char="○"/>
-              <a:defRPr/>
-            </a:lvl2pPr>
-            <a:lvl3pPr marL="1371600" lvl="2" indent="-317500" algn="ctr">
-              <a:spcBef>
-                <a:spcPts val="1600"/>
-              </a:spcBef>
-              <a:spcAft>
-                <a:spcPts val="0"/>
-              </a:spcAft>
-              <a:buSzPts val="1400"/>
-              <a:buChar char="■"/>
-              <a:defRPr/>
-            </a:lvl3pPr>
-            <a:lvl4pPr marL="1828800" lvl="3" indent="-317500" algn="ctr">
-              <a:spcBef>
-                <a:spcPts val="1600"/>
-              </a:spcBef>
-              <a:spcAft>
-                <a:spcPts val="0"/>
-              </a:spcAft>
-              <a:buSzPts val="1400"/>
-              <a:buChar char="●"/>
-              <a:defRPr/>
-            </a:lvl4pPr>
-            <a:lvl5pPr marL="2286000" lvl="4" indent="-317500" algn="ctr">
-              <a:spcBef>
-                <a:spcPts val="1600"/>
-              </a:spcBef>
-              <a:spcAft>
-                <a:spcPts val="0"/>
-              </a:spcAft>
-              <a:buSzPts val="1400"/>
-              <a:buChar char="○"/>
-              <a:defRPr/>
-            </a:lvl5pPr>
-            <a:lvl6pPr marL="2743200" lvl="5" indent="-317500" algn="ctr">
-              <a:spcBef>
-                <a:spcPts val="1600"/>
-              </a:spcBef>
-              <a:spcAft>
-                <a:spcPts val="0"/>
-              </a:spcAft>
-              <a:buSzPts val="1400"/>
-              <a:buChar char="■"/>
-              <a:defRPr/>
-            </a:lvl6pPr>
-            <a:lvl7pPr marL="3200400" lvl="6" indent="-317500" algn="ctr">
-              <a:spcBef>
-                <a:spcPts val="1600"/>
-              </a:spcBef>
-              <a:spcAft>
-                <a:spcPts val="0"/>
-              </a:spcAft>
-              <a:buSzPts val="1400"/>
-              <a:buChar char="●"/>
-              <a:defRPr/>
-            </a:lvl7pPr>
-            <a:lvl8pPr marL="3657600" lvl="7" indent="-317500" algn="ctr">
-              <a:spcBef>
-                <a:spcPts val="1600"/>
-              </a:spcBef>
-              <a:spcAft>
-                <a:spcPts val="0"/>
-              </a:spcAft>
-              <a:buSzPts val="1400"/>
-              <a:buChar char="○"/>
-              <a:defRPr/>
-            </a:lvl8pPr>
-            <a:lvl9pPr marL="4114800" lvl="8" indent="-317500" algn="ctr">
-              <a:spcBef>
-                <a:spcPts val="1600"/>
-              </a:spcBef>
-              <a:spcAft>
-                <a:spcPts val="1600"/>
-              </a:spcAft>
-              <a:buSzPts val="1400"/>
-              <a:buChar char="■"/>
-              <a:defRPr/>
-            </a:lvl9pPr>
-          </a:lstStyle>
-          <a:p>
-            <a:endParaRPr/>
-          </a:p>
-        </p:txBody>
-      </p:sp>
-      <p:sp>
-        <p:nvSpPr>
-          <p:cNvPr id="52" name="Google Shape;52;p11"/>
-          <p:cNvSpPr txBox="1">
-            <a:spLocks noGrp="1"/>
-          </p:cNvSpPr>
-          <p:nvPr>
-            <p:ph type="sldNum" idx="12"/>
-          </p:nvPr>
-        </p:nvSpPr>
-        <p:spPr>
-          <a:xfrm>
-            <a:off x="8472458" y="4663217"/>
-            <a:ext cx="548700" cy="393600"/>
-          </a:xfrm>
-          <a:prstGeom prst="rect">
-            <a:avLst/>
-          </a:prstGeom>
-        </p:spPr>
-        <p:txBody>
-          <a:bodyPr spcFirstLastPara="1" wrap="square" lIns="91425" tIns="91425" rIns="91425" bIns="91425" anchor="ctr" anchorCtr="0">
-            <a:noAutofit/>
-          </a:bodyPr>
-          <a:lstStyle>
-            <a:lvl1pPr lvl="0">
-              <a:buNone/>
-              <a:defRPr/>
-            </a:lvl1pPr>
-            <a:lvl2pPr lvl="1">
-              <a:buNone/>
-              <a:defRPr/>
-            </a:lvl2pPr>
-            <a:lvl3pPr lvl="2">
-              <a:buNone/>
-              <a:defRPr/>
-            </a:lvl3pPr>
-            <a:lvl4pPr lvl="3">
-              <a:buNone/>
-              <a:defRPr/>
-            </a:lvl4pPr>
-            <a:lvl5pPr lvl="4">
-              <a:buNone/>
-              <a:defRPr/>
-            </a:lvl5pPr>
-            <a:lvl6pPr lvl="5">
-              <a:buNone/>
-              <a:defRPr/>
-            </a:lvl6pPr>
-            <a:lvl7pPr lvl="6">
-              <a:buNone/>
-              <a:defRPr/>
-            </a:lvl7pPr>
-            <a:lvl8pPr lvl="7">
-              <a:buNone/>
-              <a:defRPr/>
-            </a:lvl8pPr>
-            <a:lvl9pPr lvl="8">
-              <a:buNone/>
-              <a:defRPr/>
-            </a:lvl9pPr>
-          </a:lstStyle>
-          <a:p>
-            <a:pPr marL="0" lvl="0" indent="0" algn="r" rtl="0">
-              <a:spcBef>
-                <a:spcPts val="0"/>
-              </a:spcBef>
-              <a:spcAft>
-                <a:spcPts val="0"/>
-              </a:spcAft>
-              <a:buNone/>
-            </a:pPr>
-            <a:fld id="{00000000-1234-1234-1234-123412341234}" type="slidenum">
-              <a:rPr lang="en"/>
-              <a:t>‹#›</a:t>
-            </a:fld>
-            <a:endParaRPr/>
-          </a:p>
-        </p:txBody>
-      </p:sp>
-    </p:spTree>
-  </p:cSld>
-  <p:clrMapOvr>
-    <a:masterClrMapping/>
-  </p:clrMapOvr>
-</p:sldLayout>
-</file>
-
-<file path=ppt/slideLayouts/slideLayout11.xml><?xml version="1.0" encoding="utf-8"?>
 <p:sldLayout xmlns:a="http://schemas.openxmlformats.org/drawingml/2006/main" xmlns:r="http://schemas.openxmlformats.org/officeDocument/2006/relationships" xmlns:p="http://schemas.openxmlformats.org/presentationml/2006/main" matchingName="Blank" type="blank">
   <p:cSld name="BLANK">
     <p:spTree>
@@ -5176,247 +4997,6 @@
 </file>
 
 <file path=ppt/slideLayouts/slideLayout7.xml><?xml version="1.0" encoding="utf-8"?>
-<p:sldLayout xmlns:a="http://schemas.openxmlformats.org/drawingml/2006/main" xmlns:r="http://schemas.openxmlformats.org/officeDocument/2006/relationships" xmlns:p="http://schemas.openxmlformats.org/presentationml/2006/main" matchingName="Main point">
-  <p:cSld name="MAIN_POINT">
-    <p:bg>
-      <p:bgPr>
-        <a:solidFill>
-          <a:schemeClr val="lt2"/>
-        </a:solidFill>
-        <a:effectLst/>
-      </p:bgPr>
-    </p:bg>
-    <p:spTree>
-      <p:nvGrpSpPr>
-        <p:cNvPr id="1" name="Shape 35"/>
-        <p:cNvGrpSpPr/>
-        <p:nvPr/>
-      </p:nvGrpSpPr>
-      <p:grpSpPr>
-        <a:xfrm>
-          <a:off x="0" y="0"/>
-          <a:ext cx="0" cy="0"/>
-          <a:chOff x="0" y="0"/>
-          <a:chExt cx="0" cy="0"/>
-        </a:xfrm>
-      </p:grpSpPr>
-      <p:sp>
-        <p:nvSpPr>
-          <p:cNvPr id="36" name="Google Shape;36;p8"/>
-          <p:cNvSpPr txBox="1">
-            <a:spLocks noGrp="1"/>
-          </p:cNvSpPr>
-          <p:nvPr>
-            <p:ph type="title"/>
-          </p:nvPr>
-        </p:nvSpPr>
-        <p:spPr>
-          <a:xfrm>
-            <a:off x="490250" y="526350"/>
-            <a:ext cx="5797500" cy="4090800"/>
-          </a:xfrm>
-          <a:prstGeom prst="rect">
-            <a:avLst/>
-          </a:prstGeom>
-        </p:spPr>
-        <p:txBody>
-          <a:bodyPr spcFirstLastPara="1" wrap="square" lIns="91425" tIns="91425" rIns="91425" bIns="91425" anchor="ctr" anchorCtr="0">
-            <a:noAutofit/>
-          </a:bodyPr>
-          <a:lstStyle>
-            <a:lvl1pPr lvl="0">
-              <a:spcBef>
-                <a:spcPts val="0"/>
-              </a:spcBef>
-              <a:spcAft>
-                <a:spcPts val="0"/>
-              </a:spcAft>
-              <a:buSzPts val="4800"/>
-              <a:buNone/>
-              <a:defRPr sz="4800"/>
-            </a:lvl1pPr>
-            <a:lvl2pPr lvl="1">
-              <a:spcBef>
-                <a:spcPts val="0"/>
-              </a:spcBef>
-              <a:spcAft>
-                <a:spcPts val="0"/>
-              </a:spcAft>
-              <a:buSzPts val="4800"/>
-              <a:buNone/>
-              <a:defRPr sz="4800"/>
-            </a:lvl2pPr>
-            <a:lvl3pPr lvl="2">
-              <a:spcBef>
-                <a:spcPts val="0"/>
-              </a:spcBef>
-              <a:spcAft>
-                <a:spcPts val="0"/>
-              </a:spcAft>
-              <a:buSzPts val="4800"/>
-              <a:buNone/>
-              <a:defRPr sz="4800"/>
-            </a:lvl3pPr>
-            <a:lvl4pPr lvl="3">
-              <a:spcBef>
-                <a:spcPts val="0"/>
-              </a:spcBef>
-              <a:spcAft>
-                <a:spcPts val="0"/>
-              </a:spcAft>
-              <a:buSzPts val="4800"/>
-              <a:buNone/>
-              <a:defRPr sz="4800"/>
-            </a:lvl4pPr>
-            <a:lvl5pPr lvl="4">
-              <a:spcBef>
-                <a:spcPts val="0"/>
-              </a:spcBef>
-              <a:spcAft>
-                <a:spcPts val="0"/>
-              </a:spcAft>
-              <a:buSzPts val="4800"/>
-              <a:buNone/>
-              <a:defRPr sz="4800"/>
-            </a:lvl5pPr>
-            <a:lvl6pPr lvl="5">
-              <a:spcBef>
-                <a:spcPts val="0"/>
-              </a:spcBef>
-              <a:spcAft>
-                <a:spcPts val="0"/>
-              </a:spcAft>
-              <a:buSzPts val="4800"/>
-              <a:buNone/>
-              <a:defRPr sz="4800"/>
-            </a:lvl6pPr>
-            <a:lvl7pPr lvl="6">
-              <a:spcBef>
-                <a:spcPts val="0"/>
-              </a:spcBef>
-              <a:spcAft>
-                <a:spcPts val="0"/>
-              </a:spcAft>
-              <a:buSzPts val="4800"/>
-              <a:buNone/>
-              <a:defRPr sz="4800"/>
-            </a:lvl7pPr>
-            <a:lvl8pPr lvl="7">
-              <a:spcBef>
-                <a:spcPts val="0"/>
-              </a:spcBef>
-              <a:spcAft>
-                <a:spcPts val="0"/>
-              </a:spcAft>
-              <a:buSzPts val="4800"/>
-              <a:buNone/>
-              <a:defRPr sz="4800"/>
-            </a:lvl8pPr>
-            <a:lvl9pPr lvl="8">
-              <a:spcBef>
-                <a:spcPts val="0"/>
-              </a:spcBef>
-              <a:spcAft>
-                <a:spcPts val="0"/>
-              </a:spcAft>
-              <a:buSzPts val="4800"/>
-              <a:buNone/>
-              <a:defRPr sz="4800"/>
-            </a:lvl9pPr>
-          </a:lstStyle>
-          <a:p>
-            <a:endParaRPr/>
-          </a:p>
-        </p:txBody>
-      </p:sp>
-      <p:sp>
-        <p:nvSpPr>
-          <p:cNvPr id="37" name="Google Shape;37;p8"/>
-          <p:cNvSpPr txBox="1">
-            <a:spLocks noGrp="1"/>
-          </p:cNvSpPr>
-          <p:nvPr>
-            <p:ph type="sldNum" idx="12"/>
-          </p:nvPr>
-        </p:nvSpPr>
-        <p:spPr>
-          <a:xfrm>
-            <a:off x="8472458" y="4663217"/>
-            <a:ext cx="548700" cy="393600"/>
-          </a:xfrm>
-          <a:prstGeom prst="rect">
-            <a:avLst/>
-          </a:prstGeom>
-        </p:spPr>
-        <p:txBody>
-          <a:bodyPr spcFirstLastPara="1" wrap="square" lIns="91425" tIns="91425" rIns="91425" bIns="91425" anchor="ctr" anchorCtr="0">
-            <a:noAutofit/>
-          </a:bodyPr>
-          <a:lstStyle>
-            <a:lvl1pPr lvl="0">
-              <a:buNone/>
-              <a:defRPr/>
-            </a:lvl1pPr>
-            <a:lvl2pPr lvl="1">
-              <a:buNone/>
-              <a:defRPr/>
-            </a:lvl2pPr>
-            <a:lvl3pPr lvl="2">
-              <a:buNone/>
-              <a:defRPr/>
-            </a:lvl3pPr>
-            <a:lvl4pPr lvl="3">
-              <a:buNone/>
-              <a:defRPr/>
-            </a:lvl4pPr>
-            <a:lvl5pPr lvl="4">
-              <a:buNone/>
-              <a:defRPr/>
-            </a:lvl5pPr>
-            <a:lvl6pPr lvl="5">
-              <a:buNone/>
-              <a:defRPr/>
-            </a:lvl6pPr>
-            <a:lvl7pPr lvl="6">
-              <a:buNone/>
-              <a:defRPr/>
-            </a:lvl7pPr>
-            <a:lvl8pPr lvl="7">
-              <a:buNone/>
-              <a:defRPr/>
-            </a:lvl8pPr>
-            <a:lvl9pPr lvl="8">
-              <a:buNone/>
-              <a:defRPr/>
-            </a:lvl9pPr>
-          </a:lstStyle>
-          <a:p>
-            <a:pPr marL="0" lvl="0" indent="0" algn="r" rtl="0">
-              <a:spcBef>
-                <a:spcPts val="0"/>
-              </a:spcBef>
-              <a:spcAft>
-                <a:spcPts val="0"/>
-              </a:spcAft>
-              <a:buNone/>
-            </a:pPr>
-            <a:fld id="{00000000-1234-1234-1234-123412341234}" type="slidenum">
-              <a:rPr lang="en"/>
-              <a:t>‹#›</a:t>
-            </a:fld>
-            <a:endParaRPr/>
-          </a:p>
-        </p:txBody>
-      </p:sp>
-    </p:spTree>
-  </p:cSld>
-  <p:clrMapOvr>
-    <a:masterClrMapping/>
-  </p:clrMapOvr>
-</p:sldLayout>
-</file>
-
-<file path=ppt/slideLayouts/slideLayout8.xml><?xml version="1.0" encoding="utf-8"?>
 <p:sldLayout xmlns:a="http://schemas.openxmlformats.org/drawingml/2006/main" xmlns:r="http://schemas.openxmlformats.org/officeDocument/2006/relationships" xmlns:p="http://schemas.openxmlformats.org/presentationml/2006/main" matchingName="Section title and description">
   <p:cSld name="SECTION_TITLE_AND_DESCRIPTION">
     <p:spTree>
@@ -6099,7 +5679,7 @@
 </p:sldLayout>
 </file>
 
-<file path=ppt/slideLayouts/slideLayout9.xml><?xml version="1.0" encoding="utf-8"?>
+<file path=ppt/slideLayouts/slideLayout8.xml><?xml version="1.0" encoding="utf-8"?>
 <p:sldLayout xmlns:a="http://schemas.openxmlformats.org/drawingml/2006/main" xmlns:r="http://schemas.openxmlformats.org/officeDocument/2006/relationships" xmlns:p="http://schemas.openxmlformats.org/presentationml/2006/main" matchingName="Caption">
   <p:cSld name="CAPTION_ONLY">
     <p:spTree>
@@ -6163,6 +5743,410 @@
       <p:sp>
         <p:nvSpPr>
           <p:cNvPr id="47" name="Google Shape;47;p10"/>
+          <p:cNvSpPr txBox="1">
+            <a:spLocks noGrp="1"/>
+          </p:cNvSpPr>
+          <p:nvPr>
+            <p:ph type="sldNum" idx="12"/>
+          </p:nvPr>
+        </p:nvSpPr>
+        <p:spPr>
+          <a:xfrm>
+            <a:off x="8472458" y="4663217"/>
+            <a:ext cx="548700" cy="393600"/>
+          </a:xfrm>
+          <a:prstGeom prst="rect">
+            <a:avLst/>
+          </a:prstGeom>
+        </p:spPr>
+        <p:txBody>
+          <a:bodyPr spcFirstLastPara="1" wrap="square" lIns="91425" tIns="91425" rIns="91425" bIns="91425" anchor="ctr" anchorCtr="0">
+            <a:noAutofit/>
+          </a:bodyPr>
+          <a:lstStyle>
+            <a:lvl1pPr lvl="0">
+              <a:buNone/>
+              <a:defRPr/>
+            </a:lvl1pPr>
+            <a:lvl2pPr lvl="1">
+              <a:buNone/>
+              <a:defRPr/>
+            </a:lvl2pPr>
+            <a:lvl3pPr lvl="2">
+              <a:buNone/>
+              <a:defRPr/>
+            </a:lvl3pPr>
+            <a:lvl4pPr lvl="3">
+              <a:buNone/>
+              <a:defRPr/>
+            </a:lvl4pPr>
+            <a:lvl5pPr lvl="4">
+              <a:buNone/>
+              <a:defRPr/>
+            </a:lvl5pPr>
+            <a:lvl6pPr lvl="5">
+              <a:buNone/>
+              <a:defRPr/>
+            </a:lvl6pPr>
+            <a:lvl7pPr lvl="6">
+              <a:buNone/>
+              <a:defRPr/>
+            </a:lvl7pPr>
+            <a:lvl8pPr lvl="7">
+              <a:buNone/>
+              <a:defRPr/>
+            </a:lvl8pPr>
+            <a:lvl9pPr lvl="8">
+              <a:buNone/>
+              <a:defRPr/>
+            </a:lvl9pPr>
+          </a:lstStyle>
+          <a:p>
+            <a:pPr marL="0" lvl="0" indent="0" algn="r" rtl="0">
+              <a:spcBef>
+                <a:spcPts val="0"/>
+              </a:spcBef>
+              <a:spcAft>
+                <a:spcPts val="0"/>
+              </a:spcAft>
+              <a:buNone/>
+            </a:pPr>
+            <a:fld id="{00000000-1234-1234-1234-123412341234}" type="slidenum">
+              <a:rPr lang="en"/>
+              <a:t>‹#›</a:t>
+            </a:fld>
+            <a:endParaRPr/>
+          </a:p>
+        </p:txBody>
+      </p:sp>
+    </p:spTree>
+  </p:cSld>
+  <p:clrMapOvr>
+    <a:masterClrMapping/>
+  </p:clrMapOvr>
+</p:sldLayout>
+</file>
+
+<file path=ppt/slideLayouts/slideLayout9.xml><?xml version="1.0" encoding="utf-8"?>
+<p:sldLayout xmlns:a="http://schemas.openxmlformats.org/drawingml/2006/main" xmlns:r="http://schemas.openxmlformats.org/officeDocument/2006/relationships" xmlns:p="http://schemas.openxmlformats.org/presentationml/2006/main" matchingName="Big number">
+  <p:cSld name="BIG_NUMBER">
+    <p:spTree>
+      <p:nvGrpSpPr>
+        <p:cNvPr id="1" name="Shape 48"/>
+        <p:cNvGrpSpPr/>
+        <p:nvPr/>
+      </p:nvGrpSpPr>
+      <p:grpSpPr>
+        <a:xfrm>
+          <a:off x="0" y="0"/>
+          <a:ext cx="0" cy="0"/>
+          <a:chOff x="0" y="0"/>
+          <a:chExt cx="0" cy="0"/>
+        </a:xfrm>
+      </p:grpSpPr>
+      <p:sp>
+        <p:nvSpPr>
+          <p:cNvPr id="49" name="Google Shape;49;p11"/>
+          <p:cNvSpPr/>
+          <p:nvPr/>
+        </p:nvSpPr>
+        <p:spPr>
+          <a:xfrm>
+            <a:off x="0" y="5045700"/>
+            <a:ext cx="9144000" cy="97800"/>
+          </a:xfrm>
+          <a:prstGeom prst="rect">
+            <a:avLst/>
+          </a:prstGeom>
+          <a:solidFill>
+            <a:schemeClr val="lt2"/>
+          </a:solidFill>
+          <a:ln>
+            <a:noFill/>
+          </a:ln>
+        </p:spPr>
+        <p:txBody>
+          <a:bodyPr spcFirstLastPara="1" wrap="square" lIns="91425" tIns="91425" rIns="91425" bIns="91425" anchor="ctr" anchorCtr="0">
+            <a:noAutofit/>
+          </a:bodyPr>
+          <a:lstStyle/>
+          <a:p>
+            <a:pPr marL="0" lvl="0" indent="0" algn="l" rtl="0">
+              <a:spcBef>
+                <a:spcPts val="0"/>
+              </a:spcBef>
+              <a:spcAft>
+                <a:spcPts val="0"/>
+              </a:spcAft>
+              <a:buNone/>
+            </a:pPr>
+            <a:endParaRPr/>
+          </a:p>
+        </p:txBody>
+      </p:sp>
+      <p:sp>
+        <p:nvSpPr>
+          <p:cNvPr id="50" name="Google Shape;50;p11"/>
+          <p:cNvSpPr txBox="1">
+            <a:spLocks noGrp="1"/>
+          </p:cNvSpPr>
+          <p:nvPr>
+            <p:ph type="title" hasCustomPrompt="1"/>
+          </p:nvPr>
+        </p:nvSpPr>
+        <p:spPr>
+          <a:xfrm>
+            <a:off x="311700" y="991475"/>
+            <a:ext cx="8520600" cy="1917900"/>
+          </a:xfrm>
+          <a:prstGeom prst="rect">
+            <a:avLst/>
+          </a:prstGeom>
+        </p:spPr>
+        <p:txBody>
+          <a:bodyPr spcFirstLastPara="1" wrap="square" lIns="91425" tIns="91425" rIns="91425" bIns="91425" anchor="ctr" anchorCtr="0">
+            <a:noAutofit/>
+          </a:bodyPr>
+          <a:lstStyle>
+            <a:lvl1pPr lvl="0" algn="ctr">
+              <a:spcBef>
+                <a:spcPts val="0"/>
+              </a:spcBef>
+              <a:spcAft>
+                <a:spcPts val="0"/>
+              </a:spcAft>
+              <a:buSzPts val="14000"/>
+              <a:buNone/>
+              <a:defRPr sz="14000" b="1"/>
+            </a:lvl1pPr>
+            <a:lvl2pPr lvl="1" algn="ctr">
+              <a:spcBef>
+                <a:spcPts val="0"/>
+              </a:spcBef>
+              <a:spcAft>
+                <a:spcPts val="0"/>
+              </a:spcAft>
+              <a:buSzPts val="14000"/>
+              <a:buNone/>
+              <a:defRPr sz="14000" b="1"/>
+            </a:lvl2pPr>
+            <a:lvl3pPr lvl="2" algn="ctr">
+              <a:spcBef>
+                <a:spcPts val="0"/>
+              </a:spcBef>
+              <a:spcAft>
+                <a:spcPts val="0"/>
+              </a:spcAft>
+              <a:buSzPts val="14000"/>
+              <a:buNone/>
+              <a:defRPr sz="14000" b="1"/>
+            </a:lvl3pPr>
+            <a:lvl4pPr lvl="3" algn="ctr">
+              <a:spcBef>
+                <a:spcPts val="0"/>
+              </a:spcBef>
+              <a:spcAft>
+                <a:spcPts val="0"/>
+              </a:spcAft>
+              <a:buSzPts val="14000"/>
+              <a:buNone/>
+              <a:defRPr sz="14000" b="1"/>
+            </a:lvl4pPr>
+            <a:lvl5pPr lvl="4" algn="ctr">
+              <a:spcBef>
+                <a:spcPts val="0"/>
+              </a:spcBef>
+              <a:spcAft>
+                <a:spcPts val="0"/>
+              </a:spcAft>
+              <a:buSzPts val="14000"/>
+              <a:buNone/>
+              <a:defRPr sz="14000" b="1"/>
+            </a:lvl5pPr>
+            <a:lvl6pPr lvl="5" algn="ctr">
+              <a:spcBef>
+                <a:spcPts val="0"/>
+              </a:spcBef>
+              <a:spcAft>
+                <a:spcPts val="0"/>
+              </a:spcAft>
+              <a:buSzPts val="14000"/>
+              <a:buNone/>
+              <a:defRPr sz="14000" b="1"/>
+            </a:lvl6pPr>
+            <a:lvl7pPr lvl="6" algn="ctr">
+              <a:spcBef>
+                <a:spcPts val="0"/>
+              </a:spcBef>
+              <a:spcAft>
+                <a:spcPts val="0"/>
+              </a:spcAft>
+              <a:buSzPts val="14000"/>
+              <a:buNone/>
+              <a:defRPr sz="14000" b="1"/>
+            </a:lvl7pPr>
+            <a:lvl8pPr lvl="7" algn="ctr">
+              <a:spcBef>
+                <a:spcPts val="0"/>
+              </a:spcBef>
+              <a:spcAft>
+                <a:spcPts val="0"/>
+              </a:spcAft>
+              <a:buSzPts val="14000"/>
+              <a:buNone/>
+              <a:defRPr sz="14000" b="1"/>
+            </a:lvl8pPr>
+            <a:lvl9pPr lvl="8" algn="ctr">
+              <a:spcBef>
+                <a:spcPts val="0"/>
+              </a:spcBef>
+              <a:spcAft>
+                <a:spcPts val="0"/>
+              </a:spcAft>
+              <a:buSzPts val="14000"/>
+              <a:buNone/>
+              <a:defRPr sz="14000" b="1"/>
+            </a:lvl9pPr>
+          </a:lstStyle>
+          <a:p>
+            <a:r>
+              <a:t>xx%</a:t>
+            </a:r>
+          </a:p>
+        </p:txBody>
+      </p:sp>
+      <p:sp>
+        <p:nvSpPr>
+          <p:cNvPr id="51" name="Google Shape;51;p11"/>
+          <p:cNvSpPr txBox="1">
+            <a:spLocks noGrp="1"/>
+          </p:cNvSpPr>
+          <p:nvPr>
+            <p:ph type="body" idx="1"/>
+          </p:nvPr>
+        </p:nvSpPr>
+        <p:spPr>
+          <a:xfrm>
+            <a:off x="311700" y="3071300"/>
+            <a:ext cx="8520600" cy="901800"/>
+          </a:xfrm>
+          <a:prstGeom prst="rect">
+            <a:avLst/>
+          </a:prstGeom>
+        </p:spPr>
+        <p:txBody>
+          <a:bodyPr spcFirstLastPara="1" wrap="square" lIns="91425" tIns="91425" rIns="91425" bIns="91425" anchor="t" anchorCtr="0">
+            <a:noAutofit/>
+          </a:bodyPr>
+          <a:lstStyle>
+            <a:lvl1pPr marL="457200" lvl="0" indent="-342900" algn="ctr">
+              <a:spcBef>
+                <a:spcPts val="0"/>
+              </a:spcBef>
+              <a:spcAft>
+                <a:spcPts val="0"/>
+              </a:spcAft>
+              <a:buSzPts val="1800"/>
+              <a:buChar char="●"/>
+              <a:defRPr/>
+            </a:lvl1pPr>
+            <a:lvl2pPr marL="914400" lvl="1" indent="-317500" algn="ctr">
+              <a:spcBef>
+                <a:spcPts val="1600"/>
+              </a:spcBef>
+              <a:spcAft>
+                <a:spcPts val="0"/>
+              </a:spcAft>
+              <a:buSzPts val="1400"/>
+              <a:buChar char="○"/>
+              <a:defRPr/>
+            </a:lvl2pPr>
+            <a:lvl3pPr marL="1371600" lvl="2" indent="-317500" algn="ctr">
+              <a:spcBef>
+                <a:spcPts val="1600"/>
+              </a:spcBef>
+              <a:spcAft>
+                <a:spcPts val="0"/>
+              </a:spcAft>
+              <a:buSzPts val="1400"/>
+              <a:buChar char="■"/>
+              <a:defRPr/>
+            </a:lvl3pPr>
+            <a:lvl4pPr marL="1828800" lvl="3" indent="-317500" algn="ctr">
+              <a:spcBef>
+                <a:spcPts val="1600"/>
+              </a:spcBef>
+              <a:spcAft>
+                <a:spcPts val="0"/>
+              </a:spcAft>
+              <a:buSzPts val="1400"/>
+              <a:buChar char="●"/>
+              <a:defRPr/>
+            </a:lvl4pPr>
+            <a:lvl5pPr marL="2286000" lvl="4" indent="-317500" algn="ctr">
+              <a:spcBef>
+                <a:spcPts val="1600"/>
+              </a:spcBef>
+              <a:spcAft>
+                <a:spcPts val="0"/>
+              </a:spcAft>
+              <a:buSzPts val="1400"/>
+              <a:buChar char="○"/>
+              <a:defRPr/>
+            </a:lvl5pPr>
+            <a:lvl6pPr marL="2743200" lvl="5" indent="-317500" algn="ctr">
+              <a:spcBef>
+                <a:spcPts val="1600"/>
+              </a:spcBef>
+              <a:spcAft>
+                <a:spcPts val="0"/>
+              </a:spcAft>
+              <a:buSzPts val="1400"/>
+              <a:buChar char="■"/>
+              <a:defRPr/>
+            </a:lvl6pPr>
+            <a:lvl7pPr marL="3200400" lvl="6" indent="-317500" algn="ctr">
+              <a:spcBef>
+                <a:spcPts val="1600"/>
+              </a:spcBef>
+              <a:spcAft>
+                <a:spcPts val="0"/>
+              </a:spcAft>
+              <a:buSzPts val="1400"/>
+              <a:buChar char="●"/>
+              <a:defRPr/>
+            </a:lvl7pPr>
+            <a:lvl8pPr marL="3657600" lvl="7" indent="-317500" algn="ctr">
+              <a:spcBef>
+                <a:spcPts val="1600"/>
+              </a:spcBef>
+              <a:spcAft>
+                <a:spcPts val="0"/>
+              </a:spcAft>
+              <a:buSzPts val="1400"/>
+              <a:buChar char="○"/>
+              <a:defRPr/>
+            </a:lvl8pPr>
+            <a:lvl9pPr marL="4114800" lvl="8" indent="-317500" algn="ctr">
+              <a:spcBef>
+                <a:spcPts val="1600"/>
+              </a:spcBef>
+              <a:spcAft>
+                <a:spcPts val="1600"/>
+              </a:spcAft>
+              <a:buSzPts val="1400"/>
+              <a:buChar char="■"/>
+              <a:defRPr/>
+            </a:lvl9pPr>
+          </a:lstStyle>
+          <a:p>
+            <a:endParaRPr/>
+          </a:p>
+        </p:txBody>
+      </p:sp>
+      <p:sp>
+        <p:nvSpPr>
+          <p:cNvPr id="52" name="Google Shape;52;p11"/>
           <p:cNvSpPr txBox="1">
             <a:spLocks noGrp="1"/>
           </p:cNvSpPr>
@@ -6946,11 +6930,10 @@
     <p:sldLayoutId id="2147483651" r:id="rId4"/>
     <p:sldLayoutId id="2147483652" r:id="rId5"/>
     <p:sldLayoutId id="2147483653" r:id="rId6"/>
-    <p:sldLayoutId id="2147483654" r:id="rId7"/>
-    <p:sldLayoutId id="2147483655" r:id="rId8"/>
-    <p:sldLayoutId id="2147483656" r:id="rId9"/>
-    <p:sldLayoutId id="2147483657" r:id="rId10"/>
-    <p:sldLayoutId id="2147483658" r:id="rId11"/>
+    <p:sldLayoutId id="2147483655" r:id="rId7"/>
+    <p:sldLayoutId id="2147483656" r:id="rId8"/>
+    <p:sldLayoutId id="2147483657" r:id="rId9"/>
+    <p:sldLayoutId id="2147483658" r:id="rId10"/>
   </p:sldLayoutIdLst>
   <p:hf sldNum="0" hdr="0" ftr="0" dt="0"/>
   <p:txStyles>
@@ -7997,89 +7980,43 @@
         <p:spPr>
           <a:xfrm>
             <a:off x="0" y="572700"/>
-            <a:ext cx="9144000" cy="1024276"/>
+            <a:ext cx="9144000" cy="486743"/>
           </a:xfrm>
         </p:spPr>
         <p:txBody>
           <a:bodyPr anchor="ctr"/>
           <a:lstStyle/>
           <a:p>
-            <a:pPr marL="114300" indent="0">
+            <a:pPr marL="114300" indent="0" algn="ctr">
               <a:buClr>
                 <a:schemeClr val="bg1"/>
               </a:buClr>
               <a:buNone/>
             </a:pPr>
             <a:r>
-              <a:rPr lang="en-US" sz="1100" dirty="0">
+              <a:rPr lang="en-US" sz="1400" b="1" dirty="0">
                 <a:solidFill>
                   <a:schemeClr val="bg1"/>
                 </a:solidFill>
                 <a:latin typeface="Andale Mono" panose="020B0509000000000004" pitchFamily="49" charset="0"/>
               </a:rPr>
-              <a:t>Comparing popularity scores to both box office gross and budget, and looking at the regression line, we see a slight positive correlation between popularity and higher budgets, and obviously domestic gross (which itself is a measure of popularity).</a:t>
+              <a:t>There is a slight positive correlation between popularity and higher budgets</a:t>
             </a:r>
-          </a:p>
-          <a:p>
-            <a:pPr marL="114300" indent="0">
-              <a:buClr>
-                <a:schemeClr val="bg1"/>
-              </a:buClr>
-              <a:buNone/>
-            </a:pPr>
-            <a:endParaRPr lang="en-US" sz="1100" dirty="0">
+            <a:endParaRPr lang="en-US" sz="1600" b="1" dirty="0">
               <a:solidFill>
                 <a:schemeClr val="bg1"/>
               </a:solidFill>
               <a:latin typeface="Andale Mono" panose="020B0509000000000004" pitchFamily="49" charset="0"/>
             </a:endParaRPr>
           </a:p>
-          <a:p>
-            <a:pPr>
-              <a:lnSpc>
-                <a:spcPct val="64000"/>
-              </a:lnSpc>
-              <a:buClr>
-                <a:schemeClr val="bg1"/>
-              </a:buClr>
-              <a:buFont typeface="System Font Regular"/>
-              <a:buChar char="⦿"/>
-            </a:pPr>
-            <a:r>
-              <a:rPr lang="en-US" sz="1100" dirty="0">
-                <a:solidFill>
-                  <a:schemeClr val="bg1"/>
-                </a:solidFill>
-                <a:latin typeface="Andale Mono" panose="020B0509000000000004" pitchFamily="49" charset="0"/>
-              </a:rPr>
-              <a:t>Higher budget movies are potentially more popular and bring in more gross revenue</a:t>
-            </a:r>
-          </a:p>
-          <a:p>
-            <a:pPr marL="114300" indent="0">
-              <a:lnSpc>
-                <a:spcPct val="64000"/>
-              </a:lnSpc>
-              <a:buClr>
-                <a:schemeClr val="bg1"/>
-              </a:buClr>
-              <a:buNone/>
-            </a:pPr>
-            <a:endParaRPr lang="en-US" sz="1200" dirty="0">
-              <a:solidFill>
-                <a:schemeClr val="bg1"/>
-              </a:solidFill>
-              <a:latin typeface="Andale Mono" panose="020B0509000000000004" pitchFamily="49" charset="0"/>
-            </a:endParaRPr>
-          </a:p>
         </p:txBody>
       </p:sp>
       <p:pic>
         <p:nvPicPr>
-          <p:cNvPr id="12" name="Picture 11" descr="A picture containing chart&#10;&#10;Description automatically generated">
+          <p:cNvPr id="4" name="Picture 3" descr="Chart, scatter chart&#10;&#10;Description automatically generated">
             <a:extLst>
               <a:ext uri="{FF2B5EF4-FFF2-40B4-BE49-F238E27FC236}">
-                <a16:creationId xmlns:a16="http://schemas.microsoft.com/office/drawing/2014/main" id="{F1385726-CB77-8B40-AC72-471233367367}"/>
+                <a16:creationId xmlns:a16="http://schemas.microsoft.com/office/drawing/2014/main" id="{A470DE6E-F70C-F740-A0B4-E34891BF25E6}"/>
               </a:ext>
             </a:extLst>
           </p:cNvPr>
@@ -8090,42 +8027,13 @@
         </p:nvPicPr>
         <p:blipFill rotWithShape="1">
           <a:blip r:embed="rId3"/>
-          <a:srcRect l="6056" t="7017" r="7558" b="6361"/>
+          <a:srcRect l="6107" t="7200" r="6598" b="6225"/>
           <a:stretch/>
         </p:blipFill>
         <p:spPr>
           <a:xfrm>
-            <a:off x="4572000" y="1596976"/>
-            <a:ext cx="4571998" cy="3546523"/>
-          </a:xfrm>
-          <a:prstGeom prst="rect">
-            <a:avLst/>
-          </a:prstGeom>
-        </p:spPr>
-      </p:pic>
-      <p:pic>
-        <p:nvPicPr>
-          <p:cNvPr id="14" name="Picture 13" descr="Graphical user interface&#10;&#10;Description automatically generated with medium confidence">
-            <a:extLst>
-              <a:ext uri="{FF2B5EF4-FFF2-40B4-BE49-F238E27FC236}">
-                <a16:creationId xmlns:a16="http://schemas.microsoft.com/office/drawing/2014/main" id="{20A19206-6A04-AC4D-9ADE-31C173A3430C}"/>
-              </a:ext>
-            </a:extLst>
-          </p:cNvPr>
-          <p:cNvPicPr>
-            <a:picLocks noChangeAspect="1"/>
-          </p:cNvPicPr>
-          <p:nvPr/>
-        </p:nvPicPr>
-        <p:blipFill rotWithShape="1">
-          <a:blip r:embed="rId4"/>
-          <a:srcRect l="4924" t="7440" r="8691" b="5938"/>
-          <a:stretch/>
-        </p:blipFill>
-        <p:spPr>
-          <a:xfrm>
-            <a:off x="0" y="1596977"/>
-            <a:ext cx="4572002" cy="3546523"/>
+            <a:off x="2333429" y="1191874"/>
+            <a:ext cx="4373135" cy="3951626"/>
           </a:xfrm>
           <a:prstGeom prst="rect">
             <a:avLst/>
@@ -8304,7 +8212,7 @@
         <p:spPr>
           <a:xfrm>
             <a:off x="1" y="674915"/>
-            <a:ext cx="3773509" cy="4323804"/>
+            <a:ext cx="3846785" cy="4323804"/>
           </a:xfrm>
         </p:spPr>
         <p:txBody>
@@ -8318,13 +8226,13 @@
               <a:buNone/>
             </a:pPr>
             <a:r>
-              <a:rPr lang="en-US" u="sng" dirty="0">
+              <a:rPr lang="en-US" sz="2400" u="sng" dirty="0">
                 <a:solidFill>
                   <a:schemeClr val="bg1"/>
                 </a:solidFill>
                 <a:latin typeface="Andale Mono" panose="020B0509000000000004" pitchFamily="49" charset="0"/>
               </a:rPr>
-              <a:t>Top Grossing Directors</a:t>
+              <a:t>MOST PROFITABLE DIRECTORS</a:t>
             </a:r>
           </a:p>
           <a:p>
@@ -8334,7 +8242,7 @@
               </a:buClr>
               <a:buNone/>
             </a:pPr>
-            <a:endParaRPr lang="en-US" sz="1200" dirty="0">
+            <a:endParaRPr lang="en-US" sz="1600" dirty="0">
               <a:solidFill>
                 <a:schemeClr val="bg1"/>
               </a:solidFill>
@@ -8349,23 +8257,23 @@
               <a:buNone/>
             </a:pPr>
             <a:r>
-              <a:rPr lang="en-US" dirty="0">
+              <a:rPr lang="en-US" sz="2400" dirty="0">
                 <a:solidFill>
                   <a:schemeClr val="bg1"/>
                 </a:solidFill>
                 <a:latin typeface="Andale Mono" panose="020B0509000000000004" pitchFamily="49" charset="0"/>
               </a:rPr>
-              <a:t>Of the top 30 grossing movies from the last decade, these 20 directors were at the helm of at least one of those.</a:t>
+              <a:t>These 20 directors were at the helm of the most profitable movies.</a:t>
             </a:r>
           </a:p>
         </p:txBody>
       </p:sp>
       <p:pic>
         <p:nvPicPr>
-          <p:cNvPr id="7" name="Picture 6" descr="Chart&#10;&#10;Description automatically generated">
+          <p:cNvPr id="10" name="Picture 9" descr="Chart&#10;&#10;Description automatically generated">
             <a:extLst>
               <a:ext uri="{FF2B5EF4-FFF2-40B4-BE49-F238E27FC236}">
-                <a16:creationId xmlns:a16="http://schemas.microsoft.com/office/drawing/2014/main" id="{A1D1A4FE-B0CE-BA40-8988-81F0C0438AC3}"/>
+                <a16:creationId xmlns:a16="http://schemas.microsoft.com/office/drawing/2014/main" id="{5DBBCA96-DDF1-614A-B0A6-34DEE725A04A}"/>
               </a:ext>
             </a:extLst>
           </p:cNvPr>
@@ -8382,8 +8290,8 @@
         </p:blipFill>
         <p:spPr>
           <a:xfrm>
-            <a:off x="3850782" y="662626"/>
-            <a:ext cx="5293217" cy="4480873"/>
+            <a:off x="3985521" y="674915"/>
+            <a:ext cx="5158479" cy="4400200"/>
           </a:xfrm>
           <a:prstGeom prst="rect">
             <a:avLst/>
@@ -8404,6 +8312,264 @@
 </file>
 
 <file path=ppt/slides/slide12.xml><?xml version="1.0" encoding="utf-8"?>
+<p:sld xmlns:a="http://schemas.openxmlformats.org/drawingml/2006/main" xmlns:r="http://schemas.openxmlformats.org/officeDocument/2006/relationships" xmlns:p="http://schemas.openxmlformats.org/presentationml/2006/main">
+  <p:cSld>
+    <p:bg>
+      <p:bgPr>
+        <a:solidFill>
+          <a:schemeClr val="tx1"/>
+        </a:solidFill>
+        <a:effectLst/>
+      </p:bgPr>
+    </p:bg>
+    <p:spTree>
+      <p:nvGrpSpPr>
+        <p:cNvPr id="1" name="Shape 76"/>
+        <p:cNvGrpSpPr/>
+        <p:nvPr/>
+      </p:nvGrpSpPr>
+      <p:grpSpPr>
+        <a:xfrm>
+          <a:off x="0" y="0"/>
+          <a:ext cx="0" cy="0"/>
+          <a:chOff x="0" y="0"/>
+          <a:chExt cx="0" cy="0"/>
+        </a:xfrm>
+      </p:grpSpPr>
+      <p:sp>
+        <p:nvSpPr>
+          <p:cNvPr id="77" name="Google Shape;77;p16"/>
+          <p:cNvSpPr txBox="1">
+            <a:spLocks noGrp="1"/>
+          </p:cNvSpPr>
+          <p:nvPr>
+            <p:ph type="title"/>
+          </p:nvPr>
+        </p:nvSpPr>
+        <p:spPr>
+          <a:xfrm>
+            <a:off x="311700" y="76088"/>
+            <a:ext cx="8721768" cy="572700"/>
+          </a:xfrm>
+          <a:prstGeom prst="rect">
+            <a:avLst/>
+          </a:prstGeom>
+        </p:spPr>
+        <p:txBody>
+          <a:bodyPr spcFirstLastPara="1" wrap="square" lIns="91425" tIns="91425" rIns="91425" bIns="91425" anchor="t" anchorCtr="0">
+            <a:noAutofit/>
+            <a:scene3d>
+              <a:camera prst="obliqueTopLeft">
+                <a:rot lat="0" lon="0" rev="0"/>
+              </a:camera>
+              <a:lightRig rig="threePt" dir="t"/>
+            </a:scene3d>
+          </a:bodyPr>
+          <a:lstStyle/>
+          <a:p>
+            <a:pPr marL="0" lvl="0" indent="0" algn="l" rtl="0">
+              <a:spcBef>
+                <a:spcPts val="0"/>
+              </a:spcBef>
+              <a:spcAft>
+                <a:spcPts val="0"/>
+              </a:spcAft>
+              <a:buNone/>
+            </a:pPr>
+            <a:r>
+              <a:rPr lang="en" dirty="0">
+                <a:solidFill>
+                  <a:schemeClr val="bg1"/>
+                </a:solidFill>
+                <a:effectLst>
+                  <a:glow rad="139700">
+                    <a:schemeClr val="tx2">
+                      <a:alpha val="40000"/>
+                    </a:schemeClr>
+                  </a:glow>
+                </a:effectLst>
+                <a:latin typeface="Andale Mono" panose="020B0509000000000004" pitchFamily="49" charset="0"/>
+              </a:rPr>
+              <a:t>Results</a:t>
+            </a:r>
+            <a:endParaRPr dirty="0">
+              <a:solidFill>
+                <a:schemeClr val="bg1"/>
+              </a:solidFill>
+              <a:effectLst>
+                <a:glow rad="139700">
+                  <a:schemeClr val="tx2">
+                    <a:alpha val="40000"/>
+                  </a:schemeClr>
+                </a:glow>
+              </a:effectLst>
+              <a:latin typeface="Andale Mono" panose="020B0509000000000004" pitchFamily="49" charset="0"/>
+            </a:endParaRPr>
+          </a:p>
+        </p:txBody>
+      </p:sp>
+      <p:cxnSp>
+        <p:nvCxnSpPr>
+          <p:cNvPr id="5" name="Straight Connector 4">
+            <a:extLst>
+              <a:ext uri="{FF2B5EF4-FFF2-40B4-BE49-F238E27FC236}">
+                <a16:creationId xmlns:a16="http://schemas.microsoft.com/office/drawing/2014/main" id="{B9467874-3FEB-364F-AD86-5258FC6FB8CA}"/>
+              </a:ext>
+            </a:extLst>
+          </p:cNvPr>
+          <p:cNvCxnSpPr>
+            <a:cxnSpLocks/>
+          </p:cNvCxnSpPr>
+          <p:nvPr/>
+        </p:nvCxnSpPr>
+        <p:spPr>
+          <a:xfrm>
+            <a:off x="0" y="648788"/>
+            <a:ext cx="9144000" cy="26127"/>
+          </a:xfrm>
+          <a:prstGeom prst="line">
+            <a:avLst/>
+          </a:prstGeom>
+          <a:ln>
+            <a:solidFill>
+              <a:schemeClr val="bg1"/>
+            </a:solidFill>
+          </a:ln>
+        </p:spPr>
+        <p:style>
+          <a:lnRef idx="1">
+            <a:schemeClr val="accent1"/>
+          </a:lnRef>
+          <a:fillRef idx="0">
+            <a:schemeClr val="accent1"/>
+          </a:fillRef>
+          <a:effectRef idx="0">
+            <a:schemeClr val="accent1"/>
+          </a:effectRef>
+          <a:fontRef idx="minor">
+            <a:schemeClr val="tx1"/>
+          </a:fontRef>
+        </p:style>
+      </p:cxnSp>
+      <p:sp>
+        <p:nvSpPr>
+          <p:cNvPr id="3" name="Text Placeholder 2">
+            <a:extLst>
+              <a:ext uri="{FF2B5EF4-FFF2-40B4-BE49-F238E27FC236}">
+                <a16:creationId xmlns:a16="http://schemas.microsoft.com/office/drawing/2014/main" id="{450BC6C9-55BD-964D-978D-8144B7C339EA}"/>
+              </a:ext>
+            </a:extLst>
+          </p:cNvPr>
+          <p:cNvSpPr>
+            <a:spLocks noGrp="1"/>
+          </p:cNvSpPr>
+          <p:nvPr>
+            <p:ph type="body" idx="1"/>
+          </p:nvPr>
+        </p:nvSpPr>
+        <p:spPr>
+          <a:xfrm>
+            <a:off x="2" y="674915"/>
+            <a:ext cx="3655278" cy="4323804"/>
+          </a:xfrm>
+        </p:spPr>
+        <p:txBody>
+          <a:bodyPr anchor="ctr"/>
+          <a:lstStyle/>
+          <a:p>
+            <a:pPr marL="114300" indent="0">
+              <a:buClr>
+                <a:schemeClr val="bg1"/>
+              </a:buClr>
+              <a:buNone/>
+            </a:pPr>
+            <a:r>
+              <a:rPr lang="en-US" sz="2800" u="sng" dirty="0">
+                <a:solidFill>
+                  <a:schemeClr val="bg1"/>
+                </a:solidFill>
+                <a:latin typeface="Andale Mono" panose="020B0509000000000004" pitchFamily="49" charset="0"/>
+              </a:rPr>
+              <a:t>MOST POPULAR DIRECTORS</a:t>
+            </a:r>
+          </a:p>
+          <a:p>
+            <a:pPr marL="114300" indent="0">
+              <a:buClr>
+                <a:schemeClr val="bg1"/>
+              </a:buClr>
+              <a:buNone/>
+            </a:pPr>
+            <a:endParaRPr lang="en-US" dirty="0">
+              <a:solidFill>
+                <a:schemeClr val="bg1"/>
+              </a:solidFill>
+              <a:latin typeface="Andale Mono" panose="020B0509000000000004" pitchFamily="49" charset="0"/>
+            </a:endParaRPr>
+          </a:p>
+          <a:p>
+            <a:pPr marL="114300" indent="0">
+              <a:buClr>
+                <a:schemeClr val="bg1"/>
+              </a:buClr>
+              <a:buNone/>
+            </a:pPr>
+            <a:r>
+              <a:rPr lang="en-US" sz="2800" dirty="0">
+                <a:solidFill>
+                  <a:schemeClr val="bg1"/>
+                </a:solidFill>
+                <a:latin typeface="Andale Mono" panose="020B0509000000000004" pitchFamily="49" charset="0"/>
+              </a:rPr>
+              <a:t>These 20 directors were at the helm of the most popular movies.</a:t>
+            </a:r>
+          </a:p>
+        </p:txBody>
+      </p:sp>
+      <p:pic>
+        <p:nvPicPr>
+          <p:cNvPr id="9" name="Picture 8" descr="A picture containing chart&#10;&#10;Description automatically generated">
+            <a:extLst>
+              <a:ext uri="{FF2B5EF4-FFF2-40B4-BE49-F238E27FC236}">
+                <a16:creationId xmlns:a16="http://schemas.microsoft.com/office/drawing/2014/main" id="{CBB6A323-77B5-2742-939B-E32A7E0DB695}"/>
+              </a:ext>
+            </a:extLst>
+          </p:cNvPr>
+          <p:cNvPicPr>
+            <a:picLocks noChangeAspect="1"/>
+          </p:cNvPicPr>
+          <p:nvPr/>
+        </p:nvPicPr>
+        <p:blipFill>
+          <a:blip r:embed="rId3"/>
+          <a:stretch>
+            <a:fillRect/>
+          </a:stretch>
+        </p:blipFill>
+        <p:spPr>
+          <a:xfrm>
+            <a:off x="3655281" y="661851"/>
+            <a:ext cx="5488717" cy="4405561"/>
+          </a:xfrm>
+          <a:prstGeom prst="rect">
+            <a:avLst/>
+          </a:prstGeom>
+        </p:spPr>
+      </p:pic>
+    </p:spTree>
+    <p:extLst>
+      <p:ext uri="{BB962C8B-B14F-4D97-AF65-F5344CB8AC3E}">
+        <p14:creationId xmlns:p14="http://schemas.microsoft.com/office/powerpoint/2010/main" val="3257785371"/>
+      </p:ext>
+    </p:extLst>
+  </p:cSld>
+  <p:clrMapOvr>
+    <a:masterClrMapping/>
+  </p:clrMapOvr>
+</p:sld>
+</file>
+
+<file path=ppt/slides/slide13.xml><?xml version="1.0" encoding="utf-8"?>
 <p:sld xmlns:a="http://schemas.openxmlformats.org/drawingml/2006/main" xmlns:r="http://schemas.openxmlformats.org/officeDocument/2006/relationships" xmlns:p="http://schemas.openxmlformats.org/presentationml/2006/main">
   <p:cSld>
     <p:bg>
@@ -8573,13 +8739,13 @@
               </a:buClr>
             </a:pPr>
             <a:r>
-              <a:rPr lang="en-US" sz="2000" dirty="0">
+              <a:rPr lang="en-US" sz="2400" dirty="0">
                 <a:solidFill>
                   <a:schemeClr val="bg1"/>
                 </a:solidFill>
                 <a:latin typeface="Andale Mono" panose="020B0509000000000004" pitchFamily="49" charset="0"/>
               </a:rPr>
-              <a:t>Microsoft should look to acquire the rights to a super-hero / comic book franchise, or possibly another type of action franchise (e.g., Hunger Games)</a:t>
+              <a:t>Microsoft should acquire the rights to a super-hero / comic book franchise, or possibly another type of action franchise </a:t>
             </a:r>
           </a:p>
           <a:p>
@@ -8618,8 +8784,8 @@
               <a:buClr>
                 <a:schemeClr val="bg1"/>
               </a:buClr>
-              <a:buFont typeface="Wingdings" pitchFamily="2" charset="2"/>
-              <a:buChar char="Ø"/>
+              <a:buFont typeface="Courier New" panose="02070309020205020404" pitchFamily="49" charset="0"/>
+              <a:buChar char="o"/>
             </a:pPr>
             <a:r>
               <a:rPr lang="en-US" sz="2000" dirty="0">
@@ -8628,7 +8794,7 @@
                 </a:solidFill>
                 <a:latin typeface="Andale Mono" panose="020B0509000000000004" pitchFamily="49" charset="0"/>
               </a:rPr>
-              <a:t>The most popular genre, by far, is the action genre</a:t>
+              <a:t>The most popular and profitable genre is action </a:t>
             </a:r>
           </a:p>
           <a:p>
@@ -8636,35 +8802,17 @@
               <a:buClr>
                 <a:schemeClr val="bg1"/>
               </a:buClr>
-              <a:buFont typeface="Wingdings" pitchFamily="2" charset="2"/>
-              <a:buChar char="Ø"/>
+              <a:buFont typeface="Courier New" panose="02070309020205020404" pitchFamily="49" charset="0"/>
+              <a:buChar char="o"/>
             </a:pPr>
             <a:r>
-              <a:rPr lang="en-US" sz="1200" dirty="0">
+              <a:rPr lang="en-US" sz="1600" dirty="0">
                 <a:solidFill>
                   <a:schemeClr val="bg1"/>
                 </a:solidFill>
                 <a:latin typeface="Andale Mono" panose="020B0509000000000004" pitchFamily="49" charset="0"/>
               </a:rPr>
-              <a:t>Within this genre, the most successful movies by both profitability and popularity were in the superhero / comic book sub-genre</a:t>
-            </a:r>
-          </a:p>
-          <a:p>
-            <a:pPr lvl="1">
-              <a:buClr>
-                <a:schemeClr val="bg1"/>
-              </a:buClr>
-              <a:buFont typeface="Wingdings" pitchFamily="2" charset="2"/>
-              <a:buChar char="Ø"/>
-            </a:pPr>
-            <a:r>
-              <a:rPr lang="en-US" sz="1200" dirty="0">
-                <a:solidFill>
-                  <a:schemeClr val="bg1"/>
-                </a:solidFill>
-                <a:latin typeface="Andale Mono" panose="020B0509000000000004" pitchFamily="49" charset="0"/>
-              </a:rPr>
-              <a:t>Most were part of a franchise of films</a:t>
+              <a:t>The most successful movies by both profitability and popularity were in the superhero / comic book sub-genre   and all were franchises</a:t>
             </a:r>
           </a:p>
           <a:p>
@@ -8709,7 +8857,232 @@
 </p:sld>
 </file>
 
-<file path=ppt/slides/slide13.xml><?xml version="1.0" encoding="utf-8"?>
+<file path=ppt/slides/slide14.xml><?xml version="1.0" encoding="utf-8"?>
+<p:sld xmlns:a="http://schemas.openxmlformats.org/drawingml/2006/main" xmlns:r="http://schemas.openxmlformats.org/officeDocument/2006/relationships" xmlns:p="http://schemas.openxmlformats.org/presentationml/2006/main">
+  <p:cSld>
+    <p:bg>
+      <p:bgPr>
+        <a:solidFill>
+          <a:schemeClr val="tx1"/>
+        </a:solidFill>
+        <a:effectLst/>
+      </p:bgPr>
+    </p:bg>
+    <p:spTree>
+      <p:nvGrpSpPr>
+        <p:cNvPr id="1" name="Shape 76"/>
+        <p:cNvGrpSpPr/>
+        <p:nvPr/>
+      </p:nvGrpSpPr>
+      <p:grpSpPr>
+        <a:xfrm>
+          <a:off x="0" y="0"/>
+          <a:ext cx="0" cy="0"/>
+          <a:chOff x="0" y="0"/>
+          <a:chExt cx="0" cy="0"/>
+        </a:xfrm>
+      </p:grpSpPr>
+      <p:sp>
+        <p:nvSpPr>
+          <p:cNvPr id="77" name="Google Shape;77;p16"/>
+          <p:cNvSpPr txBox="1">
+            <a:spLocks noGrp="1"/>
+          </p:cNvSpPr>
+          <p:nvPr>
+            <p:ph type="title"/>
+          </p:nvPr>
+        </p:nvSpPr>
+        <p:spPr>
+          <a:xfrm>
+            <a:off x="311700" y="241619"/>
+            <a:ext cx="8721768" cy="572700"/>
+          </a:xfrm>
+          <a:prstGeom prst="rect">
+            <a:avLst/>
+          </a:prstGeom>
+        </p:spPr>
+        <p:txBody>
+          <a:bodyPr spcFirstLastPara="1" wrap="square" lIns="91425" tIns="91425" rIns="91425" bIns="91425" anchor="t" anchorCtr="0">
+            <a:noAutofit/>
+            <a:scene3d>
+              <a:camera prst="obliqueTopLeft">
+                <a:rot lat="0" lon="0" rev="0"/>
+              </a:camera>
+              <a:lightRig rig="threePt" dir="t"/>
+            </a:scene3d>
+          </a:bodyPr>
+          <a:lstStyle/>
+          <a:p>
+            <a:pPr marL="0" lvl="0" indent="0" algn="l" rtl="0">
+              <a:spcBef>
+                <a:spcPts val="0"/>
+              </a:spcBef>
+              <a:spcAft>
+                <a:spcPts val="0"/>
+              </a:spcAft>
+              <a:buNone/>
+            </a:pPr>
+            <a:r>
+              <a:rPr lang="en" dirty="0">
+                <a:solidFill>
+                  <a:schemeClr val="bg1"/>
+                </a:solidFill>
+                <a:effectLst>
+                  <a:glow rad="139700">
+                    <a:schemeClr val="tx2">
+                      <a:alpha val="40000"/>
+                    </a:schemeClr>
+                  </a:glow>
+                </a:effectLst>
+                <a:latin typeface="Andale Mono" panose="020B0509000000000004" pitchFamily="49" charset="0"/>
+              </a:rPr>
+              <a:t>Conclusions</a:t>
+            </a:r>
+            <a:endParaRPr dirty="0">
+              <a:solidFill>
+                <a:schemeClr val="bg1"/>
+              </a:solidFill>
+              <a:effectLst>
+                <a:glow rad="139700">
+                  <a:schemeClr val="tx2">
+                    <a:alpha val="40000"/>
+                  </a:schemeClr>
+                </a:glow>
+              </a:effectLst>
+              <a:latin typeface="Andale Mono" panose="020B0509000000000004" pitchFamily="49" charset="0"/>
+            </a:endParaRPr>
+          </a:p>
+        </p:txBody>
+      </p:sp>
+      <p:cxnSp>
+        <p:nvCxnSpPr>
+          <p:cNvPr id="5" name="Straight Connector 4">
+            <a:extLst>
+              <a:ext uri="{FF2B5EF4-FFF2-40B4-BE49-F238E27FC236}">
+                <a16:creationId xmlns:a16="http://schemas.microsoft.com/office/drawing/2014/main" id="{B9467874-3FEB-364F-AD86-5258FC6FB8CA}"/>
+              </a:ext>
+            </a:extLst>
+          </p:cNvPr>
+          <p:cNvCxnSpPr/>
+          <p:nvPr/>
+        </p:nvCxnSpPr>
+        <p:spPr>
+          <a:xfrm>
+            <a:off x="311700" y="834925"/>
+            <a:ext cx="8520600" cy="0"/>
+          </a:xfrm>
+          <a:prstGeom prst="line">
+            <a:avLst/>
+          </a:prstGeom>
+          <a:ln>
+            <a:solidFill>
+              <a:schemeClr val="bg1"/>
+            </a:solidFill>
+          </a:ln>
+        </p:spPr>
+        <p:style>
+          <a:lnRef idx="1">
+            <a:schemeClr val="accent1"/>
+          </a:lnRef>
+          <a:fillRef idx="0">
+            <a:schemeClr val="accent1"/>
+          </a:fillRef>
+          <a:effectRef idx="0">
+            <a:schemeClr val="accent1"/>
+          </a:effectRef>
+          <a:fontRef idx="minor">
+            <a:schemeClr val="tx1"/>
+          </a:fontRef>
+        </p:style>
+      </p:cxnSp>
+      <p:sp>
+        <p:nvSpPr>
+          <p:cNvPr id="3" name="Text Placeholder 2">
+            <a:extLst>
+              <a:ext uri="{FF2B5EF4-FFF2-40B4-BE49-F238E27FC236}">
+                <a16:creationId xmlns:a16="http://schemas.microsoft.com/office/drawing/2014/main" id="{450BC6C9-55BD-964D-978D-8144B7C339EA}"/>
+              </a:ext>
+            </a:extLst>
+          </p:cNvPr>
+          <p:cNvSpPr>
+            <a:spLocks noGrp="1"/>
+          </p:cNvSpPr>
+          <p:nvPr>
+            <p:ph type="body" idx="1"/>
+          </p:nvPr>
+        </p:nvSpPr>
+        <p:spPr>
+          <a:xfrm>
+            <a:off x="94592" y="1160342"/>
+            <a:ext cx="9049407" cy="3591231"/>
+          </a:xfrm>
+        </p:spPr>
+        <p:txBody>
+          <a:bodyPr/>
+          <a:lstStyle/>
+          <a:p>
+            <a:pPr marL="114300" indent="0" algn="ctr">
+              <a:buClr>
+                <a:schemeClr val="bg1"/>
+              </a:buClr>
+              <a:buNone/>
+            </a:pPr>
+            <a:r>
+              <a:rPr lang="en-US" sz="4800" dirty="0">
+                <a:solidFill>
+                  <a:schemeClr val="bg1"/>
+                </a:solidFill>
+                <a:latin typeface="Andale Mono" panose="020B0509000000000004" pitchFamily="49" charset="0"/>
+              </a:rPr>
+              <a:t>Microsoft should produce animated movies</a:t>
+            </a:r>
+          </a:p>
+          <a:p>
+            <a:pPr algn="ctr">
+              <a:buClr>
+                <a:schemeClr val="bg1"/>
+              </a:buClr>
+            </a:pPr>
+            <a:endParaRPr lang="en-US" sz="3200" dirty="0">
+              <a:solidFill>
+                <a:schemeClr val="bg1"/>
+              </a:solidFill>
+              <a:latin typeface="Andale Mono" panose="020B0509000000000004" pitchFamily="49" charset="0"/>
+            </a:endParaRPr>
+          </a:p>
+          <a:p>
+            <a:pPr marL="114300" indent="0" algn="ctr">
+              <a:buClr>
+                <a:schemeClr val="bg1"/>
+              </a:buClr>
+              <a:buNone/>
+            </a:pPr>
+            <a:r>
+              <a:rPr lang="en-US" sz="3200" dirty="0">
+                <a:solidFill>
+                  <a:schemeClr val="bg1"/>
+                </a:solidFill>
+                <a:latin typeface="Andale Mono" panose="020B0509000000000004" pitchFamily="49" charset="0"/>
+              </a:rPr>
+              <a:t>15 of the top 30 most profitable were animation</a:t>
+            </a:r>
+          </a:p>
+        </p:txBody>
+      </p:sp>
+    </p:spTree>
+    <p:extLst>
+      <p:ext uri="{BB962C8B-B14F-4D97-AF65-F5344CB8AC3E}">
+        <p14:creationId xmlns:p14="http://schemas.microsoft.com/office/powerpoint/2010/main" val="1513662984"/>
+      </p:ext>
+    </p:extLst>
+  </p:cSld>
+  <p:clrMapOvr>
+    <a:masterClrMapping/>
+  </p:clrMapOvr>
+</p:sld>
+</file>
+
+<file path=ppt/slides/slide15.xml><?xml version="1.0" encoding="utf-8"?>
 <p:sld xmlns:a="http://schemas.openxmlformats.org/drawingml/2006/main" xmlns:r="http://schemas.openxmlformats.org/officeDocument/2006/relationships" xmlns:p="http://schemas.openxmlformats.org/presentationml/2006/main">
   <p:cSld>
     <p:bg>
@@ -8873,53 +9246,22 @@
           <a:bodyPr/>
           <a:lstStyle/>
           <a:p>
-            <a:pPr>
+            <a:pPr marL="0" indent="0" algn="ctr">
               <a:buClr>
                 <a:schemeClr val="bg1"/>
               </a:buClr>
+              <a:buNone/>
             </a:pPr>
             <a:r>
-              <a:rPr lang="en-US" sz="2400" dirty="0">
+              <a:rPr lang="en-US" sz="3200" dirty="0">
                 <a:solidFill>
                   <a:schemeClr val="bg1"/>
                 </a:solidFill>
                 <a:latin typeface="Andale Mono" panose="020B0509000000000004" pitchFamily="49" charset="0"/>
               </a:rPr>
-              <a:t>Microsoft should look to produce animated movies as well</a:t>
+              <a:t>Microsoft should attach top grossing and popular directors</a:t>
             </a:r>
-          </a:p>
-          <a:p>
-            <a:pPr lvl="1">
-              <a:buClr>
-                <a:schemeClr val="bg1"/>
-              </a:buClr>
-            </a:pPr>
-            <a:r>
-              <a:rPr lang="en-US" sz="1800" dirty="0">
-                <a:solidFill>
-                  <a:schemeClr val="bg1"/>
-                </a:solidFill>
-                <a:latin typeface="Andale Mono" panose="020B0509000000000004" pitchFamily="49" charset="0"/>
-              </a:rPr>
-              <a:t>12 of the top 30 most profitable movies were animated</a:t>
-            </a:r>
-          </a:p>
-          <a:p>
-            <a:pPr lvl="1">
-              <a:buClr>
-                <a:schemeClr val="bg1"/>
-              </a:buClr>
-            </a:pPr>
-            <a:r>
-              <a:rPr lang="en-US" sz="1800" dirty="0">
-                <a:solidFill>
-                  <a:schemeClr val="bg1"/>
-                </a:solidFill>
-                <a:latin typeface="Andale Mono" panose="020B0509000000000004" pitchFamily="49" charset="0"/>
-              </a:rPr>
-              <a:t>Animation was also one of the most popular genres</a:t>
-            </a:r>
-            <a:endParaRPr lang="en-US" sz="2000" dirty="0">
+            <a:endParaRPr lang="en-US" sz="2800" dirty="0">
               <a:solidFill>
                 <a:schemeClr val="bg1"/>
               </a:solidFill>
@@ -8927,27 +9269,31 @@
             </a:endParaRPr>
           </a:p>
           <a:p>
-            <a:pPr marL="114300" indent="0">
+            <a:pPr marL="0" lvl="1" indent="0" algn="ctr">
+              <a:spcBef>
+                <a:spcPts val="0"/>
+              </a:spcBef>
               <a:buClr>
                 <a:schemeClr val="bg1"/>
               </a:buClr>
               <a:buNone/>
             </a:pPr>
-            <a:r>
-              <a:rPr lang="en-US" sz="2000" dirty="0">
-                <a:solidFill>
-                  <a:schemeClr val="bg1"/>
-                </a:solidFill>
-                <a:latin typeface="Andale Mono" panose="020B0509000000000004" pitchFamily="49" charset="0"/>
-              </a:rPr>
-              <a:t>______</a:t>
-            </a:r>
-          </a:p>
-          <a:p>
-            <a:pPr>
+            <a:endParaRPr lang="en-US" sz="2400" dirty="0">
+              <a:solidFill>
+                <a:schemeClr val="bg1"/>
+              </a:solidFill>
+              <a:latin typeface="Andale Mono" panose="020B0509000000000004" pitchFamily="49" charset="0"/>
+            </a:endParaRPr>
+          </a:p>
+          <a:p>
+            <a:pPr marL="0" lvl="1" indent="0" algn="ctr">
+              <a:spcBef>
+                <a:spcPts val="0"/>
+              </a:spcBef>
               <a:buClr>
                 <a:schemeClr val="bg1"/>
               </a:buClr>
+              <a:buNone/>
             </a:pPr>
             <a:r>
               <a:rPr lang="en-US" sz="2400" dirty="0">
@@ -8956,23 +9302,83 @@
                 </a:solidFill>
                 <a:latin typeface="Andale Mono" panose="020B0509000000000004" pitchFamily="49" charset="0"/>
               </a:rPr>
-              <a:t>Microsoft should attach top grossing directors and talent to their projects. </a:t>
+              <a:t>They are the leaders on set</a:t>
             </a:r>
           </a:p>
           <a:p>
-            <a:pPr lvl="1">
+            <a:pPr marL="342900" lvl="1" indent="-342900" algn="ctr">
+              <a:spcBef>
+                <a:spcPts val="0"/>
+              </a:spcBef>
               <a:buClr>
                 <a:schemeClr val="bg1"/>
               </a:buClr>
             </a:pPr>
+            <a:endParaRPr lang="en-US" sz="2400" dirty="0">
+              <a:solidFill>
+                <a:schemeClr val="bg1"/>
+              </a:solidFill>
+              <a:latin typeface="Andale Mono" panose="020B0509000000000004" pitchFamily="49" charset="0"/>
+            </a:endParaRPr>
+          </a:p>
+          <a:p>
+            <a:pPr marL="0" lvl="1" indent="0" algn="ctr">
+              <a:spcBef>
+                <a:spcPts val="0"/>
+              </a:spcBef>
+              <a:buClr>
+                <a:schemeClr val="bg1"/>
+              </a:buClr>
+              <a:buNone/>
+            </a:pPr>
             <a:r>
-              <a:rPr lang="en-US" sz="2000" dirty="0">
+              <a:rPr lang="en-US" sz="2400" dirty="0">
                 <a:solidFill>
                   <a:schemeClr val="bg1"/>
                 </a:solidFill>
                 <a:latin typeface="Andale Mono" panose="020B0509000000000004" pitchFamily="49" charset="0"/>
               </a:rPr>
-              <a:t>Top talent will bring buzz and notoriety, which will bring audiences and profits</a:t>
+              <a:t>Bring buzz and notoriety,</a:t>
+            </a:r>
+          </a:p>
+          <a:p>
+            <a:pPr marL="0" lvl="1" indent="0" algn="ctr">
+              <a:spcBef>
+                <a:spcPts val="0"/>
+              </a:spcBef>
+              <a:buClr>
+                <a:schemeClr val="bg1"/>
+              </a:buClr>
+              <a:buNone/>
+            </a:pPr>
+            <a:r>
+              <a:rPr lang="en-US" sz="2400" dirty="0">
+                <a:solidFill>
+                  <a:schemeClr val="bg1"/>
+                </a:solidFill>
+                <a:latin typeface="Andale Mono" panose="020B0509000000000004" pitchFamily="49" charset="0"/>
+              </a:rPr>
+              <a:t>as well as top talent</a:t>
+            </a:r>
+          </a:p>
+          <a:p>
+            <a:pPr marL="0" lvl="1" indent="0" algn="ctr">
+              <a:spcBef>
+                <a:spcPts val="0"/>
+              </a:spcBef>
+              <a:buClr>
+                <a:schemeClr val="bg1"/>
+              </a:buClr>
+              <a:buNone/>
+            </a:pPr>
+            <a:r>
+              <a:rPr lang="en-US" sz="2400" dirty="0">
+                <a:solidFill>
+                  <a:schemeClr val="bg1"/>
+                </a:solidFill>
+                <a:latin typeface="Andale Mono" panose="020B0509000000000004" pitchFamily="49" charset="0"/>
+              </a:rPr>
+              <a:t>and collaborative investment</a:t>
             </a:r>
           </a:p>
           <a:p>
@@ -9007,7 +9413,7 @@
     </p:spTree>
     <p:extLst>
       <p:ext uri="{BB962C8B-B14F-4D97-AF65-F5344CB8AC3E}">
-        <p14:creationId xmlns:p14="http://schemas.microsoft.com/office/powerpoint/2010/main" val="1513662984"/>
+        <p14:creationId xmlns:p14="http://schemas.microsoft.com/office/powerpoint/2010/main" val="486246823"/>
       </p:ext>
     </p:extLst>
   </p:cSld>
@@ -9017,12 +9423,20 @@
 </p:sld>
 </file>
 
-<file path=ppt/slides/slide14.xml><?xml version="1.0" encoding="utf-8"?>
+<file path=ppt/slides/slide16.xml><?xml version="1.0" encoding="utf-8"?>
 <p:sld xmlns:a="http://schemas.openxmlformats.org/drawingml/2006/main" xmlns:r="http://schemas.openxmlformats.org/officeDocument/2006/relationships" xmlns:p="http://schemas.openxmlformats.org/presentationml/2006/main">
   <p:cSld>
+    <p:bg>
+      <p:bgPr>
+        <a:solidFill>
+          <a:schemeClr val="tx2"/>
+        </a:solidFill>
+        <a:effectLst/>
+      </p:bgPr>
+    </p:bg>
     <p:spTree>
       <p:nvGrpSpPr>
-        <p:cNvPr id="1" name="Shape 106"/>
+        <p:cNvPr id="1" name="Shape 70"/>
         <p:cNvGrpSpPr/>
         <p:nvPr/>
       </p:nvGrpSpPr>
@@ -9036,7 +9450,7 @@
       </p:grpSpPr>
       <p:sp>
         <p:nvSpPr>
-          <p:cNvPr id="107" name="Google Shape;107;p21"/>
+          <p:cNvPr id="71" name="Google Shape;71;p15"/>
           <p:cNvSpPr txBox="1">
             <a:spLocks noGrp="1"/>
           </p:cNvSpPr>
@@ -9046,138 +9460,162 @@
         </p:nvSpPr>
         <p:spPr>
           <a:xfrm>
-            <a:off x="490250" y="526350"/>
-            <a:ext cx="7715400" cy="4090800"/>
+            <a:off x="338652" y="2104779"/>
+            <a:ext cx="4045200" cy="933941"/>
           </a:xfrm>
-          <a:prstGeom prst="rect">
-            <a:avLst/>
-          </a:prstGeom>
+        </p:spPr>
+        <p:txBody>
+          <a:bodyPr spcFirstLastPara="1" wrap="square" lIns="91425" tIns="91425" rIns="91425" bIns="91425" anchor="b" anchorCtr="0">
+            <a:normAutofit fontScale="90000"/>
+            <a:scene3d>
+              <a:camera prst="isometricOffAxis1Right"/>
+              <a:lightRig rig="threePt" dir="t"/>
+            </a:scene3d>
+          </a:bodyPr>
+          <a:lstStyle/>
+          <a:p>
+            <a:pPr marL="0" lvl="0" indent="0" rtl="0">
+              <a:spcBef>
+                <a:spcPts val="0"/>
+              </a:spcBef>
+              <a:spcAft>
+                <a:spcPts val="0"/>
+              </a:spcAft>
+              <a:buNone/>
+            </a:pPr>
+            <a:r>
+              <a:rPr lang="en" sz="5400" b="1" dirty="0">
+                <a:solidFill>
+                  <a:schemeClr val="tx1"/>
+                </a:solidFill>
+                <a:effectLst>
+                  <a:outerShdw blurRad="87005" sx="152000" sy="152000" rotWithShape="0">
+                    <a:prstClr val="black">
+                      <a:alpha val="25000"/>
+                    </a:prstClr>
+                  </a:outerShdw>
+                </a:effectLst>
+                <a:latin typeface="Andale Mono" panose="020B0509000000000004" pitchFamily="49" charset="0"/>
+              </a:rPr>
+              <a:t>Questions</a:t>
+            </a:r>
+            <a:endParaRPr lang="en-US" sz="5400" b="1" dirty="0">
+              <a:solidFill>
+                <a:schemeClr val="tx1"/>
+              </a:solidFill>
+              <a:effectLst>
+                <a:outerShdw blurRad="87005" sx="152000" sy="152000" rotWithShape="0">
+                  <a:prstClr val="black">
+                    <a:alpha val="25000"/>
+                  </a:prstClr>
+                </a:outerShdw>
+              </a:effectLst>
+              <a:latin typeface="Andale Mono" panose="020B0509000000000004" pitchFamily="49" charset="0"/>
+            </a:endParaRPr>
+          </a:p>
+        </p:txBody>
+      </p:sp>
+      <p:sp>
+        <p:nvSpPr>
+          <p:cNvPr id="72" name="Google Shape;72;p15"/>
+          <p:cNvSpPr txBox="1">
+            <a:spLocks noGrp="1"/>
+          </p:cNvSpPr>
+          <p:nvPr>
+            <p:ph type="body" idx="2"/>
+          </p:nvPr>
+        </p:nvSpPr>
+        <p:spPr>
+          <a:xfrm>
+            <a:off x="4760150" y="1585503"/>
+            <a:ext cx="4383850" cy="1972492"/>
+          </a:xfrm>
         </p:spPr>
         <p:txBody>
           <a:bodyPr spcFirstLastPara="1" wrap="square" lIns="91425" tIns="91425" rIns="91425" bIns="91425" anchor="ctr" anchorCtr="0">
-            <a:noAutofit/>
+            <a:normAutofit/>
           </a:bodyPr>
           <a:lstStyle/>
           <a:p>
-            <a:pPr marL="0" lvl="0" indent="0" algn="l" rtl="0">
-              <a:spcBef>
-                <a:spcPts val="0"/>
-              </a:spcBef>
-              <a:spcAft>
-                <a:spcPts val="0"/>
-              </a:spcAft>
+            <a:pPr marL="0" lvl="0" indent="0">
               <a:buNone/>
             </a:pPr>
             <a:r>
-              <a:rPr lang="en" dirty="0"/>
+              <a:rPr lang="en-US" dirty="0"/>
               <a:t>Thank You!</a:t>
             </a:r>
-            <a:endParaRPr dirty="0"/>
-          </a:p>
-          <a:p>
-            <a:pPr marL="0" lvl="0" indent="0" algn="l" rtl="0">
-              <a:spcBef>
-                <a:spcPts val="0"/>
-              </a:spcBef>
-              <a:spcAft>
-                <a:spcPts val="0"/>
-              </a:spcAft>
-              <a:buNone/>
-            </a:pPr>
-            <a:endParaRPr sz="2000" b="1" dirty="0"/>
-          </a:p>
-          <a:p>
-            <a:pPr marL="0" lvl="0" indent="0" algn="l" rtl="0">
-              <a:spcBef>
-                <a:spcPts val="0"/>
-              </a:spcBef>
-              <a:spcAft>
-                <a:spcPts val="0"/>
-              </a:spcAft>
+          </a:p>
+          <a:p>
+            <a:pPr marL="0" lvl="0" indent="0">
+              <a:buNone/>
+            </a:pPr>
+            <a:endParaRPr lang="en-US" b="1" dirty="0"/>
+          </a:p>
+          <a:p>
+            <a:pPr marL="0" lvl="0" indent="0">
               <a:buNone/>
             </a:pPr>
             <a:r>
-              <a:rPr lang="en" sz="2000" b="1" dirty="0"/>
-              <a:t>Email:</a:t>
+              <a:rPr lang="en-US" sz="1600" dirty="0"/>
+              <a:t>Email: </a:t>
             </a:r>
             <a:r>
-              <a:rPr lang="en" sz="2000" dirty="0"/>
-              <a:t> </a:t>
-            </a:r>
-            <a:r>
-              <a:rPr lang="en-US" sz="2000" u="sng" dirty="0">
+              <a:rPr lang="en-US" sz="1600" dirty="0">
                 <a:solidFill>
                   <a:schemeClr val="hlink"/>
                 </a:solidFill>
               </a:rPr>
               <a:t>sudomakecoffee1@gmail.com</a:t>
             </a:r>
-            <a:endParaRPr sz="2000" dirty="0"/>
-          </a:p>
-          <a:p>
-            <a:pPr marL="0" lvl="0" indent="0" algn="l" rtl="0">
-              <a:spcBef>
-                <a:spcPts val="0"/>
-              </a:spcBef>
-              <a:spcAft>
-                <a:spcPts val="0"/>
-              </a:spcAft>
+            <a:endParaRPr lang="en-US" sz="1600" dirty="0"/>
+          </a:p>
+          <a:p>
+            <a:pPr marL="0" lvl="0" indent="0">
               <a:buNone/>
             </a:pPr>
             <a:r>
-              <a:rPr lang="en" sz="2000" b="1" dirty="0"/>
-              <a:t>GitHub:</a:t>
+              <a:rPr lang="en-US" sz="1600" dirty="0"/>
+              <a:t>GitHub: </a:t>
             </a:r>
             <a:r>
-              <a:rPr lang="en" sz="2000" dirty="0"/>
-              <a:t> </a:t>
+              <a:rPr lang="en-US" sz="1600" dirty="0">
+                <a:solidFill>
+                  <a:srgbClr val="FF0000"/>
+                </a:solidFill>
+              </a:rPr>
+              <a:t>@patrick-anastasio</a:t>
+            </a:r>
+          </a:p>
+          <a:p>
+            <a:pPr marL="0" lvl="0" indent="0">
+              <a:buNone/>
+            </a:pPr>
+            <a:r>
+              <a:rPr lang="en-US" sz="1600" dirty="0"/>
+              <a:t>LinkedIn: </a:t>
             </a:r>
             <a:r>
-              <a:rPr lang="en" sz="2000" dirty="0">
-                <a:hlinkClick r:id="rId3"/>
-              </a:rPr>
-              <a:t>@</a:t>
-            </a:r>
-            <a:r>
-              <a:rPr lang="en-US" sz="2000" dirty="0">
-                <a:hlinkClick r:id="rId3"/>
-              </a:rPr>
-              <a:t>patrick-anastasio</a:t>
-            </a:r>
-            <a:endParaRPr sz="2000" dirty="0"/>
-          </a:p>
-          <a:p>
-            <a:pPr marL="0" lvl="0" indent="0" algn="l" rtl="0">
-              <a:spcBef>
-                <a:spcPts val="0"/>
-              </a:spcBef>
-              <a:spcAft>
-                <a:spcPts val="0"/>
-              </a:spcAft>
-              <a:buNone/>
-            </a:pPr>
-            <a:r>
-              <a:rPr lang="en" sz="2000" b="1" dirty="0"/>
-              <a:t>LinkedIn:</a:t>
-            </a:r>
-            <a:r>
-              <a:rPr lang="en" sz="2000" dirty="0"/>
-              <a:t> </a:t>
-            </a:r>
-            <a:r>
-              <a:rPr lang="en" sz="2000" u="sng" dirty="0">
+              <a:rPr lang="en-US" sz="1600" dirty="0">
                 <a:solidFill>
                   <a:schemeClr val="hlink"/>
                 </a:solidFill>
-                <a:hlinkClick r:id="rId4"/>
               </a:rPr>
               <a:t>linkedin.com/in/patrickanastasio/</a:t>
             </a:r>
-            <a:endParaRPr sz="2000" dirty="0"/>
+            <a:endParaRPr lang="en-US" sz="1600" dirty="0">
+              <a:solidFill>
+                <a:schemeClr val="tx2"/>
+              </a:solidFill>
+            </a:endParaRPr>
           </a:p>
         </p:txBody>
       </p:sp>
     </p:spTree>
+    <p:extLst>
+      <p:ext uri="{BB962C8B-B14F-4D97-AF65-F5344CB8AC3E}">
+        <p14:creationId xmlns:p14="http://schemas.microsoft.com/office/powerpoint/2010/main" val="340274305"/>
+      </p:ext>
+    </p:extLst>
   </p:cSld>
   <p:clrMapOvr>
     <a:masterClrMapping/>
@@ -9317,7 +9755,7 @@
                 </a:solidFill>
                 <a:latin typeface="Andale Mono" panose="020B0509000000000004" pitchFamily="49" charset="0"/>
               </a:rPr>
-              <a:t>Analysis of industry data reveal opportunities for success and profitability through smart investment in: </a:t>
+              <a:t>Analysis of industry data reveal opportunities for success through smart investment in: </a:t>
             </a:r>
             <a:endParaRPr lang="en-US" dirty="0">
               <a:solidFill>
@@ -9415,7 +9853,7 @@
                 </a:solidFill>
                 <a:latin typeface="Andale Mono" panose="020B0509000000000004" pitchFamily="49" charset="0"/>
               </a:rPr>
-              <a:t>Attached names of buzzworthy directors and talent</a:t>
+              <a:t>Attach names of buzzworthy directors</a:t>
             </a:r>
           </a:p>
         </p:txBody>
@@ -9627,7 +10065,7 @@
                   <a:schemeClr val="tx2"/>
                 </a:solidFill>
               </a:rPr>
-              <a:t>Data</a:t>
+              <a:t>The Data</a:t>
             </a:r>
           </a:p>
           <a:p>
@@ -9651,7 +10089,7 @@
                   <a:schemeClr val="tx2"/>
                 </a:solidFill>
               </a:rPr>
-              <a:t>Methods</a:t>
+              <a:t>The Method</a:t>
             </a:r>
           </a:p>
           <a:p>
@@ -9821,8 +10259,8 @@
         </p:nvSpPr>
         <p:spPr>
           <a:xfrm>
-            <a:off x="311700" y="1262135"/>
-            <a:ext cx="8520600" cy="3611616"/>
+            <a:off x="311700" y="1740513"/>
+            <a:ext cx="8520600" cy="3133238"/>
           </a:xfrm>
           <a:prstGeom prst="rect">
             <a:avLst/>
@@ -9850,7 +10288,7 @@
                 </a:solidFill>
                 <a:latin typeface="Andale Mono" panose="020B0509000000000004" pitchFamily="49" charset="0"/>
               </a:rPr>
-              <a:t>Movies are as much a business as an artform.</a:t>
+              <a:t>Movie Production is a “Risky Business”</a:t>
             </a:r>
           </a:p>
           <a:p>
@@ -9874,23 +10312,6 @@
               </a:spcBef>
               <a:buNone/>
             </a:pPr>
-            <a:r>
-              <a:rPr lang="en" sz="2400" dirty="0">
-                <a:solidFill>
-                  <a:schemeClr val="bg1"/>
-                </a:solidFill>
-                <a:latin typeface="Andale Mono" panose="020B0509000000000004" pitchFamily="49" charset="0"/>
-              </a:rPr>
-              <a:t>Many try to run a profitable production house... Most fail!</a:t>
-            </a:r>
-          </a:p>
-          <a:p>
-            <a:pPr marL="0" lvl="0" indent="0" rtl="0">
-              <a:spcBef>
-                <a:spcPts val="0"/>
-              </a:spcBef>
-              <a:buNone/>
-            </a:pPr>
             <a:endParaRPr lang="en" sz="1100" dirty="0">
               <a:solidFill>
                 <a:schemeClr val="bg1"/>
@@ -9899,10 +10320,7 @@
             </a:endParaRPr>
           </a:p>
           <a:p>
-            <a:pPr marL="0" lvl="0" indent="0" rtl="0">
-              <a:spcBef>
-                <a:spcPts val="0"/>
-              </a:spcBef>
+            <a:pPr marL="0" lvl="0" indent="0">
               <a:buNone/>
             </a:pPr>
             <a:r>
@@ -9912,7 +10330,53 @@
                 </a:solidFill>
                 <a:latin typeface="Andale Mono" panose="020B0509000000000004" pitchFamily="49" charset="0"/>
               </a:rPr>
-              <a:t>As a fledgling production company, Microsoft is unsure what projects will ensure success. What projects will be profitable, popular, and bring buzz to the company?</a:t>
+              <a:t>As a fledgling production company, Microsoft </a:t>
+            </a:r>
+            <a:r>
+              <a:rPr lang="en-US" sz="2400" dirty="0">
+                <a:solidFill>
+                  <a:schemeClr val="bg1"/>
+                </a:solidFill>
+                <a:latin typeface="Andale Mono" panose="020B0509000000000004" pitchFamily="49" charset="0"/>
+              </a:rPr>
+              <a:t>lacks experience and industry knowledge.</a:t>
+            </a:r>
+            <a:r>
+              <a:rPr lang="en" sz="2400" dirty="0">
+                <a:solidFill>
+                  <a:schemeClr val="bg1"/>
+                </a:solidFill>
+                <a:latin typeface="Andale Mono" panose="020B0509000000000004" pitchFamily="49" charset="0"/>
+              </a:rPr>
+              <a:t> </a:t>
+            </a:r>
+          </a:p>
+          <a:p>
+            <a:pPr marL="0" lvl="0" indent="0">
+              <a:buNone/>
+            </a:pPr>
+            <a:r>
+              <a:rPr lang="en" sz="2400" dirty="0">
+                <a:solidFill>
+                  <a:schemeClr val="bg1"/>
+                </a:solidFill>
+                <a:latin typeface="Andale Mono" panose="020B0509000000000004" pitchFamily="49" charset="0"/>
+              </a:rPr>
+              <a:t>You have asked me do provide analysis on</a:t>
+            </a:r>
+          </a:p>
+          <a:p>
+            <a:pPr marL="0" lvl="0" indent="0">
+              <a:buNone/>
+            </a:pPr>
+            <a:r>
+              <a:rPr lang="en" sz="2400" dirty="0">
+                <a:solidFill>
+                  <a:schemeClr val="bg1"/>
+                </a:solidFill>
+                <a:latin typeface="Andale Mono" panose="020B0509000000000004" pitchFamily="49" charset="0"/>
+              </a:rPr>
+              <a:t>what projects will be profitable, popular, and bring buzz to the company?</a:t>
             </a:r>
           </a:p>
         </p:txBody>
@@ -9958,6 +10422,36 @@
           </a:fontRef>
         </p:style>
       </p:cxnSp>
+      <p:pic>
+        <p:nvPicPr>
+          <p:cNvPr id="3" name="Picture 2" descr="A person wearing glasses&#10;&#10;Description automatically generated with low confidence">
+            <a:extLst>
+              <a:ext uri="{FF2B5EF4-FFF2-40B4-BE49-F238E27FC236}">
+                <a16:creationId xmlns:a16="http://schemas.microsoft.com/office/drawing/2014/main" id="{A683E862-7461-A64A-B544-5AAA558A4D72}"/>
+              </a:ext>
+            </a:extLst>
+          </p:cNvPr>
+          <p:cNvPicPr>
+            <a:picLocks noChangeAspect="1"/>
+          </p:cNvPicPr>
+          <p:nvPr/>
+        </p:nvPicPr>
+        <p:blipFill>
+          <a:blip r:embed="rId3"/>
+          <a:stretch>
+            <a:fillRect/>
+          </a:stretch>
+        </p:blipFill>
+        <p:spPr>
+          <a:xfrm>
+            <a:off x="4851729" y="91861"/>
+            <a:ext cx="3488057" cy="1648652"/>
+          </a:xfrm>
+          <a:prstGeom prst="rect">
+            <a:avLst/>
+          </a:prstGeom>
+        </p:spPr>
+      </p:pic>
     </p:spTree>
   </p:cSld>
   <p:clrMapOvr>
@@ -10045,7 +10539,7 @@
                 </a:effectLst>
                 <a:latin typeface="Andale Mono" panose="020B0509000000000004" pitchFamily="49" charset="0"/>
               </a:rPr>
-              <a:t>Data</a:t>
+              <a:t>The Data</a:t>
             </a:r>
             <a:endParaRPr dirty="0">
               <a:solidFill>
@@ -10136,7 +10630,7 @@
               </a:buClr>
             </a:pPr>
             <a:r>
-              <a:rPr lang="en-US" sz="2000" dirty="0">
+              <a:rPr lang="en-US" sz="2400" dirty="0">
                 <a:solidFill>
                   <a:schemeClr val="bg1"/>
                 </a:solidFill>
@@ -10151,7 +10645,7 @@
                 <a:schemeClr val="bg1"/>
               </a:buClr>
             </a:pPr>
-            <a:endParaRPr lang="en-US" sz="2000" dirty="0">
+            <a:endParaRPr lang="en-US" sz="2400" dirty="0">
               <a:solidFill>
                 <a:schemeClr val="bg1"/>
               </a:solidFill>
@@ -10164,7 +10658,7 @@
                 <a:schemeClr val="bg1"/>
               </a:buClr>
             </a:pPr>
-            <a:endParaRPr lang="en-US" sz="2000" dirty="0">
+            <a:endParaRPr lang="en-US" sz="2400" dirty="0">
               <a:solidFill>
                 <a:schemeClr val="bg1"/>
               </a:solidFill>
@@ -10177,7 +10671,7 @@
                 <a:schemeClr val="bg1"/>
               </a:buClr>
             </a:pPr>
-            <a:endParaRPr lang="en-US" sz="2000" dirty="0">
+            <a:endParaRPr lang="en-US" sz="2400" dirty="0">
               <a:solidFill>
                 <a:schemeClr val="bg1"/>
               </a:solidFill>
@@ -10190,7 +10684,7 @@
                 <a:schemeClr val="bg1"/>
               </a:buClr>
             </a:pPr>
-            <a:endParaRPr lang="en-US" sz="2000" dirty="0">
+            <a:endParaRPr lang="en-US" sz="2400" dirty="0">
               <a:solidFill>
                 <a:schemeClr val="bg1"/>
               </a:solidFill>
@@ -10204,20 +10698,21 @@
               </a:buClr>
             </a:pPr>
             <a:r>
-              <a:rPr lang="en-US" sz="2000" dirty="0">
+              <a:rPr lang="en-US" sz="2400" dirty="0">
                 <a:solidFill>
                   <a:schemeClr val="bg1"/>
                 </a:solidFill>
                 <a:latin typeface="Andale Mono" panose="020B0509000000000004" pitchFamily="49" charset="0"/>
               </a:rPr>
-              <a:t>Movies by title, ratings, audience votes, genres, names of directors/writers/actors, budgets and domestic box office numbers.</a:t>
+              <a:t>Movies by title, ratings, audience popularity, genres, names of directors, budgets and domestic box office numbers.</a:t>
             </a:r>
           </a:p>
           <a:p>
-            <a:pPr>
+            <a:pPr marL="114300" indent="0">
               <a:buClr>
                 <a:schemeClr val="bg1"/>
               </a:buClr>
+              <a:buNone/>
             </a:pPr>
             <a:endParaRPr lang="en-US" dirty="0">
               <a:solidFill>
@@ -10225,22 +10720,6 @@
               </a:solidFill>
               <a:latin typeface="Andale Mono" panose="020B0509000000000004" pitchFamily="49" charset="0"/>
             </a:endParaRPr>
-          </a:p>
-          <a:p>
-            <a:pPr>
-              <a:buClr>
-                <a:schemeClr val="bg1"/>
-              </a:buClr>
-            </a:pPr>
-            <a:r>
-              <a:rPr lang="en-US" sz="2000" dirty="0">
-                <a:solidFill>
-                  <a:schemeClr val="bg1"/>
-                </a:solidFill>
-                <a:latin typeface="Andale Mono" panose="020B0509000000000004" pitchFamily="49" charset="0"/>
-              </a:rPr>
-              <a:t>Primarily looking at financials and analyzing movies that meet a certain financial bar</a:t>
-            </a:r>
           </a:p>
         </p:txBody>
       </p:sp>
@@ -10258,8 +10737,8 @@
         </p:nvSpPr>
         <p:spPr>
           <a:xfrm>
-            <a:off x="1072552" y="1411114"/>
-            <a:ext cx="6510528" cy="1862048"/>
+            <a:off x="1072552" y="1565380"/>
+            <a:ext cx="6510528" cy="1369606"/>
           </a:xfrm>
           <a:prstGeom prst="rect">
             <a:avLst/>
@@ -10289,86 +10768,8 @@
                 </a:solidFill>
                 <a:latin typeface="Andale Mono" panose="020B0509000000000004" pitchFamily="49" charset="0"/>
               </a:rPr>
-              <a:t>Box Office Mojo</a:t>
-            </a:r>
-          </a:p>
-          <a:p>
-            <a:pPr marL="102870" lvl="3" indent="-285750">
-              <a:spcAft>
-                <a:spcPts val="600"/>
-              </a:spcAft>
-              <a:buClr>
-                <a:schemeClr val="bg1"/>
-              </a:buClr>
-              <a:buFont typeface="Arial" panose="020B0604020202020204" pitchFamily="34" charset="0"/>
-              <a:buChar char="•"/>
-            </a:pPr>
-            <a:r>
-              <a:rPr lang="en-US" sz="1800" dirty="0">
-                <a:solidFill>
-                  <a:schemeClr val="bg1"/>
-                </a:solidFill>
-                <a:latin typeface="Andale Mono" panose="020B0509000000000004" pitchFamily="49" charset="0"/>
-              </a:rPr>
               <a:t>IMDB</a:t>
             </a:r>
-          </a:p>
-          <a:p>
-            <a:pPr marL="102870" lvl="3" indent="-285750">
-              <a:spcAft>
-                <a:spcPts val="600"/>
-              </a:spcAft>
-              <a:buClr>
-                <a:schemeClr val="bg1"/>
-              </a:buClr>
-              <a:buFont typeface="Arial" panose="020B0604020202020204" pitchFamily="34" charset="0"/>
-              <a:buChar char="•"/>
-            </a:pPr>
-            <a:r>
-              <a:rPr lang="en-US" sz="1800" dirty="0">
-                <a:solidFill>
-                  <a:schemeClr val="bg1"/>
-                </a:solidFill>
-                <a:latin typeface="Andale Mono" panose="020B0509000000000004" pitchFamily="49" charset="0"/>
-              </a:rPr>
-              <a:t>Rotten Tomatoes</a:t>
-            </a:r>
-          </a:p>
-          <a:p>
-            <a:pPr marL="102870" lvl="3" indent="-285750">
-              <a:spcAft>
-                <a:spcPts val="600"/>
-              </a:spcAft>
-              <a:buClr>
-                <a:schemeClr val="bg1"/>
-              </a:buClr>
-              <a:buFont typeface="Arial" panose="020B0604020202020204" pitchFamily="34" charset="0"/>
-              <a:buChar char="•"/>
-            </a:pPr>
-            <a:endParaRPr lang="en-US" sz="1800" dirty="0">
-              <a:solidFill>
-                <a:schemeClr val="bg1"/>
-              </a:solidFill>
-              <a:latin typeface="Andale Mono" panose="020B0509000000000004" pitchFamily="49" charset="0"/>
-            </a:endParaRPr>
-          </a:p>
-          <a:p>
-            <a:pPr marL="102870" lvl="3" indent="-285750">
-              <a:spcAft>
-                <a:spcPts val="600"/>
-              </a:spcAft>
-              <a:buClr>
-                <a:schemeClr val="bg1"/>
-              </a:buClr>
-              <a:buFont typeface="Arial" panose="020B0604020202020204" pitchFamily="34" charset="0"/>
-              <a:buChar char="•"/>
-            </a:pPr>
-            <a:endParaRPr lang="en-US" sz="1800" dirty="0">
-              <a:solidFill>
-                <a:schemeClr val="bg1"/>
-              </a:solidFill>
-              <a:latin typeface="Andale Mono" panose="020B0509000000000004" pitchFamily="49" charset="0"/>
-            </a:endParaRPr>
           </a:p>
           <a:p>
             <a:pPr marL="102870" lvl="3" indent="-285750">
@@ -10509,7 +10910,7 @@
                 </a:effectLst>
                 <a:latin typeface="Andale Mono" panose="020B0509000000000004" pitchFamily="49" charset="0"/>
               </a:rPr>
-              <a:t>Methods</a:t>
+              <a:t>The Method</a:t>
             </a:r>
             <a:endParaRPr dirty="0">
               <a:solidFill>
@@ -10586,7 +10987,7 @@
         </p:nvSpPr>
         <p:spPr>
           <a:xfrm>
-            <a:off x="311700" y="1005839"/>
+            <a:off x="311700" y="1144576"/>
             <a:ext cx="8520600" cy="3897077"/>
           </a:xfrm>
         </p:spPr>
@@ -10607,7 +11008,7 @@
                 </a:solidFill>
                 <a:latin typeface="Andale Mono" panose="020B0509000000000004" pitchFamily="49" charset="0"/>
               </a:rPr>
-              <a:t>I have used data aggregation methods, statistics, and visualizations to isolate trends and to show what and who has been successful in the industry.</a:t>
+              <a:t>I have used data analysis and graphing to show what and who has been successful in the industry.</a:t>
             </a:r>
           </a:p>
           <a:p>
@@ -10633,7 +11034,7 @@
               <a:buAutoNum type="arabicPeriod"/>
             </a:pPr>
             <a:r>
-              <a:rPr lang="en-US" sz="1600" dirty="0">
+              <a:rPr lang="en-US" sz="2000" dirty="0">
                 <a:solidFill>
                   <a:schemeClr val="bg1"/>
                 </a:solidFill>
@@ -10650,7 +11051,7 @@
               <a:buFont typeface="+mj-lt"/>
               <a:buAutoNum type="arabicPeriod"/>
             </a:pPr>
-            <a:endParaRPr lang="en-US" sz="1600" dirty="0">
+            <a:endParaRPr lang="en-US" sz="2000" dirty="0">
               <a:solidFill>
                 <a:schemeClr val="bg1"/>
               </a:solidFill>
@@ -10666,13 +11067,13 @@
               <a:buAutoNum type="arabicPeriod"/>
             </a:pPr>
             <a:r>
-              <a:rPr lang="en-US" sz="1600" dirty="0">
+              <a:rPr lang="en-US" sz="2000" dirty="0">
                 <a:solidFill>
                   <a:schemeClr val="bg1"/>
                 </a:solidFill>
                 <a:latin typeface="Andale Mono" panose="020B0509000000000004" pitchFamily="49" charset="0"/>
               </a:rPr>
-              <a:t>I then used comparative statistics, regression and correlation to analyze the data</a:t>
+              <a:t>I then analyzed that information</a:t>
             </a:r>
           </a:p>
           <a:p>
@@ -10683,7 +11084,7 @@
               <a:buFont typeface="+mj-lt"/>
               <a:buAutoNum type="arabicPeriod"/>
             </a:pPr>
-            <a:endParaRPr lang="en-US" sz="1600" dirty="0">
+            <a:endParaRPr lang="en-US" sz="2000" dirty="0">
               <a:solidFill>
                 <a:schemeClr val="bg1"/>
               </a:solidFill>
@@ -10699,13 +11100,13 @@
               <a:buAutoNum type="arabicPeriod"/>
             </a:pPr>
             <a:r>
-              <a:rPr lang="en-US" sz="1600" dirty="0">
+              <a:rPr lang="en-US" sz="2000" dirty="0">
                 <a:solidFill>
                   <a:schemeClr val="bg1"/>
                 </a:solidFill>
                 <a:latin typeface="Andale Mono" panose="020B0509000000000004" pitchFamily="49" charset="0"/>
               </a:rPr>
-              <a:t>Finally, I used visualization methods to show the results of my analysis</a:t>
+              <a:t>Finally, I used visualizations to present my results</a:t>
             </a:r>
           </a:p>
         </p:txBody>
@@ -10933,25 +11334,16 @@
                 </a:solidFill>
                 <a:latin typeface="Andale Mono" panose="020B0509000000000004" pitchFamily="49" charset="0"/>
               </a:rPr>
-              <a:t>After comparing the average rating of movies and looking at the genres they fell in, we can see the highest rated movies were </a:t>
+              <a:t>The highest rated genre was </a:t>
             </a:r>
             <a:r>
-              <a:rPr lang="en-US" sz="1600" b="1" u="sng" dirty="0">
+              <a:rPr lang="en-US" sz="2000" b="1" u="sng" dirty="0">
                 <a:solidFill>
                   <a:schemeClr val="bg1"/>
                 </a:solidFill>
                 <a:latin typeface="Andale Mono" panose="020B0509000000000004" pitchFamily="49" charset="0"/>
               </a:rPr>
               <a:t>Action</a:t>
-            </a:r>
-            <a:r>
-              <a:rPr lang="en-US" sz="1600" dirty="0">
-                <a:solidFill>
-                  <a:schemeClr val="bg1"/>
-                </a:solidFill>
-                <a:latin typeface="Andale Mono" panose="020B0509000000000004" pitchFamily="49" charset="0"/>
-              </a:rPr>
-              <a:t> ...by a wide margin.</a:t>
             </a:r>
           </a:p>
           <a:p>
@@ -11017,8 +11409,8 @@
         </p:blipFill>
         <p:spPr>
           <a:xfrm>
-            <a:off x="3405051" y="701042"/>
-            <a:ext cx="5717179" cy="4300071"/>
+            <a:off x="3426821" y="661850"/>
+            <a:ext cx="5717179" cy="4405561"/>
           </a:xfrm>
           <a:prstGeom prst="rect">
             <a:avLst/>
@@ -11217,7 +11609,7 @@
                 </a:solidFill>
                 <a:latin typeface="Andale Mono" panose="020B0509000000000004" pitchFamily="49" charset="0"/>
               </a:rPr>
-              <a:t>Profitable Movies</a:t>
+              <a:t>PROFITABLE MOVIES</a:t>
             </a:r>
           </a:p>
           <a:p>
@@ -11233,23 +11625,6 @@
               </a:solidFill>
               <a:latin typeface="Andale Mono" panose="020B0509000000000004" pitchFamily="49" charset="0"/>
             </a:endParaRPr>
-          </a:p>
-          <a:p>
-            <a:pPr marL="114300" indent="0">
-              <a:buClr>
-                <a:schemeClr val="bg1"/>
-              </a:buClr>
-              <a:buNone/>
-            </a:pPr>
-            <a:r>
-              <a:rPr lang="en-US" sz="1200" dirty="0">
-                <a:solidFill>
-                  <a:schemeClr val="bg1"/>
-                </a:solidFill>
-                <a:latin typeface="Andale Mono" panose="020B0509000000000004" pitchFamily="49" charset="0"/>
-              </a:rPr>
-              <a:t>Taking the domestic box office gross of the top 30 movies from the last decade, and comparing this to their budget, we can see the most profitable movies</a:t>
-            </a:r>
           </a:p>
           <a:p>
             <a:pPr marL="114300" indent="0">
@@ -11276,13 +11651,13 @@
               <a:buSzPct val="75000"/>
             </a:pPr>
             <a:r>
-              <a:rPr lang="en-US" sz="1200" dirty="0">
+              <a:rPr lang="en-US" sz="1400" dirty="0">
                 <a:solidFill>
                   <a:schemeClr val="bg1"/>
                 </a:solidFill>
                 <a:latin typeface="Andale Mono" panose="020B0509000000000004" pitchFamily="49" charset="0"/>
               </a:rPr>
-              <a:t>18 were in the action genre, </a:t>
+              <a:t>13 were in the action genre, </a:t>
             </a:r>
           </a:p>
           <a:p>
@@ -11296,7 +11671,7 @@
               <a:buSzPct val="75000"/>
             </a:pPr>
             <a:r>
-              <a:rPr lang="en-US" sz="1200" dirty="0">
+              <a:rPr lang="en-US" dirty="0">
                 <a:solidFill>
                   <a:schemeClr val="bg1"/>
                 </a:solidFill>
@@ -11316,13 +11691,13 @@
               <a:buSzPct val="75000"/>
             </a:pPr>
             <a:r>
-              <a:rPr lang="en-US" sz="1200" dirty="0">
+              <a:rPr lang="en-US" dirty="0">
                 <a:solidFill>
                   <a:schemeClr val="bg1"/>
                 </a:solidFill>
                 <a:latin typeface="Andale Mono" panose="020B0509000000000004" pitchFamily="49" charset="0"/>
               </a:rPr>
-              <a:t>10 of these were super-hero / comic book movies</a:t>
+              <a:t>6 of these were super-hero / comic book movies</a:t>
             </a:r>
           </a:p>
           <a:p>
@@ -11339,23 +11714,23 @@
               <a:buSzPct val="75000"/>
             </a:pPr>
             <a:r>
-              <a:rPr lang="en-US" sz="1200" dirty="0">
+              <a:rPr lang="en-US" sz="1400" dirty="0">
                 <a:solidFill>
                   <a:schemeClr val="bg1"/>
                 </a:solidFill>
                 <a:latin typeface="Andale Mono" panose="020B0509000000000004" pitchFamily="49" charset="0"/>
               </a:rPr>
-              <a:t>12 were in the animation genre, some franchises as well</a:t>
+              <a:t>15 were in the animation or computer-generated graphic genre, many franchises as well</a:t>
             </a:r>
           </a:p>
         </p:txBody>
       </p:sp>
       <p:pic>
         <p:nvPicPr>
-          <p:cNvPr id="11" name="Picture 10" descr="Chart&#10;&#10;Description automatically generated">
+          <p:cNvPr id="7" name="Picture 6" descr="Chart&#10;&#10;Description automatically generated">
             <a:extLst>
               <a:ext uri="{FF2B5EF4-FFF2-40B4-BE49-F238E27FC236}">
-                <a16:creationId xmlns:a16="http://schemas.microsoft.com/office/drawing/2014/main" id="{B01C34E2-A8CB-974E-9529-B3A95EBDCB29}"/>
+                <a16:creationId xmlns:a16="http://schemas.microsoft.com/office/drawing/2014/main" id="{98613D0C-F020-AA43-AF87-A32D4FC58587}"/>
               </a:ext>
             </a:extLst>
           </p:cNvPr>
@@ -11372,8 +11747,8 @@
         </p:blipFill>
         <p:spPr>
           <a:xfrm>
-            <a:off x="3405051" y="722880"/>
-            <a:ext cx="5674555" cy="4275835"/>
+            <a:off x="3405050" y="674915"/>
+            <a:ext cx="5738949" cy="4392497"/>
           </a:xfrm>
           <a:prstGeom prst="rect">
             <a:avLst/>
@@ -11572,7 +11947,7 @@
                 </a:solidFill>
                 <a:latin typeface="Andale Mono" panose="020B0509000000000004" pitchFamily="49" charset="0"/>
               </a:rPr>
-              <a:t>Popularity</a:t>
+              <a:t>POPULARITY SCORE</a:t>
             </a:r>
           </a:p>
           <a:p>
@@ -11588,23 +11963,6 @@
               </a:solidFill>
               <a:latin typeface="Andale Mono" panose="020B0509000000000004" pitchFamily="49" charset="0"/>
             </a:endParaRPr>
-          </a:p>
-          <a:p>
-            <a:pPr marL="114300" indent="0">
-              <a:buClr>
-                <a:schemeClr val="bg1"/>
-              </a:buClr>
-              <a:buNone/>
-            </a:pPr>
-            <a:r>
-              <a:rPr lang="en-US" sz="1200" dirty="0">
-                <a:solidFill>
-                  <a:schemeClr val="bg1"/>
-                </a:solidFill>
-                <a:latin typeface="Andale Mono" panose="020B0509000000000004" pitchFamily="49" charset="0"/>
-              </a:rPr>
-              <a:t>Looking at the popularity scores of the top 30 movies from the last decade</a:t>
-            </a:r>
           </a:p>
           <a:p>
             <a:pPr marL="114300" indent="0">
@@ -11631,13 +11989,13 @@
               <a:buSzPct val="75000"/>
             </a:pPr>
             <a:r>
-              <a:rPr lang="en-US" sz="1200" dirty="0">
+              <a:rPr lang="en-US" sz="1600" dirty="0">
                 <a:solidFill>
                   <a:schemeClr val="bg1"/>
                 </a:solidFill>
                 <a:latin typeface="Andale Mono" panose="020B0509000000000004" pitchFamily="49" charset="0"/>
               </a:rPr>
-              <a:t>22 were in the action genre, All but 1 were part of a franchise</a:t>
+              <a:t>22 were in the action genre, 19 were part of a franchise</a:t>
             </a:r>
           </a:p>
           <a:p>
@@ -11651,7 +12009,7 @@
               <a:buSzPct val="75000"/>
               <a:buNone/>
             </a:pPr>
-            <a:endParaRPr lang="en-US" sz="1200" dirty="0">
+            <a:endParaRPr lang="en-US" sz="1600" dirty="0">
               <a:solidFill>
                 <a:schemeClr val="bg1"/>
               </a:solidFill>
@@ -11669,22 +12027,22 @@
               <a:buSzPct val="75000"/>
             </a:pPr>
             <a:r>
-              <a:rPr lang="en-US" sz="1200" dirty="0">
+              <a:rPr lang="en-US" sz="1600" dirty="0">
                 <a:solidFill>
                   <a:schemeClr val="bg1"/>
                 </a:solidFill>
                 <a:latin typeface="Andale Mono" panose="020B0509000000000004" pitchFamily="49" charset="0"/>
               </a:rPr>
-              <a:t>16 were super-hero / comic book movies</a:t>
+              <a:t>16 were super-hero / comic book franchises</a:t>
             </a:r>
           </a:p>
           <a:p>
-            <a:pPr lvl="1">
+            <a:pPr>
               <a:lnSpc>
                 <a:spcPct val="100000"/>
               </a:lnSpc>
               <a:spcBef>
-                <a:spcPts val="400"/>
+                <a:spcPts val="1200"/>
               </a:spcBef>
               <a:buClr>
                 <a:schemeClr val="bg1"/>
@@ -11692,13 +12050,13 @@
               <a:buSzPct val="75000"/>
             </a:pPr>
             <a:r>
-              <a:rPr lang="en-US" sz="1200" dirty="0">
+              <a:rPr lang="en-US" sz="1600" dirty="0">
                 <a:solidFill>
                   <a:schemeClr val="bg1"/>
                 </a:solidFill>
                 <a:latin typeface="Andale Mono" panose="020B0509000000000004" pitchFamily="49" charset="0"/>
               </a:rPr>
-              <a:t>All part of franchises</a:t>
+              <a:t>3 were animation</a:t>
             </a:r>
           </a:p>
           <a:p>
@@ -11715,13 +12073,13 @@
               <a:buSzPct val="75000"/>
             </a:pPr>
             <a:r>
-              <a:rPr lang="en-US" sz="1200" dirty="0">
+              <a:rPr lang="en-US" sz="1600" dirty="0">
                 <a:solidFill>
                   <a:schemeClr val="bg1"/>
                 </a:solidFill>
                 <a:latin typeface="Andale Mono" panose="020B0509000000000004" pitchFamily="49" charset="0"/>
               </a:rPr>
-              <a:t>3 were animation</a:t>
+              <a:t>3 were drama</a:t>
             </a:r>
           </a:p>
           <a:p>
@@ -11738,46 +12096,23 @@
               <a:buSzPct val="75000"/>
             </a:pPr>
             <a:r>
-              <a:rPr lang="en-US" sz="1200" dirty="0">
+              <a:rPr lang="en-US" sz="1600" dirty="0">
                 <a:solidFill>
                   <a:schemeClr val="bg1"/>
                 </a:solidFill>
                 <a:latin typeface="Andale Mono" panose="020B0509000000000004" pitchFamily="49" charset="0"/>
               </a:rPr>
-              <a:t>3 were drama</a:t>
-            </a:r>
-          </a:p>
-          <a:p>
-            <a:pPr>
-              <a:lnSpc>
-                <a:spcPct val="100000"/>
-              </a:lnSpc>
-              <a:spcBef>
-                <a:spcPts val="1200"/>
-              </a:spcBef>
-              <a:buClr>
-                <a:schemeClr val="bg1"/>
-              </a:buClr>
-              <a:buSzPct val="75000"/>
-            </a:pPr>
-            <a:r>
-              <a:rPr lang="en-US" sz="1200" dirty="0">
-                <a:solidFill>
-                  <a:schemeClr val="bg1"/>
-                </a:solidFill>
-                <a:latin typeface="Andale Mono" panose="020B0509000000000004" pitchFamily="49" charset="0"/>
-              </a:rPr>
-              <a:t>2 were fantasy franchises</a:t>
+              <a:t>2 were fantasy/adventure franchises</a:t>
             </a:r>
           </a:p>
         </p:txBody>
       </p:sp>
       <p:pic>
         <p:nvPicPr>
-          <p:cNvPr id="11" name="Picture 10" descr="A picture containing chart&#10;&#10;Description automatically generated">
+          <p:cNvPr id="4" name="Picture 3" descr="Chart&#10;&#10;Description automatically generated">
             <a:extLst>
               <a:ext uri="{FF2B5EF4-FFF2-40B4-BE49-F238E27FC236}">
-                <a16:creationId xmlns:a16="http://schemas.microsoft.com/office/drawing/2014/main" id="{9067F133-AE5A-3E40-AE74-15CEECE168D7}"/>
+                <a16:creationId xmlns:a16="http://schemas.microsoft.com/office/drawing/2014/main" id="{813DAB45-9131-B74C-BF4E-02B65BE62206}"/>
               </a:ext>
             </a:extLst>
           </p:cNvPr>
@@ -11794,8 +12129,8 @@
         </p:blipFill>
         <p:spPr>
           <a:xfrm>
-            <a:off x="3405051" y="722880"/>
-            <a:ext cx="5674555" cy="4275835"/>
+            <a:off x="3433194" y="684306"/>
+            <a:ext cx="5710806" cy="4383106"/>
           </a:xfrm>
           <a:prstGeom prst="rect">
             <a:avLst/>

</xml_diff>